<commit_message>
Included a comment about .NET WCF on slide 3
</commit_message>
<xml_diff>
--- a/webapi/WebAPI.pptx
+++ b/webapi/WebAPI.pptx
@@ -153,7 +153,7 @@
     </p:spTree>
     <p:extLst>
       <p:ext uri="{BB962C8B-B14F-4D97-AF65-F5344CB8AC3E}">
-        <p14:creationId xmlns="" xmlns:p14="http://schemas.microsoft.com/office/powerpoint/2010/main" val="2280443481"/>
+        <p14:creationId xmlns:p14="http://schemas.microsoft.com/office/powerpoint/2010/main" xmlns="" val="2280443481"/>
       </p:ext>
     </p:extLst>
   </p:cSld>
@@ -323,7 +323,7 @@
     </p:spTree>
     <p:extLst>
       <p:ext uri="{BB962C8B-B14F-4D97-AF65-F5344CB8AC3E}">
-        <p14:creationId xmlns="" xmlns:p14="http://schemas.microsoft.com/office/powerpoint/2010/main" val="1996866432"/>
+        <p14:creationId xmlns:p14="http://schemas.microsoft.com/office/powerpoint/2010/main" xmlns="" val="1996866432"/>
       </p:ext>
     </p:extLst>
   </p:cSld>
@@ -1133,7 +1133,7 @@
     </p:spTree>
     <p:extLst>
       <p:ext uri="{BB962C8B-B14F-4D97-AF65-F5344CB8AC3E}">
-        <p14:creationId xmlns="" xmlns:p14="http://schemas.microsoft.com/office/powerpoint/2010/main" val="1631701370"/>
+        <p14:creationId xmlns:p14="http://schemas.microsoft.com/office/powerpoint/2010/main" xmlns="" val="1631701370"/>
       </p:ext>
     </p:extLst>
   </p:cSld>
@@ -1454,7 +1454,7 @@
     </p:spTree>
     <p:extLst>
       <p:ext uri="{BB962C8B-B14F-4D97-AF65-F5344CB8AC3E}">
-        <p14:creationId xmlns="" xmlns:p14="http://schemas.microsoft.com/office/powerpoint/2010/main" val="2627694574"/>
+        <p14:creationId xmlns:p14="http://schemas.microsoft.com/office/powerpoint/2010/main" xmlns="" val="2627694574"/>
       </p:ext>
     </p:extLst>
   </p:cSld>
@@ -1773,7 +1773,7 @@
     </p:spTree>
     <p:extLst>
       <p:ext uri="{BB962C8B-B14F-4D97-AF65-F5344CB8AC3E}">
-        <p14:creationId xmlns="" xmlns:p14="http://schemas.microsoft.com/office/powerpoint/2010/main" val="2472564093"/>
+        <p14:creationId xmlns:p14="http://schemas.microsoft.com/office/powerpoint/2010/main" xmlns="" val="2472564093"/>
       </p:ext>
     </p:extLst>
   </p:cSld>
@@ -2258,7 +2258,7 @@
     </p:spTree>
     <p:extLst>
       <p:ext uri="{BB962C8B-B14F-4D97-AF65-F5344CB8AC3E}">
-        <p14:creationId xmlns="" xmlns:p14="http://schemas.microsoft.com/office/powerpoint/2010/main" val="844442129"/>
+        <p14:creationId xmlns:p14="http://schemas.microsoft.com/office/powerpoint/2010/main" xmlns="" val="844442129"/>
       </p:ext>
     </p:extLst>
   </p:cSld>
@@ -2588,7 +2588,7 @@
     </p:spTree>
     <p:extLst>
       <p:ext uri="{BB962C8B-B14F-4D97-AF65-F5344CB8AC3E}">
-        <p14:creationId xmlns="" xmlns:p14="http://schemas.microsoft.com/office/powerpoint/2010/main" val="1607786633"/>
+        <p14:creationId xmlns:p14="http://schemas.microsoft.com/office/powerpoint/2010/main" xmlns="" val="1607786633"/>
       </p:ext>
     </p:extLst>
   </p:cSld>
@@ -2918,7 +2918,7 @@
     </p:spTree>
     <p:extLst>
       <p:ext uri="{BB962C8B-B14F-4D97-AF65-F5344CB8AC3E}">
-        <p14:creationId xmlns="" xmlns:p14="http://schemas.microsoft.com/office/powerpoint/2010/main" val="3400319444"/>
+        <p14:creationId xmlns:p14="http://schemas.microsoft.com/office/powerpoint/2010/main" xmlns="" val="3400319444"/>
       </p:ext>
     </p:extLst>
   </p:cSld>
@@ -4788,7 +4788,7 @@
     </p:spTree>
     <p:extLst>
       <p:ext uri="{BB962C8B-B14F-4D97-AF65-F5344CB8AC3E}">
-        <p14:creationId xmlns="" xmlns:p14="http://schemas.microsoft.com/office/powerpoint/2010/main" val="1273682958"/>
+        <p14:creationId xmlns:p14="http://schemas.microsoft.com/office/powerpoint/2010/main" xmlns="" val="1273682958"/>
       </p:ext>
     </p:extLst>
   </p:cSld>
@@ -4893,7 +4893,7 @@
     </p:spTree>
     <p:extLst>
       <p:ext uri="{BB962C8B-B14F-4D97-AF65-F5344CB8AC3E}">
-        <p14:creationId xmlns="" xmlns:p14="http://schemas.microsoft.com/office/powerpoint/2010/main" val="3654216826"/>
+        <p14:creationId xmlns:p14="http://schemas.microsoft.com/office/powerpoint/2010/main" xmlns="" val="3654216826"/>
       </p:ext>
     </p:extLst>
   </p:cSld>
@@ -5149,7 +5149,7 @@
     </p:spTree>
     <p:extLst>
       <p:ext uri="{BB962C8B-B14F-4D97-AF65-F5344CB8AC3E}">
-        <p14:creationId xmlns="" xmlns:p14="http://schemas.microsoft.com/office/powerpoint/2010/main" val="2837040887"/>
+        <p14:creationId xmlns:p14="http://schemas.microsoft.com/office/powerpoint/2010/main" xmlns="" val="2837040887"/>
       </p:ext>
     </p:extLst>
   </p:cSld>
@@ -5182,7 +5182,7 @@
     </p:spTree>
     <p:extLst>
       <p:ext uri="{BB962C8B-B14F-4D97-AF65-F5344CB8AC3E}">
-        <p14:creationId xmlns="" xmlns:p14="http://schemas.microsoft.com/office/powerpoint/2010/main" val="3283581558"/>
+        <p14:creationId xmlns:p14="http://schemas.microsoft.com/office/powerpoint/2010/main" xmlns="" val="3283581558"/>
       </p:ext>
     </p:extLst>
   </p:cSld>
@@ -5496,7 +5496,7 @@
     </p:spTree>
     <p:extLst>
       <p:ext uri="{BB962C8B-B14F-4D97-AF65-F5344CB8AC3E}">
-        <p14:creationId xmlns="" xmlns:p14="http://schemas.microsoft.com/office/powerpoint/2010/main" val="3151533342"/>
+        <p14:creationId xmlns:p14="http://schemas.microsoft.com/office/powerpoint/2010/main" xmlns="" val="3151533342"/>
       </p:ext>
     </p:extLst>
   </p:cSld>
@@ -5639,7 +5639,7 @@
     </p:spTree>
     <p:extLst>
       <p:ext uri="{BB962C8B-B14F-4D97-AF65-F5344CB8AC3E}">
-        <p14:creationId xmlns="" xmlns:p14="http://schemas.microsoft.com/office/powerpoint/2010/main" val="894352273"/>
+        <p14:creationId xmlns:p14="http://schemas.microsoft.com/office/powerpoint/2010/main" xmlns="" val="894352273"/>
       </p:ext>
     </p:extLst>
   </p:cSld>
@@ -5805,7 +5805,7 @@
     </p:spTree>
     <p:extLst>
       <p:ext uri="{BB962C8B-B14F-4D97-AF65-F5344CB8AC3E}">
-        <p14:creationId xmlns="" xmlns:p14="http://schemas.microsoft.com/office/powerpoint/2010/main" val="351067674"/>
+        <p14:creationId xmlns:p14="http://schemas.microsoft.com/office/powerpoint/2010/main" xmlns="" val="351067674"/>
       </p:ext>
     </p:extLst>
   </p:cSld>
@@ -6125,7 +6125,7 @@
     </p:spTree>
     <p:extLst>
       <p:ext uri="{BB962C8B-B14F-4D97-AF65-F5344CB8AC3E}">
-        <p14:creationId xmlns="" xmlns:p14="http://schemas.microsoft.com/office/powerpoint/2010/main" val="3938044995"/>
+        <p14:creationId xmlns:p14="http://schemas.microsoft.com/office/powerpoint/2010/main" xmlns="" val="3938044995"/>
       </p:ext>
     </p:extLst>
   </p:cSld>
@@ -6711,7 +6711,7 @@
     </p:spTree>
     <p:extLst>
       <p:ext uri="{BB962C8B-B14F-4D97-AF65-F5344CB8AC3E}">
-        <p14:creationId xmlns="" xmlns:p14="http://schemas.microsoft.com/office/powerpoint/2010/main" val="3192118728"/>
+        <p14:creationId xmlns:p14="http://schemas.microsoft.com/office/powerpoint/2010/main" xmlns="" val="3192118728"/>
       </p:ext>
     </p:extLst>
   </p:cSld>
@@ -7109,7 +7109,7 @@
     </p:spTree>
     <p:extLst>
       <p:ext uri="{BB962C8B-B14F-4D97-AF65-F5344CB8AC3E}">
-        <p14:creationId xmlns="" xmlns:p14="http://schemas.microsoft.com/office/powerpoint/2010/main" val="2190527855"/>
+        <p14:creationId xmlns:p14="http://schemas.microsoft.com/office/powerpoint/2010/main" xmlns="" val="2190527855"/>
       </p:ext>
     </p:extLst>
   </p:cSld>
@@ -7906,7 +7906,7 @@
     </p:spTree>
     <p:extLst>
       <p:ext uri="{BB962C8B-B14F-4D97-AF65-F5344CB8AC3E}">
-        <p14:creationId xmlns="" xmlns:p14="http://schemas.microsoft.com/office/powerpoint/2010/main" val="69886873"/>
+        <p14:creationId xmlns:p14="http://schemas.microsoft.com/office/powerpoint/2010/main" xmlns="" val="69886873"/>
       </p:ext>
     </p:extLst>
   </p:cSld>
@@ -8997,7 +8997,7 @@
     </p:spTree>
     <p:extLst>
       <p:ext uri="{BB962C8B-B14F-4D97-AF65-F5344CB8AC3E}">
-        <p14:creationId xmlns="" xmlns:p14="http://schemas.microsoft.com/office/powerpoint/2010/main" val="593901232"/>
+        <p14:creationId xmlns:p14="http://schemas.microsoft.com/office/powerpoint/2010/main" xmlns="" val="593901232"/>
       </p:ext>
     </p:extLst>
   </p:cSld>
@@ -9253,7 +9253,7 @@
     </p:spTree>
     <p:extLst>
       <p:ext uri="{BB962C8B-B14F-4D97-AF65-F5344CB8AC3E}">
-        <p14:creationId xmlns="" xmlns:p14="http://schemas.microsoft.com/office/powerpoint/2010/main" val="925662914"/>
+        <p14:creationId xmlns:p14="http://schemas.microsoft.com/office/powerpoint/2010/main" xmlns="" val="925662914"/>
       </p:ext>
     </p:extLst>
   </p:cSld>
@@ -9495,7 +9495,7 @@
     </p:spTree>
     <p:extLst>
       <p:ext uri="{BB962C8B-B14F-4D97-AF65-F5344CB8AC3E}">
-        <p14:creationId xmlns="" xmlns:p14="http://schemas.microsoft.com/office/powerpoint/2010/main" val="2463004899"/>
+        <p14:creationId xmlns:p14="http://schemas.microsoft.com/office/powerpoint/2010/main" xmlns="" val="2463004899"/>
       </p:ext>
     </p:extLst>
   </p:cSld>
@@ -9920,7 +9920,7 @@
     </p:spTree>
     <p:extLst>
       <p:ext uri="{BB962C8B-B14F-4D97-AF65-F5344CB8AC3E}">
-        <p14:creationId xmlns="" xmlns:p14="http://schemas.microsoft.com/office/powerpoint/2010/main" val="1193520387"/>
+        <p14:creationId xmlns:p14="http://schemas.microsoft.com/office/powerpoint/2010/main" xmlns="" val="1193520387"/>
       </p:ext>
     </p:extLst>
   </p:cSld>
@@ -14055,8 +14055,17 @@
             </a:pPr>
             <a:r>
               <a:rPr lang="nb-NO" sz="1400" dirty="0" smtClean="0"/>
-              <a:t> Tjenester eksponert over ren HTTP</a:t>
-            </a:r>
+              <a:t> Tjenester eksponert over </a:t>
+            </a:r>
+            <a:r>
+              <a:rPr lang="nb-NO" sz="1400" smtClean="0"/>
+              <a:t>ren </a:t>
+            </a:r>
+            <a:r>
+              <a:rPr lang="nb-NO" sz="1400" smtClean="0"/>
+              <a:t>HTTP i motsetning til over SOAP (.NET WCF)</a:t>
+            </a:r>
+            <a:endParaRPr lang="nb-NO" sz="1400" dirty="0" smtClean="0"/>
           </a:p>
           <a:p>
             <a:pPr>

</xml_diff>

<commit_message>
Updated slidedeck for WebAPI
</commit_message>
<xml_diff>
--- a/webapi/WebAPI.pptx
+++ b/webapi/WebAPI.pptx
@@ -562,7 +562,19 @@
             </a:r>
             <a:r>
               <a:rPr lang="nb-NO" baseline="0" dirty="0" smtClean="0"/>
-              <a:t> satt opp Ninject</a:t>
+              <a:t> satt opp </a:t>
+            </a:r>
+            <a:r>
+              <a:rPr lang="nb-NO" baseline="0" dirty="0" smtClean="0"/>
+              <a:t>Ninject</a:t>
+            </a:r>
+          </a:p>
+          <a:p>
+            <a:r>
+              <a:rPr lang="en-US" sz="1600" dirty="0" smtClean="0">
+                <a:hlinkClick r:id="rId3"/>
+              </a:rPr>
+              <a:t>http://www.strathweb.com/2012/05/using-ninject-with-the-latest-asp-net-web-api-source/</a:t>
             </a:r>
             <a:endParaRPr lang="en-US" dirty="0"/>
           </a:p>
@@ -11297,7 +11309,7 @@
                 <a:latin typeface="Consolas" pitchFamily="49" charset="0"/>
                 <a:cs typeface="Consolas" pitchFamily="49" charset="0"/>
               </a:rPr>
-              <a:t>      </a:t>
+              <a:t>    </a:t>
             </a:r>
             <a:r>
               <a:rPr lang="en-US" sz="1200" dirty="0" smtClean="0">
@@ -13865,8 +13877,13 @@
             </a:pPr>
             <a:r>
               <a:rPr lang="nb-NO" sz="1400" dirty="0" smtClean="0"/>
-              <a:t> Oppgave 1</a:t>
-            </a:r>
+              <a:t> </a:t>
+            </a:r>
+            <a:r>
+              <a:rPr lang="nb-NO" sz="1400" dirty="0" smtClean="0"/>
+              <a:t>Oppgave</a:t>
+            </a:r>
+            <a:endParaRPr lang="nb-NO" sz="1400" dirty="0" smtClean="0"/>
           </a:p>
           <a:p>
             <a:pPr>
@@ -13897,8 +13914,13 @@
             </a:pPr>
             <a:r>
               <a:rPr lang="nb-NO" sz="1400" dirty="0" smtClean="0"/>
-              <a:t> Oppgave 2</a:t>
-            </a:r>
+              <a:t> </a:t>
+            </a:r>
+            <a:r>
+              <a:rPr lang="nb-NO" sz="1400" dirty="0" smtClean="0"/>
+              <a:t>Oppgave</a:t>
+            </a:r>
+            <a:endParaRPr lang="nb-NO" sz="1400" dirty="0" smtClean="0"/>
           </a:p>
           <a:p>
             <a:pPr>
@@ -13929,8 +13951,13 @@
             </a:pPr>
             <a:r>
               <a:rPr lang="nb-NO" sz="1400" dirty="0" smtClean="0"/>
-              <a:t> Oppgave 3</a:t>
-            </a:r>
+              <a:t> </a:t>
+            </a:r>
+            <a:r>
+              <a:rPr lang="nb-NO" sz="1400" dirty="0" smtClean="0"/>
+              <a:t>Oppgave</a:t>
+            </a:r>
+            <a:endParaRPr lang="nb-NO" sz="1400" dirty="0" smtClean="0"/>
           </a:p>
         </p:txBody>
       </p:sp>
@@ -14059,11 +14086,7 @@
             </a:r>
             <a:r>
               <a:rPr lang="nb-NO" sz="1400" smtClean="0"/>
-              <a:t>ren </a:t>
-            </a:r>
-            <a:r>
-              <a:rPr lang="nb-NO" sz="1400" smtClean="0"/>
-              <a:t>HTTP i motsetning til over SOAP (.NET WCF)</a:t>
+              <a:t>ren HTTP i motsetning til over SOAP (.NET WCF)</a:t>
             </a:r>
             <a:endParaRPr lang="nb-NO" sz="1400" dirty="0" smtClean="0"/>
           </a:p>
@@ -14150,9 +14173,9 @@
               </a:tblPr>
               <a:tblGrid>
                 <a:gridCol w="1292352"/>
-                <a:gridCol w="4927918"/>
-                <a:gridCol w="748030"/>
-                <a:gridCol w="1303655"/>
+                <a:gridCol w="4991452"/>
+                <a:gridCol w="720969"/>
+                <a:gridCol w="1267182"/>
               </a:tblGrid>
               <a:tr h="370840">
                 <a:tc>
@@ -14470,11 +14493,15 @@
                     <a:p>
                       <a:r>
                         <a:rPr lang="nb-NO" sz="1400" dirty="0" smtClean="0"/>
-                        <a:t>Tilsvarende som GET,</a:t>
+                        <a:t>Tilsvarende som </a:t>
+                      </a:r>
+                      <a:r>
+                        <a:rPr lang="nb-NO" sz="1400" dirty="0" smtClean="0"/>
+                        <a:t>GET,</a:t>
                       </a:r>
                       <a:r>
                         <a:rPr lang="nb-NO" sz="1400" baseline="0" dirty="0" smtClean="0"/>
-                        <a:t> men bare headere og body blir hentet</a:t>
+                        <a:t> ikke krav at meldings-body returneres</a:t>
                       </a:r>
                       <a:endParaRPr lang="en-US" sz="1400" dirty="0"/>
                     </a:p>
@@ -18624,7 +18651,7 @@
                 <a:latin typeface="Consolas" pitchFamily="49" charset="0"/>
                 <a:cs typeface="Consolas" pitchFamily="49" charset="0"/>
               </a:rPr>
-              <a:t>Install-Package Ninject-MVC3</a:t>
+              <a:t>Install-Package Ninject.MVC3</a:t>
             </a:r>
           </a:p>
           <a:p>
@@ -18781,6 +18808,39 @@
               </a:rPr>
               <a:t> </a:t>
             </a:r>
+            <a:r>
+              <a:rPr lang="en-US" sz="1400" dirty="0" smtClean="0">
+                <a:cs typeface="Consolas" pitchFamily="49" charset="0"/>
+              </a:rPr>
+              <a:t>I </a:t>
+            </a:r>
+            <a:r>
+              <a:rPr lang="en-US" sz="1400" dirty="0" err="1" smtClean="0">
+                <a:cs typeface="Consolas" pitchFamily="49" charset="0"/>
+              </a:rPr>
+              <a:t>metoden</a:t>
+            </a:r>
+            <a:r>
+              <a:rPr lang="en-US" sz="1400" dirty="0" smtClean="0">
+                <a:latin typeface="Consolas" pitchFamily="49" charset="0"/>
+                <a:cs typeface="Consolas" pitchFamily="49" charset="0"/>
+              </a:rPr>
+              <a:t> </a:t>
+            </a:r>
+            <a:r>
+              <a:rPr lang="en-US" sz="1400" dirty="0" err="1" smtClean="0">
+                <a:latin typeface="Consolas" pitchFamily="49" charset="0"/>
+                <a:cs typeface="Consolas" pitchFamily="49" charset="0"/>
+              </a:rPr>
+              <a:t>CreateKernel</a:t>
+            </a:r>
+            <a:r>
+              <a:rPr lang="en-US" sz="1400" dirty="0" smtClean="0">
+                <a:latin typeface="Consolas" pitchFamily="49" charset="0"/>
+                <a:cs typeface="Consolas" pitchFamily="49" charset="0"/>
+              </a:rPr>
+              <a:t>()</a:t>
+            </a:r>
             <a:endParaRPr lang="nb-NO" sz="1400" dirty="0" smtClean="0">
               <a:latin typeface="Consolas" pitchFamily="49" charset="0"/>
               <a:cs typeface="Consolas" pitchFamily="49" charset="0"/>
@@ -18790,32 +18850,167 @@
       </p:sp>
       <p:sp>
         <p:nvSpPr>
-          <p:cNvPr id="7" name="Rectangle 6"/>
-          <p:cNvSpPr/>
+          <p:cNvPr id="13313" name="Rectangle 1"/>
+          <p:cNvSpPr>
+            <a:spLocks noChangeArrowheads="1"/>
+          </p:cNvSpPr>
           <p:nvPr/>
         </p:nvSpPr>
-        <p:spPr>
+        <p:spPr bwMode="auto">
           <a:xfrm>
-            <a:off x="1292352" y="6324671"/>
-            <a:ext cx="7675784" cy="307777"/>
+            <a:off x="778933" y="3054826"/>
+            <a:ext cx="7952374" cy="276999"/>
           </a:xfrm>
           <a:prstGeom prst="rect">
             <a:avLst/>
           </a:prstGeom>
+          <a:solidFill>
+            <a:srgbClr val="FFFFFF"/>
+          </a:solidFill>
+          <a:ln w="9525">
+            <a:solidFill>
+              <a:schemeClr val="accent1"/>
+            </a:solidFill>
+            <a:miter lim="800000"/>
+            <a:headEnd/>
+            <a:tailEnd/>
+          </a:ln>
+          <a:effectLst/>
         </p:spPr>
         <p:txBody>
-          <a:bodyPr wrap="square">
+          <a:bodyPr vert="horz" wrap="square" lIns="91440" tIns="45720" rIns="91440" bIns="45720" numCol="1" anchor="ctr" anchorCtr="0" compatLnSpc="1">
+            <a:prstTxWarp prst="textNoShape">
+              <a:avLst/>
+            </a:prstTxWarp>
             <a:spAutoFit/>
           </a:bodyPr>
           <a:lstStyle/>
           <a:p>
-            <a:r>
-              <a:rPr lang="en-US" sz="1400" dirty="0" smtClean="0">
-                <a:hlinkClick r:id="rId3"/>
-              </a:rPr>
-              <a:t>http://www.strathweb.com/2012/05/using-ninject-with-the-latest-asp-net-web-api-source/</a:t>
-            </a:r>
-            <a:endParaRPr lang="en-US" sz="1400" dirty="0"/>
+            <a:pPr marL="0" marR="0" lvl="0" indent="0" algn="l" defTabSz="914400" rtl="0" eaLnBrk="1" fontAlgn="base" latinLnBrk="0" hangingPunct="1">
+              <a:lnSpc>
+                <a:spcPct val="100000"/>
+              </a:lnSpc>
+              <a:spcBef>
+                <a:spcPct val="0"/>
+              </a:spcBef>
+              <a:spcAft>
+                <a:spcPct val="0"/>
+              </a:spcAft>
+              <a:buClrTx/>
+              <a:buSzTx/>
+              <a:buFontTx/>
+              <a:buNone/>
+              <a:tabLst/>
+            </a:pPr>
+            <a:r>
+              <a:rPr kumimoji="0" lang="en-US" sz="1200" b="0" i="0" u="none" strike="noStrike" cap="none" normalizeH="0" baseline="0" dirty="0" err="1" smtClean="0">
+                <a:ln>
+                  <a:noFill/>
+                </a:ln>
+                <a:solidFill>
+                  <a:srgbClr val="2B91AF"/>
+                </a:solidFill>
+                <a:effectLst/>
+                <a:latin typeface="Consolas" pitchFamily="49" charset="0"/>
+                <a:cs typeface="Consolas" pitchFamily="49" charset="0"/>
+              </a:rPr>
+              <a:t>GlobalConfiguration</a:t>
+            </a:r>
+            <a:r>
+              <a:rPr kumimoji="0" lang="en-US" sz="1200" b="0" i="0" u="none" strike="noStrike" cap="none" normalizeH="0" baseline="0" dirty="0" err="1" smtClean="0">
+                <a:ln>
+                  <a:noFill/>
+                </a:ln>
+                <a:solidFill>
+                  <a:srgbClr val="000000"/>
+                </a:solidFill>
+                <a:effectLst/>
+                <a:latin typeface="Consolas" pitchFamily="49" charset="0"/>
+                <a:cs typeface="Consolas" pitchFamily="49" charset="0"/>
+              </a:rPr>
+              <a:t>.Configuration.DependencyResolver</a:t>
+            </a:r>
+            <a:r>
+              <a:rPr kumimoji="0" lang="en-US" sz="1200" b="0" i="0" u="none" strike="noStrike" cap="none" normalizeH="0" baseline="0" dirty="0" smtClean="0">
+                <a:ln>
+                  <a:noFill/>
+                </a:ln>
+                <a:solidFill>
+                  <a:srgbClr val="000000"/>
+                </a:solidFill>
+                <a:effectLst/>
+                <a:latin typeface="Consolas" pitchFamily="49" charset="0"/>
+                <a:cs typeface="Consolas" pitchFamily="49" charset="0"/>
+              </a:rPr>
+              <a:t> = </a:t>
+            </a:r>
+            <a:r>
+              <a:rPr kumimoji="0" lang="en-US" sz="1200" b="0" i="0" u="none" strike="noStrike" cap="none" normalizeH="0" baseline="0" dirty="0" smtClean="0">
+                <a:ln>
+                  <a:noFill/>
+                </a:ln>
+                <a:solidFill>
+                  <a:srgbClr val="0000FF"/>
+                </a:solidFill>
+                <a:effectLst/>
+                <a:latin typeface="Consolas" pitchFamily="49" charset="0"/>
+                <a:cs typeface="Consolas" pitchFamily="49" charset="0"/>
+              </a:rPr>
+              <a:t>new</a:t>
+            </a:r>
+            <a:r>
+              <a:rPr kumimoji="0" lang="en-US" sz="1200" b="0" i="0" u="none" strike="noStrike" cap="none" normalizeH="0" baseline="0" dirty="0" smtClean="0">
+                <a:ln>
+                  <a:noFill/>
+                </a:ln>
+                <a:solidFill>
+                  <a:srgbClr val="000000"/>
+                </a:solidFill>
+                <a:effectLst/>
+                <a:latin typeface="Consolas" pitchFamily="49" charset="0"/>
+                <a:cs typeface="Consolas" pitchFamily="49" charset="0"/>
+              </a:rPr>
+              <a:t> </a:t>
+            </a:r>
+            <a:r>
+              <a:rPr kumimoji="0" lang="en-US" sz="1200" b="0" i="0" u="none" strike="noStrike" cap="none" normalizeH="0" baseline="0" dirty="0" err="1" smtClean="0">
+                <a:ln>
+                  <a:noFill/>
+                </a:ln>
+                <a:solidFill>
+                  <a:srgbClr val="2B91AF"/>
+                </a:solidFill>
+                <a:effectLst/>
+                <a:latin typeface="Consolas" pitchFamily="49" charset="0"/>
+                <a:cs typeface="Consolas" pitchFamily="49" charset="0"/>
+              </a:rPr>
+              <a:t>NinjectResolver</a:t>
+            </a:r>
+            <a:r>
+              <a:rPr kumimoji="0" lang="en-US" sz="1200" b="0" i="0" u="none" strike="noStrike" cap="none" normalizeH="0" baseline="0" dirty="0" smtClean="0">
+                <a:ln>
+                  <a:noFill/>
+                </a:ln>
+                <a:solidFill>
+                  <a:srgbClr val="000000"/>
+                </a:solidFill>
+                <a:effectLst/>
+                <a:latin typeface="Consolas" pitchFamily="49" charset="0"/>
+                <a:cs typeface="Consolas" pitchFamily="49" charset="0"/>
+              </a:rPr>
+              <a:t>(kernel); </a:t>
+            </a:r>
+            <a:endParaRPr kumimoji="0" lang="en-US" sz="1200" b="0" i="0" u="none" strike="noStrike" cap="none" normalizeH="0" baseline="0" dirty="0" smtClean="0">
+              <a:ln>
+                <a:noFill/>
+              </a:ln>
+              <a:solidFill>
+                <a:schemeClr val="tx1"/>
+              </a:solidFill>
+              <a:effectLst/>
+              <a:latin typeface="Arial" pitchFamily="34" charset="0"/>
+              <a:cs typeface="Arial" pitchFamily="34" charset="0"/>
+            </a:endParaRPr>
           </a:p>
         </p:txBody>
       </p:sp>
@@ -18875,7 +19070,7 @@
         <p:spPr>
           <a:xfrm>
             <a:off x="321623" y="418905"/>
-            <a:ext cx="1579920" cy="307777"/>
+            <a:ext cx="1583767" cy="307777"/>
           </a:xfrm>
           <a:solidFill>
             <a:schemeClr val="accent1"/>
@@ -18891,7 +19086,7 @@
                   <a:schemeClr val="bg1"/>
                 </a:solidFill>
               </a:rPr>
-              <a:t>Oppgave 1</a:t>
+              <a:t>OppgaveR</a:t>
             </a:r>
             <a:endParaRPr lang="en-US" dirty="0">
               <a:solidFill>
@@ -18946,7 +19141,7 @@
         <p:spPr>
           <a:xfrm>
             <a:off x="321623" y="1397000"/>
-            <a:ext cx="8102827" cy="4247317"/>
+            <a:ext cx="8102827" cy="4893647"/>
           </a:xfrm>
           <a:prstGeom prst="rect">
             <a:avLst/>
@@ -18966,7 +19161,23 @@
                   <a:schemeClr val="bg1"/>
                 </a:solidFill>
               </a:rPr>
-              <a:t>I denne oppgaven skal vi starte på å lage et lite web API som skal eksponere blogginnlegg. Et blogginnlegg skal minimum ha tittel, innhold og dato for publisering. Start med å opprettet et .NET MVC4 Web Application og velg Web Api. Målet med denne oppgaven er å få til enkel CRUD for blogginnlegg. Vi trenger ikke lagring  i databasen, kun i minne.</a:t>
+              <a:t>I denne oppgaven skal vi starte på å lage et lite web API som skal eksponere blogginnlegg. Et blogginnlegg skal minimum ha tittel, innhold og dato for </a:t>
+            </a:r>
+            <a:r>
+              <a:rPr lang="nb-NO" dirty="0" smtClean="0">
+                <a:solidFill>
+                  <a:schemeClr val="bg1"/>
+                </a:solidFill>
+              </a:rPr>
+              <a:t>publisering. Målet </a:t>
+            </a:r>
+            <a:r>
+              <a:rPr lang="nb-NO" dirty="0" smtClean="0">
+                <a:solidFill>
+                  <a:schemeClr val="bg1"/>
+                </a:solidFill>
+              </a:rPr>
+              <a:t>med denne oppgaven er å få til enkel CRUD for blogginnlegg. Vi trenger ikke lagring  i databasen, kun i minne.</a:t>
             </a:r>
           </a:p>
           <a:p>
@@ -18985,8 +19196,13 @@
                   <a:schemeClr val="bg1"/>
                 </a:solidFill>
               </a:rPr>
-              <a:t>Operasjoner som bør finnes i controlleren</a:t>
-            </a:r>
+              <a:t>Implementèr følgende operasjoner i ApiControlleren:</a:t>
+            </a:r>
+            <a:endParaRPr lang="nb-NO" dirty="0" smtClean="0">
+              <a:solidFill>
+                <a:schemeClr val="bg1"/>
+              </a:solidFill>
+            </a:endParaRPr>
           </a:p>
           <a:p>
             <a:pPr algn="just"/>
@@ -19011,10 +19227,28 @@
                 <a:solidFill>
                   <a:schemeClr val="bg1"/>
                 </a:solidFill>
-                <a:latin typeface="Consolas" pitchFamily="49" charset="0"/>
-                <a:cs typeface="Consolas" pitchFamily="49" charset="0"/>
-              </a:rPr>
-              <a:t>Ienumerable&lt;BlogEntry&gt; Get()</a:t>
+              </a:rPr>
+              <a:t>1. </a:t>
+            </a:r>
+            <a:r>
+              <a:rPr lang="nb-NO" dirty="0" smtClean="0">
+                <a:solidFill>
+                  <a:schemeClr val="bg1"/>
+                </a:solidFill>
+                <a:latin typeface="Consolas" pitchFamily="49" charset="0"/>
+                <a:cs typeface="Consolas" pitchFamily="49" charset="0"/>
+              </a:rPr>
+              <a:t>IEnumerable&lt;BlogEntry</a:t>
+            </a:r>
+            <a:r>
+              <a:rPr lang="nb-NO" dirty="0" smtClean="0">
+                <a:solidFill>
+                  <a:schemeClr val="bg1"/>
+                </a:solidFill>
+                <a:latin typeface="Consolas" pitchFamily="49" charset="0"/>
+                <a:cs typeface="Consolas" pitchFamily="49" charset="0"/>
+              </a:rPr>
+              <a:t>&gt; Get()</a:t>
             </a:r>
           </a:p>
           <a:p>
@@ -19027,7 +19261,35 @@
                 <a:latin typeface="Consolas" pitchFamily="49" charset="0"/>
                 <a:cs typeface="Consolas" pitchFamily="49" charset="0"/>
               </a:rPr>
-              <a:t>	BlogEntry Get(id);</a:t>
+              <a:t>	</a:t>
+            </a:r>
+            <a:r>
+              <a:rPr lang="nb-NO" dirty="0" smtClean="0">
+                <a:solidFill>
+                  <a:schemeClr val="bg1"/>
+                </a:solidFill>
+              </a:rPr>
+              <a:t>2. </a:t>
+            </a:r>
+            <a:r>
+              <a:rPr lang="nb-NO" dirty="0" smtClean="0">
+                <a:solidFill>
+                  <a:schemeClr val="bg1"/>
+                </a:solidFill>
+                <a:latin typeface="Consolas" pitchFamily="49" charset="0"/>
+                <a:cs typeface="Consolas" pitchFamily="49" charset="0"/>
+              </a:rPr>
+              <a:t>BlogEntry </a:t>
+            </a:r>
+            <a:r>
+              <a:rPr lang="nb-NO" dirty="0" smtClean="0">
+                <a:solidFill>
+                  <a:schemeClr val="bg1"/>
+                </a:solidFill>
+                <a:latin typeface="Consolas" pitchFamily="49" charset="0"/>
+                <a:cs typeface="Consolas" pitchFamily="49" charset="0"/>
+              </a:rPr>
+              <a:t>Get(id);</a:t>
             </a:r>
           </a:p>
           <a:p>
@@ -19040,7 +19302,43 @@
                 <a:latin typeface="Consolas" pitchFamily="49" charset="0"/>
                 <a:cs typeface="Consolas" pitchFamily="49" charset="0"/>
               </a:rPr>
-              <a:t>	HttpResponseMessage Post(BlogEntry blogEntry)</a:t>
+              <a:t>	</a:t>
+            </a:r>
+            <a:r>
+              <a:rPr lang="nb-NO" dirty="0" smtClean="0">
+                <a:solidFill>
+                  <a:schemeClr val="bg1"/>
+                </a:solidFill>
+              </a:rPr>
+              <a:t>3</a:t>
+            </a:r>
+            <a:r>
+              <a:rPr lang="nb-NO" dirty="0" smtClean="0">
+                <a:solidFill>
+                  <a:schemeClr val="bg1"/>
+                </a:solidFill>
+              </a:rPr>
+              <a:t>. </a:t>
+            </a:r>
+            <a:r>
+              <a:rPr lang="nb-NO" dirty="0" smtClean="0">
+                <a:solidFill>
+                  <a:schemeClr val="bg1"/>
+                </a:solidFill>
+                <a:latin typeface="Consolas" pitchFamily="49" charset="0"/>
+                <a:cs typeface="Consolas" pitchFamily="49" charset="0"/>
+              </a:rPr>
+              <a:t>HttpResponseMessage </a:t>
+            </a:r>
+            <a:r>
+              <a:rPr lang="nb-NO" dirty="0" smtClean="0">
+                <a:solidFill>
+                  <a:schemeClr val="bg1"/>
+                </a:solidFill>
+                <a:latin typeface="Consolas" pitchFamily="49" charset="0"/>
+                <a:cs typeface="Consolas" pitchFamily="49" charset="0"/>
+              </a:rPr>
+              <a:t>Post(BlogEntry blogEntry)</a:t>
             </a:r>
           </a:p>
           <a:p>
@@ -19053,7 +19351,43 @@
                 <a:latin typeface="Consolas" pitchFamily="49" charset="0"/>
                 <a:cs typeface="Consolas" pitchFamily="49" charset="0"/>
               </a:rPr>
-              <a:t>	HttpResponseMessage Put(int id, BlogEntry blogEntry)</a:t>
+              <a:t>	</a:t>
+            </a:r>
+            <a:r>
+              <a:rPr lang="nb-NO" dirty="0" smtClean="0">
+                <a:solidFill>
+                  <a:schemeClr val="bg1"/>
+                </a:solidFill>
+              </a:rPr>
+              <a:t>4</a:t>
+            </a:r>
+            <a:r>
+              <a:rPr lang="nb-NO" dirty="0" smtClean="0">
+                <a:solidFill>
+                  <a:schemeClr val="bg1"/>
+                </a:solidFill>
+              </a:rPr>
+              <a:t>. </a:t>
+            </a:r>
+            <a:r>
+              <a:rPr lang="nb-NO" dirty="0" smtClean="0">
+                <a:solidFill>
+                  <a:schemeClr val="bg1"/>
+                </a:solidFill>
+                <a:latin typeface="Consolas" pitchFamily="49" charset="0"/>
+                <a:cs typeface="Consolas" pitchFamily="49" charset="0"/>
+              </a:rPr>
+              <a:t>HttpResponseMessage </a:t>
+            </a:r>
+            <a:r>
+              <a:rPr lang="nb-NO" dirty="0" smtClean="0">
+                <a:solidFill>
+                  <a:schemeClr val="bg1"/>
+                </a:solidFill>
+                <a:latin typeface="Consolas" pitchFamily="49" charset="0"/>
+                <a:cs typeface="Consolas" pitchFamily="49" charset="0"/>
+              </a:rPr>
+              <a:t>Put(int id, BlogEntry blogEntry)</a:t>
             </a:r>
           </a:p>
           <a:p>
@@ -19066,7 +19400,43 @@
                 <a:latin typeface="Consolas" pitchFamily="49" charset="0"/>
                 <a:cs typeface="Consolas" pitchFamily="49" charset="0"/>
               </a:rPr>
-              <a:t>	HttpResponseMessage Delete(int id)</a:t>
+              <a:t>	</a:t>
+            </a:r>
+            <a:r>
+              <a:rPr lang="nb-NO" dirty="0" smtClean="0">
+                <a:solidFill>
+                  <a:schemeClr val="bg1"/>
+                </a:solidFill>
+              </a:rPr>
+              <a:t>5</a:t>
+            </a:r>
+            <a:r>
+              <a:rPr lang="nb-NO" dirty="0" smtClean="0">
+                <a:solidFill>
+                  <a:schemeClr val="bg1"/>
+                </a:solidFill>
+              </a:rPr>
+              <a:t>. </a:t>
+            </a:r>
+            <a:r>
+              <a:rPr lang="nb-NO" dirty="0" smtClean="0">
+                <a:solidFill>
+                  <a:schemeClr val="bg1"/>
+                </a:solidFill>
+                <a:latin typeface="Consolas" pitchFamily="49" charset="0"/>
+                <a:cs typeface="Consolas" pitchFamily="49" charset="0"/>
+              </a:rPr>
+              <a:t>HttpResponseMessage </a:t>
+            </a:r>
+            <a:r>
+              <a:rPr lang="nb-NO" dirty="0" smtClean="0">
+                <a:solidFill>
+                  <a:schemeClr val="bg1"/>
+                </a:solidFill>
+                <a:latin typeface="Consolas" pitchFamily="49" charset="0"/>
+                <a:cs typeface="Consolas" pitchFamily="49" charset="0"/>
+              </a:rPr>
+              <a:t>Delete(int id)</a:t>
             </a:r>
           </a:p>
           <a:p>
@@ -19097,6 +19467,56 @@
               </a:rPr>
               <a:t>test-først</a:t>
             </a:r>
+          </a:p>
+          <a:p>
+            <a:pPr algn="just"/>
+            <a:endParaRPr lang="nb-NO" b="1" dirty="0" smtClean="0">
+              <a:solidFill>
+                <a:schemeClr val="bg1"/>
+              </a:solidFill>
+            </a:endParaRPr>
+          </a:p>
+          <a:p>
+            <a:pPr algn="just"/>
+            <a:r>
+              <a:rPr lang="nb-NO" sz="1400" i="1" dirty="0" smtClean="0">
+                <a:solidFill>
+                  <a:schemeClr val="bg1"/>
+                </a:solidFill>
+              </a:rPr>
+              <a:t>Hint #1: Se Ninject_ASP_NET_WEB_API.pdf på http://github.com/bekk/dotnetkurs/webapi</a:t>
+            </a:r>
+            <a:br>
+              <a:rPr lang="nb-NO" sz="1400" i="1" dirty="0" smtClean="0">
+                <a:solidFill>
+                  <a:schemeClr val="bg1"/>
+                </a:solidFill>
+              </a:rPr>
+            </a:br>
+            <a:r>
+              <a:rPr lang="nb-NO" sz="1400" i="1" dirty="0" smtClean="0">
+                <a:solidFill>
+                  <a:schemeClr val="bg1"/>
+                </a:solidFill>
+              </a:rPr>
+              <a:t>Hint   #2:  Bruk Request.CreateResponse for å lage HttpResponseMessage i en ApiController</a:t>
+            </a:r>
+          </a:p>
+          <a:p>
+            <a:pPr algn="just"/>
+            <a:r>
+              <a:rPr lang="nb-NO" sz="1400" i="1" dirty="0" smtClean="0">
+                <a:solidFill>
+                  <a:schemeClr val="bg1"/>
+                </a:solidFill>
+              </a:rPr>
+              <a:t> </a:t>
+            </a:r>
+            <a:endParaRPr lang="nb-NO" sz="1400" i="1" dirty="0" smtClean="0">
+              <a:solidFill>
+                <a:schemeClr val="bg1"/>
+              </a:solidFill>
+            </a:endParaRPr>
           </a:p>
         </p:txBody>
       </p:sp>

</xml_diff>

<commit_message>
Added small adjustments to slidedeck
</commit_message>
<xml_diff>
--- a/webapi/WebAPI.pptx
+++ b/webapi/WebAPI.pptx
@@ -153,7 +153,7 @@
     </p:spTree>
     <p:extLst>
       <p:ext uri="{BB962C8B-B14F-4D97-AF65-F5344CB8AC3E}">
-        <p14:creationId xmlns:p14="http://schemas.microsoft.com/office/powerpoint/2010/main" xmlns="" val="2280443481"/>
+        <p14:creationId xmlns="" xmlns:p14="http://schemas.microsoft.com/office/powerpoint/2010/main" val="2280443481"/>
       </p:ext>
     </p:extLst>
   </p:cSld>
@@ -323,7 +323,7 @@
     </p:spTree>
     <p:extLst>
       <p:ext uri="{BB962C8B-B14F-4D97-AF65-F5344CB8AC3E}">
-        <p14:creationId xmlns:p14="http://schemas.microsoft.com/office/powerpoint/2010/main" xmlns="" val="1996866432"/>
+        <p14:creationId xmlns="" xmlns:p14="http://schemas.microsoft.com/office/powerpoint/2010/main" val="1996866432"/>
       </p:ext>
     </p:extLst>
   </p:cSld>
@@ -562,11 +562,7 @@
             </a:r>
             <a:r>
               <a:rPr lang="nb-NO" baseline="0" dirty="0" smtClean="0"/>
-              <a:t> satt opp </a:t>
-            </a:r>
-            <a:r>
-              <a:rPr lang="nb-NO" baseline="0" dirty="0" smtClean="0"/>
-              <a:t>Ninject</a:t>
+              <a:t> satt opp Ninject</a:t>
             </a:r>
           </a:p>
           <a:p>
@@ -1145,7 +1141,7 @@
     </p:spTree>
     <p:extLst>
       <p:ext uri="{BB962C8B-B14F-4D97-AF65-F5344CB8AC3E}">
-        <p14:creationId xmlns:p14="http://schemas.microsoft.com/office/powerpoint/2010/main" xmlns="" val="1631701370"/>
+        <p14:creationId xmlns="" xmlns:p14="http://schemas.microsoft.com/office/powerpoint/2010/main" val="1631701370"/>
       </p:ext>
     </p:extLst>
   </p:cSld>
@@ -1466,7 +1462,7 @@
     </p:spTree>
     <p:extLst>
       <p:ext uri="{BB962C8B-B14F-4D97-AF65-F5344CB8AC3E}">
-        <p14:creationId xmlns:p14="http://schemas.microsoft.com/office/powerpoint/2010/main" xmlns="" val="2627694574"/>
+        <p14:creationId xmlns="" xmlns:p14="http://schemas.microsoft.com/office/powerpoint/2010/main" val="2627694574"/>
       </p:ext>
     </p:extLst>
   </p:cSld>
@@ -1785,7 +1781,7 @@
     </p:spTree>
     <p:extLst>
       <p:ext uri="{BB962C8B-B14F-4D97-AF65-F5344CB8AC3E}">
-        <p14:creationId xmlns:p14="http://schemas.microsoft.com/office/powerpoint/2010/main" xmlns="" val="2472564093"/>
+        <p14:creationId xmlns="" xmlns:p14="http://schemas.microsoft.com/office/powerpoint/2010/main" val="2472564093"/>
       </p:ext>
     </p:extLst>
   </p:cSld>
@@ -2270,7 +2266,7 @@
     </p:spTree>
     <p:extLst>
       <p:ext uri="{BB962C8B-B14F-4D97-AF65-F5344CB8AC3E}">
-        <p14:creationId xmlns:p14="http://schemas.microsoft.com/office/powerpoint/2010/main" xmlns="" val="844442129"/>
+        <p14:creationId xmlns="" xmlns:p14="http://schemas.microsoft.com/office/powerpoint/2010/main" val="844442129"/>
       </p:ext>
     </p:extLst>
   </p:cSld>
@@ -2600,7 +2596,7 @@
     </p:spTree>
     <p:extLst>
       <p:ext uri="{BB962C8B-B14F-4D97-AF65-F5344CB8AC3E}">
-        <p14:creationId xmlns:p14="http://schemas.microsoft.com/office/powerpoint/2010/main" xmlns="" val="1607786633"/>
+        <p14:creationId xmlns="" xmlns:p14="http://schemas.microsoft.com/office/powerpoint/2010/main" val="1607786633"/>
       </p:ext>
     </p:extLst>
   </p:cSld>
@@ -2930,7 +2926,7 @@
     </p:spTree>
     <p:extLst>
       <p:ext uri="{BB962C8B-B14F-4D97-AF65-F5344CB8AC3E}">
-        <p14:creationId xmlns:p14="http://schemas.microsoft.com/office/powerpoint/2010/main" xmlns="" val="3400319444"/>
+        <p14:creationId xmlns="" xmlns:p14="http://schemas.microsoft.com/office/powerpoint/2010/main" val="3400319444"/>
       </p:ext>
     </p:extLst>
   </p:cSld>
@@ -4800,7 +4796,7 @@
     </p:spTree>
     <p:extLst>
       <p:ext uri="{BB962C8B-B14F-4D97-AF65-F5344CB8AC3E}">
-        <p14:creationId xmlns:p14="http://schemas.microsoft.com/office/powerpoint/2010/main" xmlns="" val="1273682958"/>
+        <p14:creationId xmlns="" xmlns:p14="http://schemas.microsoft.com/office/powerpoint/2010/main" val="1273682958"/>
       </p:ext>
     </p:extLst>
   </p:cSld>
@@ -4905,7 +4901,7 @@
     </p:spTree>
     <p:extLst>
       <p:ext uri="{BB962C8B-B14F-4D97-AF65-F5344CB8AC3E}">
-        <p14:creationId xmlns:p14="http://schemas.microsoft.com/office/powerpoint/2010/main" xmlns="" val="3654216826"/>
+        <p14:creationId xmlns="" xmlns:p14="http://schemas.microsoft.com/office/powerpoint/2010/main" val="3654216826"/>
       </p:ext>
     </p:extLst>
   </p:cSld>
@@ -5161,7 +5157,7 @@
     </p:spTree>
     <p:extLst>
       <p:ext uri="{BB962C8B-B14F-4D97-AF65-F5344CB8AC3E}">
-        <p14:creationId xmlns:p14="http://schemas.microsoft.com/office/powerpoint/2010/main" xmlns="" val="2837040887"/>
+        <p14:creationId xmlns="" xmlns:p14="http://schemas.microsoft.com/office/powerpoint/2010/main" val="2837040887"/>
       </p:ext>
     </p:extLst>
   </p:cSld>
@@ -5194,7 +5190,7 @@
     </p:spTree>
     <p:extLst>
       <p:ext uri="{BB962C8B-B14F-4D97-AF65-F5344CB8AC3E}">
-        <p14:creationId xmlns:p14="http://schemas.microsoft.com/office/powerpoint/2010/main" xmlns="" val="3283581558"/>
+        <p14:creationId xmlns="" xmlns:p14="http://schemas.microsoft.com/office/powerpoint/2010/main" val="3283581558"/>
       </p:ext>
     </p:extLst>
   </p:cSld>
@@ -5508,7 +5504,7 @@
     </p:spTree>
     <p:extLst>
       <p:ext uri="{BB962C8B-B14F-4D97-AF65-F5344CB8AC3E}">
-        <p14:creationId xmlns:p14="http://schemas.microsoft.com/office/powerpoint/2010/main" xmlns="" val="3151533342"/>
+        <p14:creationId xmlns="" xmlns:p14="http://schemas.microsoft.com/office/powerpoint/2010/main" val="3151533342"/>
       </p:ext>
     </p:extLst>
   </p:cSld>
@@ -5651,7 +5647,7 @@
     </p:spTree>
     <p:extLst>
       <p:ext uri="{BB962C8B-B14F-4D97-AF65-F5344CB8AC3E}">
-        <p14:creationId xmlns:p14="http://schemas.microsoft.com/office/powerpoint/2010/main" xmlns="" val="894352273"/>
+        <p14:creationId xmlns="" xmlns:p14="http://schemas.microsoft.com/office/powerpoint/2010/main" val="894352273"/>
       </p:ext>
     </p:extLst>
   </p:cSld>
@@ -5817,7 +5813,7 @@
     </p:spTree>
     <p:extLst>
       <p:ext uri="{BB962C8B-B14F-4D97-AF65-F5344CB8AC3E}">
-        <p14:creationId xmlns:p14="http://schemas.microsoft.com/office/powerpoint/2010/main" xmlns="" val="351067674"/>
+        <p14:creationId xmlns="" xmlns:p14="http://schemas.microsoft.com/office/powerpoint/2010/main" val="351067674"/>
       </p:ext>
     </p:extLst>
   </p:cSld>
@@ -6137,7 +6133,7 @@
     </p:spTree>
     <p:extLst>
       <p:ext uri="{BB962C8B-B14F-4D97-AF65-F5344CB8AC3E}">
-        <p14:creationId xmlns:p14="http://schemas.microsoft.com/office/powerpoint/2010/main" xmlns="" val="3938044995"/>
+        <p14:creationId xmlns="" xmlns:p14="http://schemas.microsoft.com/office/powerpoint/2010/main" val="3938044995"/>
       </p:ext>
     </p:extLst>
   </p:cSld>
@@ -6723,7 +6719,7 @@
     </p:spTree>
     <p:extLst>
       <p:ext uri="{BB962C8B-B14F-4D97-AF65-F5344CB8AC3E}">
-        <p14:creationId xmlns:p14="http://schemas.microsoft.com/office/powerpoint/2010/main" xmlns="" val="3192118728"/>
+        <p14:creationId xmlns="" xmlns:p14="http://schemas.microsoft.com/office/powerpoint/2010/main" val="3192118728"/>
       </p:ext>
     </p:extLst>
   </p:cSld>
@@ -7121,7 +7117,7 @@
     </p:spTree>
     <p:extLst>
       <p:ext uri="{BB962C8B-B14F-4D97-AF65-F5344CB8AC3E}">
-        <p14:creationId xmlns:p14="http://schemas.microsoft.com/office/powerpoint/2010/main" xmlns="" val="2190527855"/>
+        <p14:creationId xmlns="" xmlns:p14="http://schemas.microsoft.com/office/powerpoint/2010/main" val="2190527855"/>
       </p:ext>
     </p:extLst>
   </p:cSld>
@@ -7918,7 +7914,7 @@
     </p:spTree>
     <p:extLst>
       <p:ext uri="{BB962C8B-B14F-4D97-AF65-F5344CB8AC3E}">
-        <p14:creationId xmlns:p14="http://schemas.microsoft.com/office/powerpoint/2010/main" xmlns="" val="69886873"/>
+        <p14:creationId xmlns="" xmlns:p14="http://schemas.microsoft.com/office/powerpoint/2010/main" val="69886873"/>
       </p:ext>
     </p:extLst>
   </p:cSld>
@@ -9009,7 +9005,7 @@
     </p:spTree>
     <p:extLst>
       <p:ext uri="{BB962C8B-B14F-4D97-AF65-F5344CB8AC3E}">
-        <p14:creationId xmlns:p14="http://schemas.microsoft.com/office/powerpoint/2010/main" xmlns="" val="593901232"/>
+        <p14:creationId xmlns="" xmlns:p14="http://schemas.microsoft.com/office/powerpoint/2010/main" val="593901232"/>
       </p:ext>
     </p:extLst>
   </p:cSld>
@@ -9265,7 +9261,7 @@
     </p:spTree>
     <p:extLst>
       <p:ext uri="{BB962C8B-B14F-4D97-AF65-F5344CB8AC3E}">
-        <p14:creationId xmlns:p14="http://schemas.microsoft.com/office/powerpoint/2010/main" xmlns="" val="925662914"/>
+        <p14:creationId xmlns="" xmlns:p14="http://schemas.microsoft.com/office/powerpoint/2010/main" val="925662914"/>
       </p:ext>
     </p:extLst>
   </p:cSld>
@@ -9507,7 +9503,7 @@
     </p:spTree>
     <p:extLst>
       <p:ext uri="{BB962C8B-B14F-4D97-AF65-F5344CB8AC3E}">
-        <p14:creationId xmlns:p14="http://schemas.microsoft.com/office/powerpoint/2010/main" xmlns="" val="2463004899"/>
+        <p14:creationId xmlns="" xmlns:p14="http://schemas.microsoft.com/office/powerpoint/2010/main" val="2463004899"/>
       </p:ext>
     </p:extLst>
   </p:cSld>
@@ -9932,7 +9928,7 @@
     </p:spTree>
     <p:extLst>
       <p:ext uri="{BB962C8B-B14F-4D97-AF65-F5344CB8AC3E}">
-        <p14:creationId xmlns:p14="http://schemas.microsoft.com/office/powerpoint/2010/main" xmlns="" val="1193520387"/>
+        <p14:creationId xmlns="" xmlns:p14="http://schemas.microsoft.com/office/powerpoint/2010/main" val="1193520387"/>
       </p:ext>
     </p:extLst>
   </p:cSld>
@@ -13877,13 +13873,8 @@
             </a:pPr>
             <a:r>
               <a:rPr lang="nb-NO" sz="1400" dirty="0" smtClean="0"/>
-              <a:t> </a:t>
-            </a:r>
-            <a:r>
-              <a:rPr lang="nb-NO" sz="1400" dirty="0" smtClean="0"/>
-              <a:t>Oppgave</a:t>
-            </a:r>
-            <a:endParaRPr lang="nb-NO" sz="1400" dirty="0" smtClean="0"/>
+              <a:t> Oppgave</a:t>
+            </a:r>
           </a:p>
           <a:p>
             <a:pPr>
@@ -13914,13 +13905,8 @@
             </a:pPr>
             <a:r>
               <a:rPr lang="nb-NO" sz="1400" dirty="0" smtClean="0"/>
-              <a:t> </a:t>
-            </a:r>
-            <a:r>
-              <a:rPr lang="nb-NO" sz="1400" dirty="0" smtClean="0"/>
-              <a:t>Oppgave</a:t>
-            </a:r>
-            <a:endParaRPr lang="nb-NO" sz="1400" dirty="0" smtClean="0"/>
+              <a:t> Oppgave</a:t>
+            </a:r>
           </a:p>
           <a:p>
             <a:pPr>
@@ -13951,13 +13937,8 @@
             </a:pPr>
             <a:r>
               <a:rPr lang="nb-NO" sz="1400" dirty="0" smtClean="0"/>
-              <a:t> </a:t>
-            </a:r>
-            <a:r>
-              <a:rPr lang="nb-NO" sz="1400" dirty="0" smtClean="0"/>
-              <a:t>Oppgave</a:t>
-            </a:r>
-            <a:endParaRPr lang="nb-NO" sz="1400" dirty="0" smtClean="0"/>
+              <a:t> Oppgave</a:t>
+            </a:r>
           </a:p>
         </p:txBody>
       </p:sp>
@@ -14493,11 +14474,7 @@
                     <a:p>
                       <a:r>
                         <a:rPr lang="nb-NO" sz="1400" dirty="0" smtClean="0"/>
-                        <a:t>Tilsvarende som </a:t>
-                      </a:r>
-                      <a:r>
-                        <a:rPr lang="nb-NO" sz="1400" dirty="0" smtClean="0"/>
-                        <a:t>GET,</a:t>
+                        <a:t>Tilsvarende som GET,</a:t>
                       </a:r>
                       <a:r>
                         <a:rPr lang="nb-NO" sz="1400" baseline="0" dirty="0" smtClean="0"/>
@@ -14642,6 +14619,13 @@
   <p:transition>
     <p:fade thruBlk="1"/>
   </p:transition>
+  <p:timing>
+    <p:tnLst>
+      <p:par>
+        <p:cTn id="1" dur="indefinite" restart="never" nodeType="tmRoot"/>
+      </p:par>
+    </p:tnLst>
+  </p:timing>
 </p:sld>
 </file>
 
@@ -14764,8 +14748,13 @@
             </a:pPr>
             <a:r>
               <a:rPr lang="nb-NO" sz="1400" dirty="0" smtClean="0"/>
-              <a:t> Del av ASP.NET MVC 4 RC</a:t>
-            </a:r>
+              <a:t> Del av ASP.NET MVC </a:t>
+            </a:r>
+            <a:r>
+              <a:rPr lang="nb-NO" sz="1400" dirty="0" smtClean="0"/>
+              <a:t>4</a:t>
+            </a:r>
+            <a:endParaRPr lang="nb-NO" sz="1400" dirty="0" smtClean="0"/>
           </a:p>
           <a:p>
             <a:pPr>
@@ -19161,23 +19150,7 @@
                   <a:schemeClr val="bg1"/>
                 </a:solidFill>
               </a:rPr>
-              <a:t>I denne oppgaven skal vi starte på å lage et lite web API som skal eksponere blogginnlegg. Et blogginnlegg skal minimum ha tittel, innhold og dato for </a:t>
-            </a:r>
-            <a:r>
-              <a:rPr lang="nb-NO" dirty="0" smtClean="0">
-                <a:solidFill>
-                  <a:schemeClr val="bg1"/>
-                </a:solidFill>
-              </a:rPr>
-              <a:t>publisering. Målet </a:t>
-            </a:r>
-            <a:r>
-              <a:rPr lang="nb-NO" dirty="0" smtClean="0">
-                <a:solidFill>
-                  <a:schemeClr val="bg1"/>
-                </a:solidFill>
-              </a:rPr>
-              <a:t>med denne oppgaven er å få til enkel CRUD for blogginnlegg. Vi trenger ikke lagring  i databasen, kun i minne.</a:t>
+              <a:t>I denne oppgaven skal vi starte på å lage et lite web API som skal eksponere blogginnlegg. Et blogginnlegg skal minimum ha tittel, innhold og dato for publisering. Målet med denne oppgaven er å få til enkel CRUD for blogginnlegg. Vi trenger ikke lagring  i databasen, kun i minne.</a:t>
             </a:r>
           </a:p>
           <a:p>
@@ -19198,11 +19171,6 @@
               </a:rPr>
               <a:t>Implementèr følgende operasjoner i ApiControlleren:</a:t>
             </a:r>
-            <a:endParaRPr lang="nb-NO" dirty="0" smtClean="0">
-              <a:solidFill>
-                <a:schemeClr val="bg1"/>
-              </a:solidFill>
-            </a:endParaRPr>
           </a:p>
           <a:p>
             <a:pPr algn="just"/>
@@ -19220,6 +19188,29 @@
                   <a:schemeClr val="bg1"/>
                 </a:solidFill>
               </a:rPr>
+              <a:t>	1. </a:t>
+            </a:r>
+            <a:r>
+              <a:rPr lang="nb-NO" dirty="0" smtClean="0">
+                <a:solidFill>
+                  <a:schemeClr val="bg1"/>
+                </a:solidFill>
+                <a:latin typeface="Consolas" pitchFamily="49" charset="0"/>
+                <a:cs typeface="Consolas" pitchFamily="49" charset="0"/>
+              </a:rPr>
+              <a:t>IEnumerable&lt;BlogEntry&gt; Get()</a:t>
+            </a:r>
+          </a:p>
+          <a:p>
+            <a:pPr algn="just"/>
+            <a:r>
+              <a:rPr lang="nb-NO" dirty="0" smtClean="0">
+                <a:solidFill>
+                  <a:schemeClr val="bg1"/>
+                </a:solidFill>
+                <a:latin typeface="Consolas" pitchFamily="49" charset="0"/>
+                <a:cs typeface="Consolas" pitchFamily="49" charset="0"/>
+              </a:rPr>
               <a:t>	</a:t>
             </a:r>
             <a:r>
@@ -19228,7 +19219,7 @@
                   <a:schemeClr val="bg1"/>
                 </a:solidFill>
               </a:rPr>
-              <a:t>1. </a:t>
+              <a:t>2. </a:t>
             </a:r>
             <a:r>
               <a:rPr lang="nb-NO" dirty="0" smtClean="0">
@@ -19238,8 +19229,11 @@
                 <a:latin typeface="Consolas" pitchFamily="49" charset="0"/>
                 <a:cs typeface="Consolas" pitchFamily="49" charset="0"/>
               </a:rPr>
-              <a:t>IEnumerable&lt;BlogEntry</a:t>
-            </a:r>
+              <a:t>BlogEntry Get(id);</a:t>
+            </a:r>
+          </a:p>
+          <a:p>
+            <a:pPr algn="just"/>
             <a:r>
               <a:rPr lang="nb-NO" dirty="0" smtClean="0">
                 <a:solidFill>
@@ -19248,7 +19242,25 @@
                 <a:latin typeface="Consolas" pitchFamily="49" charset="0"/>
                 <a:cs typeface="Consolas" pitchFamily="49" charset="0"/>
               </a:rPr>
-              <a:t>&gt; Get()</a:t>
+              <a:t>	</a:t>
+            </a:r>
+            <a:r>
+              <a:rPr lang="nb-NO" dirty="0" smtClean="0">
+                <a:solidFill>
+                  <a:schemeClr val="bg1"/>
+                </a:solidFill>
+              </a:rPr>
+              <a:t>3. </a:t>
+            </a:r>
+            <a:r>
+              <a:rPr lang="nb-NO" dirty="0" smtClean="0">
+                <a:solidFill>
+                  <a:schemeClr val="bg1"/>
+                </a:solidFill>
+                <a:latin typeface="Consolas" pitchFamily="49" charset="0"/>
+                <a:cs typeface="Consolas" pitchFamily="49" charset="0"/>
+              </a:rPr>
+              <a:t>HttpResponseMessage Post(BlogEntry blogEntry)</a:t>
             </a:r>
           </a:p>
           <a:p>
@@ -19269,7 +19281,7 @@
                   <a:schemeClr val="bg1"/>
                 </a:solidFill>
               </a:rPr>
-              <a:t>2. </a:t>
+              <a:t>4. </a:t>
             </a:r>
             <a:r>
               <a:rPr lang="nb-NO" dirty="0" smtClean="0">
@@ -19279,8 +19291,11 @@
                 <a:latin typeface="Consolas" pitchFamily="49" charset="0"/>
                 <a:cs typeface="Consolas" pitchFamily="49" charset="0"/>
               </a:rPr>
-              <a:t>BlogEntry </a:t>
-            </a:r>
+              <a:t>HttpResponseMessage Put(int id, BlogEntry blogEntry)</a:t>
+            </a:r>
+          </a:p>
+          <a:p>
+            <a:pPr algn="just"/>
             <a:r>
               <a:rPr lang="nb-NO" dirty="0" smtClean="0">
                 <a:solidFill>
@@ -19289,154 +19304,25 @@
                 <a:latin typeface="Consolas" pitchFamily="49" charset="0"/>
                 <a:cs typeface="Consolas" pitchFamily="49" charset="0"/>
               </a:rPr>
-              <a:t>Get(id);</a:t>
-            </a:r>
-          </a:p>
-          <a:p>
-            <a:pPr algn="just"/>
+              <a:t>	</a:t>
+            </a:r>
             <a:r>
               <a:rPr lang="nb-NO" dirty="0" smtClean="0">
                 <a:solidFill>
                   <a:schemeClr val="bg1"/>
                 </a:solidFill>
-                <a:latin typeface="Consolas" pitchFamily="49" charset="0"/>
-                <a:cs typeface="Consolas" pitchFamily="49" charset="0"/>
-              </a:rPr>
-              <a:t>	</a:t>
+              </a:rPr>
+              <a:t>5. </a:t>
             </a:r>
             <a:r>
               <a:rPr lang="nb-NO" dirty="0" smtClean="0">
                 <a:solidFill>
                   <a:schemeClr val="bg1"/>
                 </a:solidFill>
-              </a:rPr>
-              <a:t>3</a:t>
-            </a:r>
-            <a:r>
-              <a:rPr lang="nb-NO" dirty="0" smtClean="0">
-                <a:solidFill>
-                  <a:schemeClr val="bg1"/>
-                </a:solidFill>
-              </a:rPr>
-              <a:t>. </a:t>
-            </a:r>
-            <a:r>
-              <a:rPr lang="nb-NO" dirty="0" smtClean="0">
-                <a:solidFill>
-                  <a:schemeClr val="bg1"/>
-                </a:solidFill>
-                <a:latin typeface="Consolas" pitchFamily="49" charset="0"/>
-                <a:cs typeface="Consolas" pitchFamily="49" charset="0"/>
-              </a:rPr>
-              <a:t>HttpResponseMessage </a:t>
-            </a:r>
-            <a:r>
-              <a:rPr lang="nb-NO" dirty="0" smtClean="0">
-                <a:solidFill>
-                  <a:schemeClr val="bg1"/>
-                </a:solidFill>
-                <a:latin typeface="Consolas" pitchFamily="49" charset="0"/>
-                <a:cs typeface="Consolas" pitchFamily="49" charset="0"/>
-              </a:rPr>
-              <a:t>Post(BlogEntry blogEntry)</a:t>
-            </a:r>
-          </a:p>
-          <a:p>
-            <a:pPr algn="just"/>
-            <a:r>
-              <a:rPr lang="nb-NO" dirty="0" smtClean="0">
-                <a:solidFill>
-                  <a:schemeClr val="bg1"/>
-                </a:solidFill>
-                <a:latin typeface="Consolas" pitchFamily="49" charset="0"/>
-                <a:cs typeface="Consolas" pitchFamily="49" charset="0"/>
-              </a:rPr>
-              <a:t>	</a:t>
-            </a:r>
-            <a:r>
-              <a:rPr lang="nb-NO" dirty="0" smtClean="0">
-                <a:solidFill>
-                  <a:schemeClr val="bg1"/>
-                </a:solidFill>
-              </a:rPr>
-              <a:t>4</a:t>
-            </a:r>
-            <a:r>
-              <a:rPr lang="nb-NO" dirty="0" smtClean="0">
-                <a:solidFill>
-                  <a:schemeClr val="bg1"/>
-                </a:solidFill>
-              </a:rPr>
-              <a:t>. </a:t>
-            </a:r>
-            <a:r>
-              <a:rPr lang="nb-NO" dirty="0" smtClean="0">
-                <a:solidFill>
-                  <a:schemeClr val="bg1"/>
-                </a:solidFill>
-                <a:latin typeface="Consolas" pitchFamily="49" charset="0"/>
-                <a:cs typeface="Consolas" pitchFamily="49" charset="0"/>
-              </a:rPr>
-              <a:t>HttpResponseMessage </a:t>
-            </a:r>
-            <a:r>
-              <a:rPr lang="nb-NO" dirty="0" smtClean="0">
-                <a:solidFill>
-                  <a:schemeClr val="bg1"/>
-                </a:solidFill>
-                <a:latin typeface="Consolas" pitchFamily="49" charset="0"/>
-                <a:cs typeface="Consolas" pitchFamily="49" charset="0"/>
-              </a:rPr>
-              <a:t>Put(int id, BlogEntry blogEntry)</a:t>
-            </a:r>
-          </a:p>
-          <a:p>
-            <a:pPr algn="just"/>
-            <a:r>
-              <a:rPr lang="nb-NO" dirty="0" smtClean="0">
-                <a:solidFill>
-                  <a:schemeClr val="bg1"/>
-                </a:solidFill>
-                <a:latin typeface="Consolas" pitchFamily="49" charset="0"/>
-                <a:cs typeface="Consolas" pitchFamily="49" charset="0"/>
-              </a:rPr>
-              <a:t>	</a:t>
-            </a:r>
-            <a:r>
-              <a:rPr lang="nb-NO" dirty="0" smtClean="0">
-                <a:solidFill>
-                  <a:schemeClr val="bg1"/>
-                </a:solidFill>
-              </a:rPr>
-              <a:t>5</a:t>
-            </a:r>
-            <a:r>
-              <a:rPr lang="nb-NO" dirty="0" smtClean="0">
-                <a:solidFill>
-                  <a:schemeClr val="bg1"/>
-                </a:solidFill>
-              </a:rPr>
-              <a:t>. </a:t>
-            </a:r>
-            <a:r>
-              <a:rPr lang="nb-NO" dirty="0" smtClean="0">
-                <a:solidFill>
-                  <a:schemeClr val="bg1"/>
-                </a:solidFill>
-                <a:latin typeface="Consolas" pitchFamily="49" charset="0"/>
-                <a:cs typeface="Consolas" pitchFamily="49" charset="0"/>
-              </a:rPr>
-              <a:t>HttpResponseMessage </a:t>
-            </a:r>
-            <a:r>
-              <a:rPr lang="nb-NO" dirty="0" smtClean="0">
-                <a:solidFill>
-                  <a:schemeClr val="bg1"/>
-                </a:solidFill>
-                <a:latin typeface="Consolas" pitchFamily="49" charset="0"/>
-                <a:cs typeface="Consolas" pitchFamily="49" charset="0"/>
-              </a:rPr>
-              <a:t>Delete(int id)</a:t>
+                <a:latin typeface="Consolas" pitchFamily="49" charset="0"/>
+                <a:cs typeface="Consolas" pitchFamily="49" charset="0"/>
+              </a:rPr>
+              <a:t>HttpResponseMessage Delete(int id)</a:t>
             </a:r>
           </a:p>
           <a:p>
@@ -19512,11 +19398,6 @@
               </a:rPr>
               <a:t> </a:t>
             </a:r>
-            <a:endParaRPr lang="nb-NO" sz="1400" i="1" dirty="0" smtClean="0">
-              <a:solidFill>
-                <a:schemeClr val="bg1"/>
-              </a:solidFill>
-            </a:endParaRPr>
           </a:p>
         </p:txBody>
       </p:sp>

</xml_diff>

<commit_message>
Oppdatert slide om eksempel api
</commit_message>
<xml_diff>
--- a/webapi/WebAPI.pptx
+++ b/webapi/WebAPI.pptx
@@ -498,12 +498,7 @@
             <p:ph type="sldImg"/>
           </p:nvPr>
         </p:nvSpPr>
-        <p:spPr>
-          <a:xfrm>
-            <a:off x="827088" y="592138"/>
-            <a:ext cx="5226050" cy="3919537"/>
-          </a:xfrm>
-        </p:spPr>
+        <p:spPr/>
       </p:sp>
       <p:sp>
         <p:nvSpPr>
@@ -517,37 +512,17 @@
         </p:nvSpPr>
         <p:spPr/>
         <p:txBody>
-          <a:bodyPr>
-            <a:normAutofit/>
-          </a:bodyPr>
+          <a:bodyPr/>
           <a:lstStyle/>
           <a:p>
-            <a:pPr>
-              <a:buFontTx/>
-              <a:buChar char="-"/>
-            </a:pPr>
-            <a:r>
-              <a:rPr lang="nb-NO" sz="1600" dirty="0" smtClean="0"/>
-              <a:t>i stedet for formelle kontrakter som SOAP eller WS*</a:t>
-            </a:r>
-          </a:p>
-          <a:p>
-            <a:pPr>
-              <a:buFontTx/>
-              <a:buChar char="-"/>
-            </a:pPr>
-            <a:r>
-              <a:rPr lang="nb-NO" sz="1600" dirty="0" smtClean="0"/>
-              <a:t>Muliggjør tilgjengeligjøring av funksjonalitet for en rekke forskjellige enheter og klient platformer</a:t>
-            </a:r>
-            <a:endParaRPr lang="en-US" dirty="0"/>
+            <a:endParaRPr lang="nb-NO" dirty="0"/>
           </a:p>
         </p:txBody>
       </p:sp>
     </p:spTree>
     <p:extLst>
       <p:ext uri="{BB962C8B-B14F-4D97-AF65-F5344CB8AC3E}">
-        <p14:creationId xmlns:p14="http://schemas.microsoft.com/office/powerpoint/2010/main" val="4173042921"/>
+        <p14:creationId xmlns:p14="http://schemas.microsoft.com/office/powerpoint/2010/main" val="946004330"/>
       </p:ext>
     </p:extLst>
   </p:cSld>
@@ -603,34 +578,37 @@
         </p:nvSpPr>
         <p:spPr/>
         <p:txBody>
-          <a:bodyPr/>
+          <a:bodyPr>
+            <a:normAutofit/>
+          </a:bodyPr>
           <a:lstStyle/>
           <a:p>
-            <a:r>
-              <a:rPr lang="nb-NO" dirty="0" smtClean="0"/>
-              <a:t>Hvordan</a:t>
-            </a:r>
-            <a:r>
-              <a:rPr lang="nb-NO" baseline="0" dirty="0" smtClean="0"/>
-              <a:t> det kanskje kunne ha sett ut:</a:t>
-            </a:r>
-          </a:p>
-          <a:p>
-            <a:endParaRPr lang="nb-NO" baseline="0" dirty="0" smtClean="0"/>
-          </a:p>
-          <a:p>
-            <a:r>
-              <a:rPr lang="nb-NO" dirty="0" smtClean="0"/>
-              <a:t>flydata.avinor.no/flyplasser/osl/avganger</a:t>
-            </a:r>
-            <a:endParaRPr lang="nb-NO" dirty="0"/>
+            <a:pPr>
+              <a:buFontTx/>
+              <a:buChar char="-"/>
+            </a:pPr>
+            <a:r>
+              <a:rPr lang="nb-NO" sz="1600" dirty="0" smtClean="0"/>
+              <a:t>i stedet for formelle kontrakter som SOAP eller WS*</a:t>
+            </a:r>
+          </a:p>
+          <a:p>
+            <a:pPr>
+              <a:buFontTx/>
+              <a:buChar char="-"/>
+            </a:pPr>
+            <a:r>
+              <a:rPr lang="nb-NO" sz="1600" dirty="0" smtClean="0"/>
+              <a:t>Muliggjør tilgjengeligjøring av funksjonalitet for en rekke forskjellige enheter og klient platformer</a:t>
+            </a:r>
+            <a:endParaRPr lang="en-US" dirty="0"/>
           </a:p>
         </p:txBody>
       </p:sp>
     </p:spTree>
     <p:extLst>
       <p:ext uri="{BB962C8B-B14F-4D97-AF65-F5344CB8AC3E}">
-        <p14:creationId xmlns:p14="http://schemas.microsoft.com/office/powerpoint/2010/main" val="2090476968"/>
+        <p14:creationId xmlns:p14="http://schemas.microsoft.com/office/powerpoint/2010/main" val="4173042921"/>
       </p:ext>
     </p:extLst>
   </p:cSld>
@@ -686,35 +664,44 @@
         </p:nvSpPr>
         <p:spPr/>
         <p:txBody>
-          <a:bodyPr>
-            <a:normAutofit/>
-          </a:bodyPr>
+          <a:bodyPr/>
           <a:lstStyle/>
           <a:p>
             <a:r>
               <a:rPr lang="nb-NO" dirty="0" smtClean="0"/>
-              <a:t>Vis demo av hvordan man får</a:t>
+              <a:t>Hvordan</a:t>
             </a:r>
             <a:r>
               <a:rPr lang="nb-NO" baseline="0" dirty="0" smtClean="0"/>
-              <a:t> satt opp Ninject</a:t>
-            </a:r>
-          </a:p>
-          <a:p>
-            <a:r>
-              <a:rPr lang="en-US" sz="1600" dirty="0" smtClean="0">
-                <a:hlinkClick r:id="rId3"/>
-              </a:rPr>
-              <a:t>http://www.strathweb.com/2012/05/using-ninject-with-the-latest-asp-net-web-api-source/</a:t>
-            </a:r>
-            <a:endParaRPr lang="en-US" dirty="0"/>
+              <a:t> det kanskje kunne ha sett ut</a:t>
+            </a:r>
+            <a:r>
+              <a:rPr lang="nb-NO" baseline="0" dirty="0" smtClean="0"/>
+              <a:t>:</a:t>
+            </a:r>
+          </a:p>
+          <a:p>
+            <a:endParaRPr lang="nb-NO" baseline="0" dirty="0" smtClean="0"/>
+          </a:p>
+          <a:p>
+            <a:r>
+              <a:rPr lang="nb-NO" baseline="0" dirty="0" smtClean="0"/>
+              <a:t>Hver enkelt url kalles en RESSURS</a:t>
+            </a:r>
+          </a:p>
+          <a:p>
+            <a:r>
+              <a:rPr lang="nb-NO" baseline="0" dirty="0" smtClean="0"/>
+              <a:t>Man kan utføre operasjoner på en ressurs ved å bruke de ulike HTTP verbene</a:t>
+            </a:r>
+            <a:endParaRPr lang="nb-NO" baseline="0" dirty="0" smtClean="0"/>
           </a:p>
         </p:txBody>
       </p:sp>
     </p:spTree>
     <p:extLst>
       <p:ext uri="{BB962C8B-B14F-4D97-AF65-F5344CB8AC3E}">
-        <p14:creationId xmlns:p14="http://schemas.microsoft.com/office/powerpoint/2010/main" val="598944534"/>
+        <p14:creationId xmlns:p14="http://schemas.microsoft.com/office/powerpoint/2010/main" val="2090476968"/>
       </p:ext>
     </p:extLst>
   </p:cSld>
@@ -776,6 +763,90 @@
           <a:lstStyle/>
           <a:p>
             <a:r>
+              <a:rPr lang="nb-NO" dirty="0" smtClean="0"/>
+              <a:t>Vis demo av hvordan man får</a:t>
+            </a:r>
+            <a:r>
+              <a:rPr lang="nb-NO" baseline="0" dirty="0" smtClean="0"/>
+              <a:t> satt opp Ninject</a:t>
+            </a:r>
+          </a:p>
+          <a:p>
+            <a:r>
+              <a:rPr lang="en-US" sz="1600" dirty="0" smtClean="0">
+                <a:hlinkClick r:id="rId3"/>
+              </a:rPr>
+              <a:t>http://www.strathweb.com/2012/05/using-ninject-with-the-latest-asp-net-web-api-source/</a:t>
+            </a:r>
+            <a:endParaRPr lang="en-US" dirty="0"/>
+          </a:p>
+        </p:txBody>
+      </p:sp>
+    </p:spTree>
+    <p:extLst>
+      <p:ext uri="{BB962C8B-B14F-4D97-AF65-F5344CB8AC3E}">
+        <p14:creationId xmlns:p14="http://schemas.microsoft.com/office/powerpoint/2010/main" val="598944534"/>
+      </p:ext>
+    </p:extLst>
+  </p:cSld>
+  <p:clrMapOvr>
+    <a:masterClrMapping/>
+  </p:clrMapOvr>
+</p:notes>
+</file>
+
+<file path=ppt/notesSlides/notesSlide5.xml><?xml version="1.0" encoding="utf-8"?>
+<p:notes xmlns:a="http://schemas.openxmlformats.org/drawingml/2006/main" xmlns:r="http://schemas.openxmlformats.org/officeDocument/2006/relationships" xmlns:p="http://schemas.openxmlformats.org/presentationml/2006/main">
+  <p:cSld>
+    <p:spTree>
+      <p:nvGrpSpPr>
+        <p:cNvPr id="1" name=""/>
+        <p:cNvGrpSpPr/>
+        <p:nvPr/>
+      </p:nvGrpSpPr>
+      <p:grpSpPr>
+        <a:xfrm>
+          <a:off x="0" y="0"/>
+          <a:ext cx="0" cy="0"/>
+          <a:chOff x="0" y="0"/>
+          <a:chExt cx="0" cy="0"/>
+        </a:xfrm>
+      </p:grpSpPr>
+      <p:sp>
+        <p:nvSpPr>
+          <p:cNvPr id="2" name="Slide Image Placeholder 1"/>
+          <p:cNvSpPr>
+            <a:spLocks noGrp="1" noRot="1" noChangeAspect="1"/>
+          </p:cNvSpPr>
+          <p:nvPr>
+            <p:ph type="sldImg"/>
+          </p:nvPr>
+        </p:nvSpPr>
+        <p:spPr>
+          <a:xfrm>
+            <a:off x="827088" y="592138"/>
+            <a:ext cx="5226050" cy="3919537"/>
+          </a:xfrm>
+        </p:spPr>
+      </p:sp>
+      <p:sp>
+        <p:nvSpPr>
+          <p:cNvPr id="3" name="Notes Placeholder 2"/>
+          <p:cNvSpPr>
+            <a:spLocks noGrp="1"/>
+          </p:cNvSpPr>
+          <p:nvPr>
+            <p:ph type="body" idx="1"/>
+          </p:nvPr>
+        </p:nvSpPr>
+        <p:spPr/>
+        <p:txBody>
+          <a:bodyPr>
+            <a:normAutofit/>
+          </a:bodyPr>
+          <a:lstStyle/>
+          <a:p>
+            <a:r>
               <a:rPr lang="en-US" dirty="0" smtClean="0">
                 <a:hlinkClick r:id="rId3"/>
               </a:rPr>
@@ -798,7 +869,7 @@
 </p:notes>
 </file>
 
-<file path=ppt/notesSlides/notesSlide5.xml><?xml version="1.0" encoding="utf-8"?>
+<file path=ppt/notesSlides/notesSlide6.xml><?xml version="1.0" encoding="utf-8"?>
 <p:notes xmlns:a="http://schemas.openxmlformats.org/drawingml/2006/main" xmlns:r="http://schemas.openxmlformats.org/officeDocument/2006/relationships" xmlns:p="http://schemas.openxmlformats.org/presentationml/2006/main">
   <p:cSld>
     <p:spTree>
@@ -11565,7 +11636,7 @@
               <a:buChar char="ü"/>
             </a:pPr>
             <a:r>
-              <a:rPr lang="nb-NO" sz="1400" smtClean="0"/>
+              <a:rPr lang="nb-NO" sz="1400" dirty="0" smtClean="0"/>
               <a:t>Oppgave 2</a:t>
             </a:r>
             <a:endParaRPr lang="nb-NO" sz="1400" dirty="0" smtClean="0"/>
@@ -12415,8 +12486,8 @@
         </p:nvSpPr>
         <p:spPr>
           <a:xfrm>
-            <a:off x="1045778" y="2782669"/>
-            <a:ext cx="7378672" cy="923330"/>
+            <a:off x="588578" y="1019183"/>
+            <a:ext cx="7378672" cy="4247317"/>
           </a:xfrm>
           <a:prstGeom prst="rect">
             <a:avLst/>
@@ -12429,21 +12500,82 @@
           <a:lstStyle/>
           <a:p>
             <a:r>
-              <a:rPr lang="nb-NO" dirty="0" smtClean="0">
-                <a:hlinkClick r:id="rId3"/>
-              </a:rPr>
-              <a:t>Avinor flyplassdata</a:t>
-            </a:r>
+              <a:rPr lang="nb-NO" b="1" dirty="0" smtClean="0"/>
+              <a:t>Hent alle bloggposter på blogg</a:t>
+            </a:r>
+            <a:endParaRPr lang="nb-NO" b="1" dirty="0"/>
+          </a:p>
+          <a:p>
+            <a:r>
+              <a:rPr lang="nb-NO" dirty="0" smtClean="0"/>
+              <a:t>GET – minblogg.no/api/bloggposter</a:t>
+            </a:r>
+            <a:endParaRPr lang="nb-NO" dirty="0"/>
+          </a:p>
+          <a:p>
             <a:endParaRPr lang="nb-NO" dirty="0" smtClean="0"/>
           </a:p>
           <a:p>
+            <a:r>
+              <a:rPr lang="nb-NO" b="1" dirty="0" smtClean="0"/>
+              <a:t>Lag ny bloggpost</a:t>
+            </a:r>
+          </a:p>
+          <a:p>
+            <a:r>
+              <a:rPr lang="nb-NO" dirty="0" smtClean="0"/>
+              <a:t>POST {Id: 1, Tittel: Lær deg WebApi} – minblogg.no/api/bloggposter</a:t>
+            </a:r>
+          </a:p>
+          <a:p>
+            <a:endParaRPr lang="nb-NO" dirty="0" smtClean="0"/>
+          </a:p>
+          <a:p>
+            <a:r>
+              <a:rPr lang="nb-NO" b="1" dirty="0" smtClean="0"/>
+              <a:t>Hent alle kommentarer for bloggpost</a:t>
+            </a:r>
+            <a:endParaRPr lang="nb-NO" b="1" dirty="0"/>
+          </a:p>
+          <a:p>
+            <a:r>
+              <a:rPr lang="nb-NO" dirty="0" smtClean="0"/>
+              <a:t>GET – minblogg.no/api/bloggposter/1/kommentarer</a:t>
+            </a:r>
+          </a:p>
+          <a:p>
             <a:endParaRPr lang="nb-NO" dirty="0"/>
           </a:p>
           <a:p>
             <a:r>
-              <a:rPr lang="nb-NO" dirty="0" smtClean="0"/>
-              <a:t>Samme adresse, men forskjellig verb gir ulik oppførsel</a:t>
-            </a:r>
+              <a:rPr lang="nb-NO" b="1" dirty="0" smtClean="0"/>
+              <a:t>Endre tittel på bloggpost</a:t>
+            </a:r>
+          </a:p>
+          <a:p>
+            <a:r>
+              <a:rPr lang="nb-NO" dirty="0" smtClean="0"/>
+              <a:t>PUT {Tittel: WebApi er gøy} – minblogg.no/api/bloggposter/1</a:t>
+            </a:r>
+          </a:p>
+          <a:p>
+            <a:endParaRPr lang="nb-NO" dirty="0" smtClean="0"/>
+          </a:p>
+          <a:p>
+            <a:r>
+              <a:rPr lang="nb-NO" b="1" dirty="0" smtClean="0"/>
+              <a:t>Slett bloggpost</a:t>
+            </a:r>
+            <a:endParaRPr lang="nb-NO" b="1" dirty="0"/>
+          </a:p>
+          <a:p>
+            <a:r>
+              <a:rPr lang="nb-NO" dirty="0" smtClean="0"/>
+              <a:t>DELETE – minblogg.no/api/bloggposter/1</a:t>
+            </a:r>
+            <a:endParaRPr lang="nb-NO" dirty="0" smtClean="0"/>
+          </a:p>
+          <a:p>
             <a:endParaRPr lang="nb-NO" dirty="0"/>
           </a:p>
         </p:txBody>

</xml_diff>

<commit_message>
Oppdaterte web api slides
</commit_message>
<xml_diff>
--- a/webapi/WebAPI.pptx
+++ b/webapi/WebAPI.pptx
@@ -20,8 +20,8 @@
     <p:sldId id="271" r:id="rId8"/>
     <p:sldId id="273" r:id="rId9"/>
     <p:sldId id="274" r:id="rId10"/>
-    <p:sldId id="270" r:id="rId11"/>
-    <p:sldId id="275" r:id="rId12"/>
+    <p:sldId id="275" r:id="rId11"/>
+    <p:sldId id="270" r:id="rId12"/>
     <p:sldId id="294" r:id="rId13"/>
     <p:sldId id="290" r:id="rId14"/>
     <p:sldId id="269" r:id="rId15"/>
@@ -128,7 +128,7 @@
   </p:defaultTextStyle>
   <p:extLst>
     <p:ext uri="{EFAFB233-063F-42B5-8137-9DF3F51BA10A}">
-      <p15:sldGuideLst xmlns="" xmlns:p15="http://schemas.microsoft.com/office/powerpoint/2012/main">
+      <p15:sldGuideLst xmlns:p15="http://schemas.microsoft.com/office/powerpoint/2012/main" xmlns="">
         <p15:guide id="1" orient="horz" pos="4196">
           <p15:clr>
             <a:srgbClr val="A4A3A4"/>
@@ -162,7 +162,7 @@
       </p15:sldGuideLst>
     </p:ext>
     <p:ext uri="{2D200454-40CA-4A62-9FC3-DE9A4176ACB9}">
-      <p15:notesGuideLst xmlns="" xmlns:p15="http://schemas.microsoft.com/office/powerpoint/2012/main">
+      <p15:notesGuideLst xmlns:p15="http://schemas.microsoft.com/office/powerpoint/2012/main" xmlns="">
         <p15:guide id="1" orient="horz" pos="2880">
           <p15:clr>
             <a:srgbClr val="A4A3A4"/>
@@ -530,7 +530,15 @@
             </a:r>
             <a:r>
               <a:rPr lang="nb-NO" baseline="0" dirty="0" smtClean="0"/>
-              <a:t> arkitekturstil eller rettningslinjer for hvordan lage HTTP-baserte tjenester</a:t>
+              <a:t> </a:t>
+            </a:r>
+            <a:r>
+              <a:rPr lang="nb-NO" baseline="0" dirty="0" smtClean="0"/>
+              <a:t>en arkitekturstil </a:t>
+            </a:r>
+            <a:r>
+              <a:rPr lang="nb-NO" baseline="0" dirty="0" smtClean="0"/>
+              <a:t>eller rettningslinjer for hvordan lage HTTP-baserte tjenester</a:t>
             </a:r>
           </a:p>
           <a:p>
@@ -613,19 +621,47 @@
           <a:bodyPr/>
           <a:lstStyle/>
           <a:p>
-            <a:r>
-              <a:rPr lang="nb-NO" dirty="0" smtClean="0"/>
-              <a:t>Et alternativ til konvensjonsbasert routing, men man kan bruke begge deler</a:t>
-            </a:r>
-          </a:p>
-          <a:p>
-            <a:r>
-              <a:rPr lang="nb-NO" dirty="0" smtClean="0"/>
-              <a:t>Spesielt</a:t>
+            <a:pPr marL="285750" indent="-285750">
+              <a:buFontTx/>
+              <a:buChar char="-"/>
+            </a:pPr>
+            <a:r>
+              <a:rPr lang="nb-NO" dirty="0" smtClean="0"/>
+              <a:t>Web API har to måter å gjøre ruting på. Den ene er konvensjonsbasert og den andre er attributtbasert</a:t>
+            </a:r>
+          </a:p>
+          <a:p>
+            <a:pPr marL="285750" indent="-285750">
+              <a:buFontTx/>
+              <a:buChar char="-"/>
+            </a:pPr>
+            <a:r>
+              <a:rPr lang="nb-NO" dirty="0" smtClean="0"/>
+              <a:t>Konvensjonsbasert</a:t>
             </a:r>
             <a:r>
               <a:rPr lang="nb-NO" baseline="0" dirty="0" smtClean="0"/>
-              <a:t> kjekt å bruke for å lage ruter for sub-ressurser som f.eks. Kommentarer i dette eksemplet</a:t>
+              <a:t> fungerer på samme måte som i ASP .NET MVC</a:t>
+            </a:r>
+          </a:p>
+          <a:p>
+            <a:pPr marL="285750" indent="-285750">
+              <a:buFontTx/>
+              <a:buChar char="-"/>
+            </a:pPr>
+            <a:r>
+              <a:rPr lang="nb-NO" baseline="0" dirty="0" smtClean="0"/>
+              <a:t>Man lager en route-template som med variabler som kan variere. I eksemplet er det en variabel for «controller» og for «id».</a:t>
+            </a:r>
+          </a:p>
+          <a:p>
+            <a:pPr marL="285750" indent="-285750">
+              <a:buFontTx/>
+              <a:buChar char="-"/>
+            </a:pPr>
+            <a:r>
+              <a:rPr lang="nb-NO" baseline="0" dirty="0" smtClean="0"/>
+              <a:t>Hvis det finnes en controller med et navn som matcher ruten (PersonsController) så vil systemet prøve å finne en metode i kontrolleren som støtter HTTP-verbet som benyttes og som tar inn en integer. Hvis ikke returneres en 404.</a:t>
             </a:r>
             <a:endParaRPr lang="nb-NO" dirty="0"/>
           </a:p>
@@ -634,7 +670,7 @@
     </p:spTree>
     <p:extLst>
       <p:ext uri="{BB962C8B-B14F-4D97-AF65-F5344CB8AC3E}">
-        <p14:creationId xmlns:p14="http://schemas.microsoft.com/office/powerpoint/2010/main" val="473714596"/>
+        <p14:creationId xmlns:p14="http://schemas.microsoft.com/office/powerpoint/2010/main" val="4166449398"/>
       </p:ext>
     </p:extLst>
   </p:cSld>
@@ -695,22 +731,17 @@
           <a:p>
             <a:r>
               <a:rPr lang="nb-NO" dirty="0" smtClean="0"/>
-              <a:t>Hvis man bare returnerer noe fra en metode vil man gi HTTP</a:t>
+              <a:t>Et alternativ til konvensjonsbasert routing, men man kan bruke begge deler</a:t>
+            </a:r>
+          </a:p>
+          <a:p>
+            <a:r>
+              <a:rPr lang="nb-NO" dirty="0" smtClean="0"/>
+              <a:t>Spesielt</a:t>
             </a:r>
             <a:r>
               <a:rPr lang="nb-NO" baseline="0" dirty="0" smtClean="0"/>
-              <a:t> statuskode 200 tilbake til klienten.</a:t>
-            </a:r>
-            <a:endParaRPr lang="nb-NO" dirty="0" smtClean="0"/>
-          </a:p>
-          <a:p>
-            <a:r>
-              <a:rPr lang="nb-NO" dirty="0" smtClean="0"/>
-              <a:t>For</a:t>
-            </a:r>
-            <a:r>
-              <a:rPr lang="nb-NO" baseline="0" dirty="0" smtClean="0"/>
-              <a:t> å si fra til klienten at noe galt skjedde bruker man typisk en HttpResponseException og angir en passende HTTP-statuskode</a:t>
+              <a:t> kjekt å bruke for å lage ruter for sub-ressurser som f.eks. Kommentarer i dette eksemplet</a:t>
             </a:r>
             <a:endParaRPr lang="nb-NO" dirty="0"/>
           </a:p>
@@ -719,7 +750,7 @@
     </p:spTree>
     <p:extLst>
       <p:ext uri="{BB962C8B-B14F-4D97-AF65-F5344CB8AC3E}">
-        <p14:creationId xmlns:p14="http://schemas.microsoft.com/office/powerpoint/2010/main" val="503856267"/>
+        <p14:creationId xmlns:p14="http://schemas.microsoft.com/office/powerpoint/2010/main" val="473714596"/>
       </p:ext>
     </p:extLst>
   </p:cSld>
@@ -775,6 +806,91 @@
         </p:nvSpPr>
         <p:spPr/>
         <p:txBody>
+          <a:bodyPr/>
+          <a:lstStyle/>
+          <a:p>
+            <a:r>
+              <a:rPr lang="nb-NO" dirty="0" smtClean="0"/>
+              <a:t>Hvis man bare returnerer noe fra en metode vil man gi HTTP</a:t>
+            </a:r>
+            <a:r>
+              <a:rPr lang="nb-NO" baseline="0" dirty="0" smtClean="0"/>
+              <a:t> statuskode 200 tilbake til klienten.</a:t>
+            </a:r>
+            <a:endParaRPr lang="nb-NO" dirty="0" smtClean="0"/>
+          </a:p>
+          <a:p>
+            <a:r>
+              <a:rPr lang="nb-NO" dirty="0" smtClean="0"/>
+              <a:t>For</a:t>
+            </a:r>
+            <a:r>
+              <a:rPr lang="nb-NO" baseline="0" dirty="0" smtClean="0"/>
+              <a:t> å si fra til klienten at noe galt skjedde bruker man typisk en HttpResponseException og angir en passende HTTP-statuskode</a:t>
+            </a:r>
+            <a:endParaRPr lang="nb-NO" dirty="0"/>
+          </a:p>
+        </p:txBody>
+      </p:sp>
+    </p:spTree>
+    <p:extLst>
+      <p:ext uri="{BB962C8B-B14F-4D97-AF65-F5344CB8AC3E}">
+        <p14:creationId xmlns:p14="http://schemas.microsoft.com/office/powerpoint/2010/main" val="503856267"/>
+      </p:ext>
+    </p:extLst>
+  </p:cSld>
+  <p:clrMapOvr>
+    <a:masterClrMapping/>
+  </p:clrMapOvr>
+</p:notes>
+</file>
+
+<file path=ppt/notesSlides/notesSlide13.xml><?xml version="1.0" encoding="utf-8"?>
+<p:notes xmlns:a="http://schemas.openxmlformats.org/drawingml/2006/main" xmlns:r="http://schemas.openxmlformats.org/officeDocument/2006/relationships" xmlns:p="http://schemas.openxmlformats.org/presentationml/2006/main">
+  <p:cSld>
+    <p:spTree>
+      <p:nvGrpSpPr>
+        <p:cNvPr id="1" name=""/>
+        <p:cNvGrpSpPr/>
+        <p:nvPr/>
+      </p:nvGrpSpPr>
+      <p:grpSpPr>
+        <a:xfrm>
+          <a:off x="0" y="0"/>
+          <a:ext cx="0" cy="0"/>
+          <a:chOff x="0" y="0"/>
+          <a:chExt cx="0" cy="0"/>
+        </a:xfrm>
+      </p:grpSpPr>
+      <p:sp>
+        <p:nvSpPr>
+          <p:cNvPr id="2" name="Slide Image Placeholder 1"/>
+          <p:cNvSpPr>
+            <a:spLocks noGrp="1" noRot="1" noChangeAspect="1"/>
+          </p:cNvSpPr>
+          <p:nvPr>
+            <p:ph type="sldImg"/>
+          </p:nvPr>
+        </p:nvSpPr>
+        <p:spPr>
+          <a:xfrm>
+            <a:off x="827088" y="592138"/>
+            <a:ext cx="5226050" cy="3919537"/>
+          </a:xfrm>
+        </p:spPr>
+      </p:sp>
+      <p:sp>
+        <p:nvSpPr>
+          <p:cNvPr id="3" name="Notes Placeholder 2"/>
+          <p:cNvSpPr>
+            <a:spLocks noGrp="1"/>
+          </p:cNvSpPr>
+          <p:nvPr>
+            <p:ph type="body" idx="1"/>
+          </p:nvPr>
+        </p:nvSpPr>
+        <p:spPr/>
+        <p:txBody>
           <a:bodyPr>
             <a:normAutofit/>
           </a:bodyPr>
@@ -803,7 +919,7 @@
 </p:notes>
 </file>
 
-<file path=ppt/notesSlides/notesSlide13.xml><?xml version="1.0" encoding="utf-8"?>
+<file path=ppt/notesSlides/notesSlide14.xml><?xml version="1.0" encoding="utf-8"?>
 <p:notes xmlns:a="http://schemas.openxmlformats.org/drawingml/2006/main" xmlns:r="http://schemas.openxmlformats.org/officeDocument/2006/relationships" xmlns:p="http://schemas.openxmlformats.org/presentationml/2006/main">
   <p:cSld>
     <p:spTree>
@@ -1193,28 +1309,53 @@
           <a:bodyPr/>
           <a:lstStyle/>
           <a:p>
-            <a:r>
-              <a:rPr lang="nb-NO" dirty="0" smtClean="0"/>
-              <a:t>Hvordan</a:t>
-            </a:r>
+            <a:pPr marL="285750" indent="-285750">
+              <a:buFontTx/>
+              <a:buChar char="-"/>
+            </a:pPr>
             <a:r>
               <a:rPr lang="nb-NO" baseline="0" dirty="0" smtClean="0"/>
-              <a:t> det kanskje kunne ha sett ut:</a:t>
-            </a:r>
-          </a:p>
-          <a:p>
-            <a:endParaRPr lang="nb-NO" baseline="0" dirty="0" smtClean="0"/>
-          </a:p>
-          <a:p>
+              <a:t>Slik kan f.eks. et REST-api se ut</a:t>
+            </a:r>
+          </a:p>
+          <a:p>
+            <a:pPr marL="285750" indent="-285750">
+              <a:buFontTx/>
+              <a:buChar char="-"/>
+            </a:pPr>
             <a:r>
               <a:rPr lang="nb-NO" baseline="0" dirty="0" smtClean="0"/>
-              <a:t>Hver enkelt url kalles en RESSURS</a:t>
-            </a:r>
-          </a:p>
-          <a:p>
+              <a:t>Kan lage ny bloggpost ved å gjøre en POST til bloggposter-ressursen</a:t>
+            </a:r>
+          </a:p>
+          <a:p>
+            <a:pPr marL="285750" indent="-285750">
+              <a:buFontTx/>
+              <a:buChar char="-"/>
+            </a:pPr>
             <a:r>
               <a:rPr lang="nb-NO" baseline="0" dirty="0" smtClean="0"/>
-              <a:t>Man kan utføre operasjoner på en ressurs ved å bruke de ulike HTTP verbene</a:t>
+              <a:t>Kan endre tittel på bloggposten ved å gjøre en PUT til bloggpost-ressursen vi lagde</a:t>
+            </a:r>
+          </a:p>
+          <a:p>
+            <a:pPr marL="285750" indent="-285750">
+              <a:buFontTx/>
+              <a:buChar char="-"/>
+            </a:pPr>
+            <a:r>
+              <a:rPr lang="nb-NO" baseline="0" dirty="0" smtClean="0"/>
+              <a:t>Kan slette bloggposten ved å gjøre en DELETE mot bloggpost-ressursen</a:t>
+            </a:r>
+          </a:p>
+          <a:p>
+            <a:pPr marL="285750" indent="-285750">
+              <a:buFontTx/>
+              <a:buChar char="-"/>
+            </a:pPr>
+            <a:r>
+              <a:rPr lang="nb-NO" baseline="0" dirty="0" smtClean="0"/>
+              <a:t>Kan hente alle kommentarer som tilhører en bloggpost ved å gjøre en GET mot subressursen «kommentarer».</a:t>
             </a:r>
           </a:p>
         </p:txBody>
@@ -1289,7 +1430,19 @@
             </a:pPr>
             <a:r>
               <a:rPr lang="nb-NO" sz="1600" dirty="0" smtClean="0"/>
-              <a:t>i stedet for formelle kontrakter som SOAP eller WS*</a:t>
+              <a:t> I</a:t>
+            </a:r>
+            <a:r>
+              <a:rPr lang="nb-NO" sz="1600" baseline="0" dirty="0" smtClean="0"/>
+              <a:t> </a:t>
+            </a:r>
+            <a:r>
+              <a:rPr lang="nb-NO" sz="1600" dirty="0" smtClean="0"/>
+              <a:t>stedet </a:t>
+            </a:r>
+            <a:r>
+              <a:rPr lang="nb-NO" sz="1600" dirty="0" smtClean="0"/>
+              <a:t>for formelle kontrakter som SOAP eller WS*</a:t>
             </a:r>
           </a:p>
           <a:p>
@@ -1299,7 +1452,11 @@
             </a:pPr>
             <a:r>
               <a:rPr lang="nb-NO" sz="1600" dirty="0" smtClean="0"/>
-              <a:t>Muliggjør tilgjengeligjøring av funksjonalitet for en rekke forskjellige enheter og klient platformer</a:t>
+              <a:t> Muliggjør </a:t>
+            </a:r>
+            <a:r>
+              <a:rPr lang="nb-NO" sz="1600" dirty="0" smtClean="0"/>
+              <a:t>tilgjengeligjøring av funksjonalitet for en rekke forskjellige enheter og klient platformer</a:t>
             </a:r>
             <a:endParaRPr lang="en-US" dirty="0"/>
           </a:p>
@@ -1367,27 +1524,46 @@
           <a:bodyPr/>
           <a:lstStyle/>
           <a:p>
-            <a:r>
-              <a:rPr lang="nb-NO" dirty="0" smtClean="0"/>
-              <a:t>Må</a:t>
+            <a:pPr marL="285750" indent="-285750">
+              <a:buFontTx/>
+              <a:buChar char="-"/>
+            </a:pPr>
+            <a:r>
+              <a:rPr lang="nb-NO" dirty="0" smtClean="0"/>
+              <a:t>Man</a:t>
             </a:r>
             <a:r>
               <a:rPr lang="nb-NO" baseline="0" dirty="0" smtClean="0"/>
-              <a:t> arve ApiController</a:t>
-            </a:r>
-          </a:p>
-          <a:p>
+              <a:t> kan bruke Web API direkte i et ASP .NET MVC 4 prosjekt</a:t>
+            </a:r>
+          </a:p>
+          <a:p>
+            <a:pPr marL="285750" indent="-285750">
+              <a:buFontTx/>
+              <a:buChar char="-"/>
+            </a:pPr>
             <a:r>
               <a:rPr lang="nb-NO" baseline="0" dirty="0" smtClean="0"/>
-              <a:t>En konvensjon gjør at man kan prefikse metoder med Get, Post, Put eller Delete. Web Api’et vil da ordne det slik at f.eks. en POST operasjon blir utført av en metode som er prefikset med Post. </a:t>
-            </a:r>
+              <a:t>MEN, web apiet kan også installeres helt separat igjennom Nuget</a:t>
+            </a:r>
+          </a:p>
+          <a:p>
+            <a:pPr marL="285750" indent="-285750">
+              <a:buFontTx/>
+              <a:buChar char="-"/>
+            </a:pPr>
+            <a:r>
+              <a:rPr lang="nb-NO" baseline="0" dirty="0" smtClean="0"/>
+              <a:t>Web APIet er ikke avhengig av MVC</a:t>
+            </a:r>
+            <a:endParaRPr lang="nb-NO" dirty="0"/>
           </a:p>
         </p:txBody>
       </p:sp>
     </p:spTree>
     <p:extLst>
       <p:ext uri="{BB962C8B-B14F-4D97-AF65-F5344CB8AC3E}">
-        <p14:creationId xmlns:p14="http://schemas.microsoft.com/office/powerpoint/2010/main" val="3750770557"/>
+        <p14:creationId xmlns:p14="http://schemas.microsoft.com/office/powerpoint/2010/main" val="3577680738"/>
       </p:ext>
     </p:extLst>
   </p:cSld>
@@ -1446,14 +1622,47 @@
           <a:bodyPr/>
           <a:lstStyle/>
           <a:p>
-            <a:endParaRPr lang="nb-NO" dirty="0"/>
+            <a:r>
+              <a:rPr lang="nb-NO" dirty="0" smtClean="0"/>
+              <a:t>- Må</a:t>
+            </a:r>
+            <a:r>
+              <a:rPr lang="nb-NO" baseline="0" dirty="0" smtClean="0"/>
+              <a:t> </a:t>
+            </a:r>
+            <a:r>
+              <a:rPr lang="nb-NO" baseline="0" dirty="0" smtClean="0"/>
+              <a:t>arve ApiController</a:t>
+            </a:r>
+          </a:p>
+          <a:p>
+            <a:r>
+              <a:rPr lang="nb-NO" baseline="0" dirty="0" smtClean="0"/>
+              <a:t>- Konvensjon for metoder prefikset med Get, Post, Put eller Delete</a:t>
+            </a:r>
+          </a:p>
+          <a:p>
+            <a:r>
+              <a:rPr lang="nb-NO" baseline="0" dirty="0" smtClean="0"/>
+              <a:t> </a:t>
+            </a:r>
+          </a:p>
+          <a:p>
+            <a:r>
+              <a:rPr lang="nb-NO" baseline="0" dirty="0" smtClean="0"/>
+              <a:t>En </a:t>
+            </a:r>
+            <a:r>
+              <a:rPr lang="nb-NO" baseline="0" dirty="0" smtClean="0"/>
+              <a:t>konvensjon gjør at man kan prefikse metoder med Get, Post, Put eller Delete. Web Api’et vil da ordne det slik at f.eks. en POST operasjon blir utført av en metode som er prefikset med Post. </a:t>
+            </a:r>
           </a:p>
         </p:txBody>
       </p:sp>
     </p:spTree>
     <p:extLst>
       <p:ext uri="{BB962C8B-B14F-4D97-AF65-F5344CB8AC3E}">
-        <p14:creationId xmlns:p14="http://schemas.microsoft.com/office/powerpoint/2010/main" val="4166449398"/>
+        <p14:creationId xmlns:p14="http://schemas.microsoft.com/office/powerpoint/2010/main" val="3750770557"/>
       </p:ext>
     </p:extLst>
   </p:cSld>
@@ -1512,13 +1721,39 @@
           <a:bodyPr/>
           <a:lstStyle/>
           <a:p>
-            <a:r>
-              <a:rPr lang="nb-NO" dirty="0" smtClean="0"/>
-              <a:t>Mulig</a:t>
-            </a:r>
+            <a:pPr marL="285750" indent="-285750">
+              <a:buFontTx/>
+              <a:buChar char="-"/>
+            </a:pPr>
             <a:r>
               <a:rPr lang="nb-NO" baseline="0" dirty="0" smtClean="0"/>
-              <a:t> å bruke attributter for angi hva slags HTTP verb en metode støtter</a:t>
+              <a:t>Er m</a:t>
+            </a:r>
+            <a:r>
+              <a:rPr lang="nb-NO" dirty="0" smtClean="0"/>
+              <a:t>ulig</a:t>
+            </a:r>
+            <a:r>
+              <a:rPr lang="nb-NO" baseline="0" dirty="0" smtClean="0"/>
+              <a:t> </a:t>
+            </a:r>
+            <a:r>
+              <a:rPr lang="nb-NO" baseline="0" dirty="0" smtClean="0"/>
+              <a:t>å bruke attributter for angi hva slags HTTP verb en metode </a:t>
+            </a:r>
+            <a:r>
+              <a:rPr lang="nb-NO" baseline="0" dirty="0" smtClean="0"/>
+              <a:t>støtter</a:t>
+            </a:r>
+          </a:p>
+          <a:p>
+            <a:pPr marL="285750" indent="-285750">
+              <a:buFontTx/>
+              <a:buChar char="-"/>
+            </a:pPr>
+            <a:r>
+              <a:rPr lang="nb-NO" baseline="0" dirty="0" smtClean="0"/>
+              <a:t>Istedet for metodenavn-konvensjonen</a:t>
             </a:r>
             <a:endParaRPr lang="nb-NO" dirty="0"/>
           </a:p>
@@ -10764,11 +10999,7 @@
           <a:p>
             <a:r>
               <a:rPr lang="nb-NO" dirty="0" smtClean="0"/>
-              <a:t>November</a:t>
-            </a:r>
-            <a:r>
-              <a:rPr lang="nb-NO" dirty="0" smtClean="0"/>
-              <a:t> 2013</a:t>
+              <a:t>November 2013</a:t>
             </a:r>
             <a:endParaRPr lang="en-US" dirty="0"/>
           </a:p>
@@ -10807,6 +11038,1686 @@
 </file>
 
 <file path=ppt/slides/slide10.xml><?xml version="1.0" encoding="utf-8"?>
+<p:sld xmlns:a="http://schemas.openxmlformats.org/drawingml/2006/main" xmlns:r="http://schemas.openxmlformats.org/officeDocument/2006/relationships" xmlns:p="http://schemas.openxmlformats.org/presentationml/2006/main">
+  <p:cSld>
+    <p:spTree>
+      <p:nvGrpSpPr>
+        <p:cNvPr id="1" name=""/>
+        <p:cNvGrpSpPr/>
+        <p:nvPr/>
+      </p:nvGrpSpPr>
+      <p:grpSpPr>
+        <a:xfrm>
+          <a:off x="0" y="0"/>
+          <a:ext cx="0" cy="0"/>
+          <a:chOff x="0" y="0"/>
+          <a:chExt cx="0" cy="0"/>
+        </a:xfrm>
+      </p:grpSpPr>
+      <p:sp>
+        <p:nvSpPr>
+          <p:cNvPr id="2" name="Title 1"/>
+          <p:cNvSpPr>
+            <a:spLocks noGrp="1"/>
+          </p:cNvSpPr>
+          <p:nvPr>
+            <p:ph type="title"/>
+          </p:nvPr>
+        </p:nvSpPr>
+        <p:spPr>
+          <a:xfrm>
+            <a:off x="321623" y="418905"/>
+            <a:ext cx="2306722" cy="307777"/>
+          </a:xfrm>
+        </p:spPr>
+        <p:txBody>
+          <a:bodyPr/>
+          <a:lstStyle/>
+          <a:p>
+            <a:r>
+              <a:rPr lang="nb-NO" dirty="0" smtClean="0"/>
+              <a:t>Routing forts</a:t>
+            </a:r>
+            <a:endParaRPr lang="en-US" dirty="0"/>
+          </a:p>
+        </p:txBody>
+      </p:sp>
+      <p:sp>
+        <p:nvSpPr>
+          <p:cNvPr id="3" name="Slide Number Placeholder 2"/>
+          <p:cNvSpPr>
+            <a:spLocks noGrp="1"/>
+          </p:cNvSpPr>
+          <p:nvPr>
+            <p:ph type="sldNum" sz="quarter" idx="10"/>
+          </p:nvPr>
+        </p:nvSpPr>
+        <p:spPr/>
+        <p:txBody>
+          <a:bodyPr/>
+          <a:lstStyle/>
+          <a:p>
+            <a:fld id="{FF67BF5B-7344-D747-A0C2-CBD7B2ACBC85}" type="slidenum">
+              <a:rPr lang="en-US" smtClean="0"/>
+              <a:pPr/>
+              <a:t>10</a:t>
+            </a:fld>
+            <a:endParaRPr lang="en-US" dirty="0"/>
+          </a:p>
+        </p:txBody>
+      </p:sp>
+      <p:sp>
+        <p:nvSpPr>
+          <p:cNvPr id="5" name="Rectangle 1"/>
+          <p:cNvSpPr>
+            <a:spLocks noChangeArrowheads="1"/>
+          </p:cNvSpPr>
+          <p:nvPr/>
+        </p:nvSpPr>
+        <p:spPr bwMode="auto">
+          <a:xfrm>
+            <a:off x="499873" y="1152109"/>
+            <a:ext cx="8231434" cy="1754326"/>
+          </a:xfrm>
+          <a:prstGeom prst="rect">
+            <a:avLst/>
+          </a:prstGeom>
+          <a:solidFill>
+            <a:srgbClr val="FFFFFF"/>
+          </a:solidFill>
+          <a:ln w="9525">
+            <a:solidFill>
+              <a:schemeClr val="accent1"/>
+            </a:solidFill>
+            <a:miter lim="800000"/>
+            <a:headEnd/>
+            <a:tailEnd/>
+          </a:ln>
+          <a:effectLst/>
+        </p:spPr>
+        <p:txBody>
+          <a:bodyPr vert="horz" wrap="square" lIns="91440" tIns="45720" rIns="91440" bIns="45720" numCol="1" anchor="ctr" anchorCtr="0" compatLnSpc="1">
+            <a:prstTxWarp prst="textNoShape">
+              <a:avLst/>
+            </a:prstTxWarp>
+            <a:spAutoFit/>
+          </a:bodyPr>
+          <a:lstStyle/>
+          <a:p>
+            <a:pPr marL="0" marR="0" lvl="0" indent="0" algn="l" defTabSz="914400" rtl="0" eaLnBrk="1" fontAlgn="base" latinLnBrk="0" hangingPunct="1">
+              <a:lnSpc>
+                <a:spcPct val="100000"/>
+              </a:lnSpc>
+              <a:spcBef>
+                <a:spcPct val="0"/>
+              </a:spcBef>
+              <a:spcAft>
+                <a:spcPct val="0"/>
+              </a:spcAft>
+              <a:buClrTx/>
+              <a:buSzTx/>
+              <a:buFontTx/>
+              <a:buNone/>
+              <a:tabLst/>
+            </a:pPr>
+            <a:r>
+              <a:rPr kumimoji="0" lang="en-US" sz="1200" b="0" i="0" u="none" strike="noStrike" cap="none" normalizeH="0" baseline="0" dirty="0" smtClean="0">
+                <a:ln>
+                  <a:noFill/>
+                </a:ln>
+                <a:solidFill>
+                  <a:srgbClr val="0000FF"/>
+                </a:solidFill>
+                <a:effectLst/>
+                <a:latin typeface="Consolas" pitchFamily="49" charset="0"/>
+                <a:cs typeface="Consolas" pitchFamily="49" charset="0"/>
+              </a:rPr>
+              <a:t>public</a:t>
+            </a:r>
+            <a:r>
+              <a:rPr kumimoji="0" lang="en-US" sz="1200" b="0" i="0" u="none" strike="noStrike" cap="none" normalizeH="0" baseline="0" dirty="0" smtClean="0">
+                <a:ln>
+                  <a:noFill/>
+                </a:ln>
+                <a:solidFill>
+                  <a:srgbClr val="000000"/>
+                </a:solidFill>
+                <a:effectLst/>
+                <a:latin typeface="Consolas" pitchFamily="49" charset="0"/>
+                <a:cs typeface="Consolas" pitchFamily="49" charset="0"/>
+              </a:rPr>
+              <a:t> </a:t>
+            </a:r>
+            <a:r>
+              <a:rPr kumimoji="0" lang="en-US" sz="1200" b="0" i="0" u="none" strike="noStrike" cap="none" normalizeH="0" baseline="0" dirty="0" smtClean="0">
+                <a:ln>
+                  <a:noFill/>
+                </a:ln>
+                <a:solidFill>
+                  <a:srgbClr val="0000FF"/>
+                </a:solidFill>
+                <a:effectLst/>
+                <a:latin typeface="Consolas" pitchFamily="49" charset="0"/>
+                <a:cs typeface="Consolas" pitchFamily="49" charset="0"/>
+              </a:rPr>
+              <a:t>class</a:t>
+            </a:r>
+            <a:r>
+              <a:rPr kumimoji="0" lang="en-US" sz="1200" b="0" i="0" u="none" strike="noStrike" cap="none" normalizeH="0" baseline="0" dirty="0" smtClean="0">
+                <a:ln>
+                  <a:noFill/>
+                </a:ln>
+                <a:solidFill>
+                  <a:srgbClr val="000000"/>
+                </a:solidFill>
+                <a:effectLst/>
+                <a:latin typeface="Consolas" pitchFamily="49" charset="0"/>
+                <a:cs typeface="Consolas" pitchFamily="49" charset="0"/>
+              </a:rPr>
+              <a:t> </a:t>
+            </a:r>
+            <a:r>
+              <a:rPr kumimoji="0" lang="en-US" sz="1200" b="0" i="0" u="none" strike="noStrike" cap="none" normalizeH="0" baseline="0" dirty="0" err="1" smtClean="0">
+                <a:ln>
+                  <a:noFill/>
+                </a:ln>
+                <a:solidFill>
+                  <a:srgbClr val="2B91AF"/>
+                </a:solidFill>
+                <a:effectLst/>
+                <a:latin typeface="Consolas" pitchFamily="49" charset="0"/>
+                <a:cs typeface="Consolas" pitchFamily="49" charset="0"/>
+              </a:rPr>
+              <a:t>PersonController</a:t>
+            </a:r>
+            <a:r>
+              <a:rPr kumimoji="0" lang="en-US" sz="1200" b="0" i="0" u="none" strike="noStrike" cap="none" normalizeH="0" baseline="0" dirty="0" smtClean="0">
+                <a:ln>
+                  <a:noFill/>
+                </a:ln>
+                <a:solidFill>
+                  <a:srgbClr val="000000"/>
+                </a:solidFill>
+                <a:effectLst/>
+                <a:latin typeface="Consolas" pitchFamily="49" charset="0"/>
+                <a:cs typeface="Consolas" pitchFamily="49" charset="0"/>
+              </a:rPr>
+              <a:t> : </a:t>
+            </a:r>
+            <a:r>
+              <a:rPr kumimoji="0" lang="en-US" sz="1200" b="0" i="0" u="none" strike="noStrike" cap="none" normalizeH="0" baseline="0" dirty="0" smtClean="0">
+                <a:ln>
+                  <a:noFill/>
+                </a:ln>
+                <a:solidFill>
+                  <a:srgbClr val="2B91AF"/>
+                </a:solidFill>
+                <a:effectLst/>
+                <a:latin typeface="Consolas" pitchFamily="49" charset="0"/>
+                <a:cs typeface="Consolas" pitchFamily="49" charset="0"/>
+              </a:rPr>
+              <a:t>ApiController</a:t>
+            </a:r>
+            <a:r>
+              <a:rPr kumimoji="0" lang="en-US" sz="1200" b="0" i="0" u="none" strike="noStrike" cap="none" normalizeH="0" baseline="0" dirty="0" smtClean="0">
+                <a:ln>
+                  <a:noFill/>
+                </a:ln>
+                <a:solidFill>
+                  <a:srgbClr val="000000"/>
+                </a:solidFill>
+                <a:effectLst/>
+                <a:latin typeface="Consolas" pitchFamily="49" charset="0"/>
+                <a:cs typeface="Consolas" pitchFamily="49" charset="0"/>
+              </a:rPr>
+              <a:t>     </a:t>
+            </a:r>
+          </a:p>
+          <a:p>
+            <a:pPr marL="0" marR="0" lvl="0" indent="0" algn="l" defTabSz="914400" rtl="0" eaLnBrk="1" fontAlgn="base" latinLnBrk="0" hangingPunct="1">
+              <a:lnSpc>
+                <a:spcPct val="100000"/>
+              </a:lnSpc>
+              <a:spcBef>
+                <a:spcPct val="0"/>
+              </a:spcBef>
+              <a:spcAft>
+                <a:spcPct val="0"/>
+              </a:spcAft>
+              <a:buClrTx/>
+              <a:buSzTx/>
+              <a:buFontTx/>
+              <a:buNone/>
+              <a:tabLst/>
+            </a:pPr>
+            <a:r>
+              <a:rPr kumimoji="0" lang="en-US" sz="1200" b="0" i="0" u="none" strike="noStrike" cap="none" normalizeH="0" baseline="0" dirty="0" smtClean="0">
+                <a:ln>
+                  <a:noFill/>
+                </a:ln>
+                <a:solidFill>
+                  <a:srgbClr val="000000"/>
+                </a:solidFill>
+                <a:effectLst/>
+                <a:latin typeface="Consolas" pitchFamily="49" charset="0"/>
+                <a:cs typeface="Consolas" pitchFamily="49" charset="0"/>
+              </a:rPr>
+              <a:t>{         </a:t>
+            </a:r>
+          </a:p>
+          <a:p>
+            <a:pPr marL="0" marR="0" lvl="0" indent="0" algn="l" defTabSz="914400" rtl="0" eaLnBrk="1" fontAlgn="base" latinLnBrk="0" hangingPunct="1">
+              <a:lnSpc>
+                <a:spcPct val="100000"/>
+              </a:lnSpc>
+              <a:spcBef>
+                <a:spcPct val="0"/>
+              </a:spcBef>
+              <a:spcAft>
+                <a:spcPct val="0"/>
+              </a:spcAft>
+              <a:buClrTx/>
+              <a:buSzTx/>
+              <a:buFontTx/>
+              <a:buNone/>
+              <a:tabLst/>
+            </a:pPr>
+            <a:r>
+              <a:rPr lang="en-US" sz="1200" dirty="0" smtClean="0">
+                <a:solidFill>
+                  <a:srgbClr val="000000"/>
+                </a:solidFill>
+                <a:latin typeface="Consolas" pitchFamily="49" charset="0"/>
+                <a:cs typeface="Consolas" pitchFamily="49" charset="0"/>
+              </a:rPr>
+              <a:t>	</a:t>
+            </a:r>
+            <a:r>
+              <a:rPr kumimoji="0" lang="en-US" sz="1200" b="0" i="0" u="none" strike="noStrike" cap="none" normalizeH="0" baseline="0" dirty="0" smtClean="0">
+                <a:ln>
+                  <a:noFill/>
+                </a:ln>
+                <a:solidFill>
+                  <a:srgbClr val="0000FF"/>
+                </a:solidFill>
+                <a:effectLst/>
+                <a:latin typeface="Consolas" pitchFamily="49" charset="0"/>
+                <a:cs typeface="Consolas" pitchFamily="49" charset="0"/>
+              </a:rPr>
+              <a:t>private</a:t>
+            </a:r>
+            <a:r>
+              <a:rPr kumimoji="0" lang="en-US" sz="1200" b="0" i="0" u="none" strike="noStrike" cap="none" normalizeH="0" baseline="0" dirty="0" smtClean="0">
+                <a:ln>
+                  <a:noFill/>
+                </a:ln>
+                <a:solidFill>
+                  <a:srgbClr val="000000"/>
+                </a:solidFill>
+                <a:effectLst/>
+                <a:latin typeface="Consolas" pitchFamily="49" charset="0"/>
+                <a:cs typeface="Consolas" pitchFamily="49" charset="0"/>
+              </a:rPr>
+              <a:t> </a:t>
+            </a:r>
+            <a:r>
+              <a:rPr kumimoji="0" lang="en-US" sz="1200" b="0" i="0" u="none" strike="noStrike" cap="none" normalizeH="0" baseline="0" dirty="0" err="1" smtClean="0">
+                <a:ln>
+                  <a:noFill/>
+                </a:ln>
+                <a:solidFill>
+                  <a:srgbClr val="2B91AF"/>
+                </a:solidFill>
+                <a:effectLst/>
+                <a:latin typeface="Consolas" pitchFamily="49" charset="0"/>
+                <a:cs typeface="Consolas" pitchFamily="49" charset="0"/>
+              </a:rPr>
+              <a:t>IEnumerable</a:t>
+            </a:r>
+            <a:r>
+              <a:rPr kumimoji="0" lang="en-US" sz="1200" b="0" i="0" u="none" strike="noStrike" cap="none" normalizeH="0" baseline="0" dirty="0" smtClean="0">
+                <a:ln>
+                  <a:noFill/>
+                </a:ln>
+                <a:solidFill>
+                  <a:srgbClr val="000000"/>
+                </a:solidFill>
+                <a:effectLst/>
+                <a:latin typeface="Consolas" pitchFamily="49" charset="0"/>
+                <a:cs typeface="Consolas" pitchFamily="49" charset="0"/>
+              </a:rPr>
+              <a:t>&lt;</a:t>
+            </a:r>
+            <a:r>
+              <a:rPr kumimoji="0" lang="en-US" sz="1200" b="0" i="0" u="none" strike="noStrike" cap="none" normalizeH="0" baseline="0" dirty="0" smtClean="0">
+                <a:ln>
+                  <a:noFill/>
+                </a:ln>
+                <a:solidFill>
+                  <a:srgbClr val="2B91AF"/>
+                </a:solidFill>
+                <a:effectLst/>
+                <a:latin typeface="Consolas" pitchFamily="49" charset="0"/>
+                <a:cs typeface="Consolas" pitchFamily="49" charset="0"/>
+              </a:rPr>
+              <a:t>Person</a:t>
+            </a:r>
+            <a:r>
+              <a:rPr kumimoji="0" lang="en-US" sz="1200" b="0" i="0" u="none" strike="noStrike" cap="none" normalizeH="0" baseline="0" dirty="0" smtClean="0">
+                <a:ln>
+                  <a:noFill/>
+                </a:ln>
+                <a:solidFill>
+                  <a:srgbClr val="000000"/>
+                </a:solidFill>
+                <a:effectLst/>
+                <a:latin typeface="Consolas" pitchFamily="49" charset="0"/>
+                <a:cs typeface="Consolas" pitchFamily="49" charset="0"/>
+              </a:rPr>
+              <a:t>&gt; _persons = </a:t>
+            </a:r>
+            <a:r>
+              <a:rPr kumimoji="0" lang="en-US" sz="1200" b="0" i="0" u="none" strike="noStrike" cap="none" normalizeH="0" baseline="0" dirty="0" smtClean="0">
+                <a:ln>
+                  <a:noFill/>
+                </a:ln>
+                <a:solidFill>
+                  <a:srgbClr val="0000FF"/>
+                </a:solidFill>
+                <a:effectLst/>
+                <a:latin typeface="Consolas" pitchFamily="49" charset="0"/>
+                <a:cs typeface="Consolas" pitchFamily="49" charset="0"/>
+              </a:rPr>
+              <a:t>new</a:t>
+            </a:r>
+            <a:r>
+              <a:rPr kumimoji="0" lang="en-US" sz="1200" b="0" i="0" u="none" strike="noStrike" cap="none" normalizeH="0" baseline="0" dirty="0" smtClean="0">
+                <a:ln>
+                  <a:noFill/>
+                </a:ln>
+                <a:solidFill>
+                  <a:srgbClr val="000000"/>
+                </a:solidFill>
+                <a:effectLst/>
+                <a:latin typeface="Consolas" pitchFamily="49" charset="0"/>
+                <a:cs typeface="Consolas" pitchFamily="49" charset="0"/>
+              </a:rPr>
+              <a:t> </a:t>
+            </a:r>
+            <a:r>
+              <a:rPr kumimoji="0" lang="en-US" sz="1200" b="0" i="0" u="none" strike="noStrike" cap="none" normalizeH="0" baseline="0" dirty="0" smtClean="0">
+                <a:ln>
+                  <a:noFill/>
+                </a:ln>
+                <a:solidFill>
+                  <a:srgbClr val="2B91AF"/>
+                </a:solidFill>
+                <a:effectLst/>
+                <a:latin typeface="Consolas" pitchFamily="49" charset="0"/>
+                <a:cs typeface="Consolas" pitchFamily="49" charset="0"/>
+              </a:rPr>
+              <a:t>List</a:t>
+            </a:r>
+            <a:r>
+              <a:rPr kumimoji="0" lang="en-US" sz="1200" b="0" i="0" u="none" strike="noStrike" cap="none" normalizeH="0" baseline="0" dirty="0" smtClean="0">
+                <a:ln>
+                  <a:noFill/>
+                </a:ln>
+                <a:solidFill>
+                  <a:srgbClr val="000000"/>
+                </a:solidFill>
+                <a:effectLst/>
+                <a:latin typeface="Consolas" pitchFamily="49" charset="0"/>
+                <a:cs typeface="Consolas" pitchFamily="49" charset="0"/>
+              </a:rPr>
+              <a:t>&lt;</a:t>
+            </a:r>
+            <a:r>
+              <a:rPr kumimoji="0" lang="en-US" sz="1200" b="0" i="0" u="none" strike="noStrike" cap="none" normalizeH="0" baseline="0" dirty="0" smtClean="0">
+                <a:ln>
+                  <a:noFill/>
+                </a:ln>
+                <a:solidFill>
+                  <a:srgbClr val="2B91AF"/>
+                </a:solidFill>
+                <a:effectLst/>
+                <a:latin typeface="Consolas" pitchFamily="49" charset="0"/>
+                <a:cs typeface="Consolas" pitchFamily="49" charset="0"/>
+              </a:rPr>
+              <a:t>Person</a:t>
+            </a:r>
+            <a:r>
+              <a:rPr kumimoji="0" lang="en-US" sz="1200" b="0" i="0" u="none" strike="noStrike" cap="none" normalizeH="0" baseline="0" dirty="0" smtClean="0">
+                <a:ln>
+                  <a:noFill/>
+                </a:ln>
+                <a:solidFill>
+                  <a:srgbClr val="000000"/>
+                </a:solidFill>
+                <a:effectLst/>
+                <a:latin typeface="Consolas" pitchFamily="49" charset="0"/>
+                <a:cs typeface="Consolas" pitchFamily="49" charset="0"/>
+              </a:rPr>
+              <a:t>&gt;();         </a:t>
+            </a:r>
+          </a:p>
+          <a:p>
+            <a:pPr marL="0" marR="0" lvl="0" indent="0" algn="l" defTabSz="914400" rtl="0" eaLnBrk="1" fontAlgn="base" latinLnBrk="0" hangingPunct="1">
+              <a:lnSpc>
+                <a:spcPct val="100000"/>
+              </a:lnSpc>
+              <a:spcBef>
+                <a:spcPct val="0"/>
+              </a:spcBef>
+              <a:spcAft>
+                <a:spcPct val="0"/>
+              </a:spcAft>
+              <a:buClrTx/>
+              <a:buSzTx/>
+              <a:buFontTx/>
+              <a:buNone/>
+              <a:tabLst/>
+            </a:pPr>
+            <a:r>
+              <a:rPr kumimoji="0" lang="en-US" sz="1200" b="0" i="0" u="none" strike="noStrike" cap="none" normalizeH="0" baseline="0" dirty="0" smtClean="0">
+                <a:ln>
+                  <a:noFill/>
+                </a:ln>
+                <a:solidFill>
+                  <a:srgbClr val="0000FF"/>
+                </a:solidFill>
+                <a:effectLst/>
+                <a:latin typeface="Consolas" pitchFamily="49" charset="0"/>
+                <a:cs typeface="Consolas" pitchFamily="49" charset="0"/>
+              </a:rPr>
+              <a:t>	</a:t>
+            </a:r>
+          </a:p>
+          <a:p>
+            <a:pPr marL="0" marR="0" lvl="0" indent="0" algn="l" defTabSz="914400" rtl="0" eaLnBrk="1" fontAlgn="base" latinLnBrk="0" hangingPunct="1">
+              <a:lnSpc>
+                <a:spcPct val="100000"/>
+              </a:lnSpc>
+              <a:spcBef>
+                <a:spcPct val="0"/>
+              </a:spcBef>
+              <a:spcAft>
+                <a:spcPct val="0"/>
+              </a:spcAft>
+              <a:buClrTx/>
+              <a:buSzTx/>
+              <a:buFontTx/>
+              <a:buNone/>
+              <a:tabLst/>
+            </a:pPr>
+            <a:r>
+              <a:rPr lang="en-US" sz="1200" dirty="0" smtClean="0">
+                <a:solidFill>
+                  <a:srgbClr val="0000FF"/>
+                </a:solidFill>
+                <a:latin typeface="Consolas" pitchFamily="49" charset="0"/>
+                <a:cs typeface="Consolas" pitchFamily="49" charset="0"/>
+              </a:rPr>
+              <a:t>	</a:t>
+            </a:r>
+            <a:r>
+              <a:rPr kumimoji="0" lang="en-US" sz="1200" b="0" i="0" u="none" strike="noStrike" cap="none" normalizeH="0" baseline="0" dirty="0" smtClean="0">
+                <a:ln>
+                  <a:noFill/>
+                </a:ln>
+                <a:solidFill>
+                  <a:srgbClr val="0000FF"/>
+                </a:solidFill>
+                <a:effectLst/>
+                <a:latin typeface="Consolas" pitchFamily="49" charset="0"/>
+                <a:cs typeface="Consolas" pitchFamily="49" charset="0"/>
+              </a:rPr>
+              <a:t>public</a:t>
+            </a:r>
+            <a:r>
+              <a:rPr kumimoji="0" lang="en-US" sz="1200" b="0" i="0" u="none" strike="noStrike" cap="none" normalizeH="0" baseline="0" dirty="0" smtClean="0">
+                <a:ln>
+                  <a:noFill/>
+                </a:ln>
+                <a:solidFill>
+                  <a:srgbClr val="000000"/>
+                </a:solidFill>
+                <a:effectLst/>
+                <a:latin typeface="Consolas" pitchFamily="49" charset="0"/>
+                <a:cs typeface="Consolas" pitchFamily="49" charset="0"/>
+              </a:rPr>
+              <a:t> </a:t>
+            </a:r>
+            <a:r>
+              <a:rPr kumimoji="0" lang="en-US" sz="1200" b="0" i="0" u="none" strike="noStrike" cap="none" normalizeH="0" baseline="0" dirty="0" err="1" smtClean="0">
+                <a:ln>
+                  <a:noFill/>
+                </a:ln>
+                <a:solidFill>
+                  <a:srgbClr val="2B91AF"/>
+                </a:solidFill>
+                <a:effectLst/>
+                <a:latin typeface="Consolas" pitchFamily="49" charset="0"/>
+                <a:cs typeface="Consolas" pitchFamily="49" charset="0"/>
+              </a:rPr>
+              <a:t>IEnumerable</a:t>
+            </a:r>
+            <a:r>
+              <a:rPr kumimoji="0" lang="en-US" sz="1200" b="0" i="0" u="none" strike="noStrike" cap="none" normalizeH="0" baseline="0" dirty="0" smtClean="0">
+                <a:ln>
+                  <a:noFill/>
+                </a:ln>
+                <a:solidFill>
+                  <a:srgbClr val="000000"/>
+                </a:solidFill>
+                <a:effectLst/>
+                <a:latin typeface="Consolas" pitchFamily="49" charset="0"/>
+                <a:cs typeface="Consolas" pitchFamily="49" charset="0"/>
+              </a:rPr>
+              <a:t>&lt;</a:t>
+            </a:r>
+            <a:r>
+              <a:rPr kumimoji="0" lang="en-US" sz="1200" b="0" i="0" u="none" strike="noStrike" cap="none" normalizeH="0" baseline="0" dirty="0" smtClean="0">
+                <a:ln>
+                  <a:noFill/>
+                </a:ln>
+                <a:solidFill>
+                  <a:srgbClr val="2B91AF"/>
+                </a:solidFill>
+                <a:effectLst/>
+                <a:latin typeface="Consolas" pitchFamily="49" charset="0"/>
+                <a:cs typeface="Consolas" pitchFamily="49" charset="0"/>
+              </a:rPr>
+              <a:t>Person</a:t>
+            </a:r>
+            <a:r>
+              <a:rPr kumimoji="0" lang="en-US" sz="1200" b="0" i="0" u="none" strike="noStrike" cap="none" normalizeH="0" baseline="0" dirty="0" smtClean="0">
+                <a:ln>
+                  <a:noFill/>
+                </a:ln>
+                <a:solidFill>
+                  <a:srgbClr val="000000"/>
+                </a:solidFill>
+                <a:effectLst/>
+                <a:latin typeface="Consolas" pitchFamily="49" charset="0"/>
+                <a:cs typeface="Consolas" pitchFamily="49" charset="0"/>
+              </a:rPr>
+              <a:t>&gt; Get()         </a:t>
+            </a:r>
+          </a:p>
+          <a:p>
+            <a:pPr marL="0" marR="0" lvl="0" indent="0" algn="l" defTabSz="914400" rtl="0" eaLnBrk="1" fontAlgn="base" latinLnBrk="0" hangingPunct="1">
+              <a:lnSpc>
+                <a:spcPct val="100000"/>
+              </a:lnSpc>
+              <a:spcBef>
+                <a:spcPct val="0"/>
+              </a:spcBef>
+              <a:spcAft>
+                <a:spcPct val="0"/>
+              </a:spcAft>
+              <a:buClrTx/>
+              <a:buSzTx/>
+              <a:buFontTx/>
+              <a:buNone/>
+              <a:tabLst/>
+            </a:pPr>
+            <a:r>
+              <a:rPr lang="en-US" sz="1200" dirty="0" smtClean="0">
+                <a:solidFill>
+                  <a:srgbClr val="000000"/>
+                </a:solidFill>
+                <a:latin typeface="Consolas" pitchFamily="49" charset="0"/>
+                <a:cs typeface="Consolas" pitchFamily="49" charset="0"/>
+              </a:rPr>
+              <a:t>	</a:t>
+            </a:r>
+            <a:r>
+              <a:rPr kumimoji="0" lang="en-US" sz="1200" b="0" i="0" u="none" strike="noStrike" cap="none" normalizeH="0" baseline="0" dirty="0" smtClean="0">
+                <a:ln>
+                  <a:noFill/>
+                </a:ln>
+                <a:solidFill>
+                  <a:srgbClr val="000000"/>
+                </a:solidFill>
+                <a:effectLst/>
+                <a:latin typeface="Consolas" pitchFamily="49" charset="0"/>
+                <a:cs typeface="Consolas" pitchFamily="49" charset="0"/>
+              </a:rPr>
+              <a:t>{             </a:t>
+            </a:r>
+          </a:p>
+          <a:p>
+            <a:pPr marL="0" marR="0" lvl="0" indent="0" algn="l" defTabSz="914400" rtl="0" eaLnBrk="1" fontAlgn="base" latinLnBrk="0" hangingPunct="1">
+              <a:lnSpc>
+                <a:spcPct val="100000"/>
+              </a:lnSpc>
+              <a:spcBef>
+                <a:spcPct val="0"/>
+              </a:spcBef>
+              <a:spcAft>
+                <a:spcPct val="0"/>
+              </a:spcAft>
+              <a:buClrTx/>
+              <a:buSzTx/>
+              <a:buFontTx/>
+              <a:buNone/>
+              <a:tabLst/>
+            </a:pPr>
+            <a:r>
+              <a:rPr lang="en-US" sz="1200" dirty="0" smtClean="0">
+                <a:solidFill>
+                  <a:srgbClr val="000000"/>
+                </a:solidFill>
+                <a:latin typeface="Consolas" pitchFamily="49" charset="0"/>
+                <a:cs typeface="Consolas" pitchFamily="49" charset="0"/>
+              </a:rPr>
+              <a:t>		</a:t>
+            </a:r>
+            <a:r>
+              <a:rPr kumimoji="0" lang="en-US" sz="1200" b="0" i="0" u="none" strike="noStrike" cap="none" normalizeH="0" baseline="0" dirty="0" smtClean="0">
+                <a:ln>
+                  <a:noFill/>
+                </a:ln>
+                <a:solidFill>
+                  <a:srgbClr val="0000FF"/>
+                </a:solidFill>
+                <a:effectLst/>
+                <a:latin typeface="Consolas" pitchFamily="49" charset="0"/>
+                <a:cs typeface="Consolas" pitchFamily="49" charset="0"/>
+              </a:rPr>
+              <a:t>return</a:t>
+            </a:r>
+            <a:r>
+              <a:rPr kumimoji="0" lang="en-US" sz="1200" b="0" i="0" u="none" strike="noStrike" cap="none" normalizeH="0" baseline="0" dirty="0" smtClean="0">
+                <a:ln>
+                  <a:noFill/>
+                </a:ln>
+                <a:solidFill>
+                  <a:srgbClr val="000000"/>
+                </a:solidFill>
+                <a:effectLst/>
+                <a:latin typeface="Consolas" pitchFamily="49" charset="0"/>
+                <a:cs typeface="Consolas" pitchFamily="49" charset="0"/>
+              </a:rPr>
+              <a:t> _persons;         </a:t>
+            </a:r>
+          </a:p>
+          <a:p>
+            <a:pPr marL="0" marR="0" lvl="0" indent="0" algn="l" defTabSz="914400" rtl="0" eaLnBrk="1" fontAlgn="base" latinLnBrk="0" hangingPunct="1">
+              <a:lnSpc>
+                <a:spcPct val="100000"/>
+              </a:lnSpc>
+              <a:spcBef>
+                <a:spcPct val="0"/>
+              </a:spcBef>
+              <a:spcAft>
+                <a:spcPct val="0"/>
+              </a:spcAft>
+              <a:buClrTx/>
+              <a:buSzTx/>
+              <a:buFontTx/>
+              <a:buNone/>
+              <a:tabLst/>
+            </a:pPr>
+            <a:r>
+              <a:rPr lang="en-US" sz="1200" dirty="0" smtClean="0">
+                <a:solidFill>
+                  <a:srgbClr val="000000"/>
+                </a:solidFill>
+                <a:latin typeface="Consolas" pitchFamily="49" charset="0"/>
+                <a:cs typeface="Consolas" pitchFamily="49" charset="0"/>
+              </a:rPr>
+              <a:t>	</a:t>
+            </a:r>
+            <a:r>
+              <a:rPr kumimoji="0" lang="en-US" sz="1200" b="0" i="0" u="none" strike="noStrike" cap="none" normalizeH="0" baseline="0" dirty="0" smtClean="0">
+                <a:ln>
+                  <a:noFill/>
+                </a:ln>
+                <a:solidFill>
+                  <a:srgbClr val="000000"/>
+                </a:solidFill>
+                <a:effectLst/>
+                <a:latin typeface="Consolas" pitchFamily="49" charset="0"/>
+                <a:cs typeface="Consolas" pitchFamily="49" charset="0"/>
+              </a:rPr>
+              <a:t>}     </a:t>
+            </a:r>
+          </a:p>
+          <a:p>
+            <a:pPr marL="0" marR="0" lvl="0" indent="0" algn="l" defTabSz="914400" rtl="0" eaLnBrk="1" fontAlgn="base" latinLnBrk="0" hangingPunct="1">
+              <a:lnSpc>
+                <a:spcPct val="100000"/>
+              </a:lnSpc>
+              <a:spcBef>
+                <a:spcPct val="0"/>
+              </a:spcBef>
+              <a:spcAft>
+                <a:spcPct val="0"/>
+              </a:spcAft>
+              <a:buClrTx/>
+              <a:buSzTx/>
+              <a:buFontTx/>
+              <a:buNone/>
+              <a:tabLst/>
+            </a:pPr>
+            <a:r>
+              <a:rPr kumimoji="0" lang="en-US" sz="1200" b="0" i="0" u="none" strike="noStrike" cap="none" normalizeH="0" baseline="0" dirty="0" smtClean="0">
+                <a:ln>
+                  <a:noFill/>
+                </a:ln>
+                <a:solidFill>
+                  <a:srgbClr val="000000"/>
+                </a:solidFill>
+                <a:effectLst/>
+                <a:latin typeface="Consolas" pitchFamily="49" charset="0"/>
+                <a:cs typeface="Consolas" pitchFamily="49" charset="0"/>
+              </a:rPr>
+              <a:t>}</a:t>
+            </a:r>
+            <a:endParaRPr kumimoji="0" lang="en-US" sz="1200" b="0" i="0" u="none" strike="noStrike" cap="none" normalizeH="0" baseline="0" dirty="0" smtClean="0">
+              <a:ln>
+                <a:noFill/>
+              </a:ln>
+              <a:solidFill>
+                <a:schemeClr val="tx1"/>
+              </a:solidFill>
+              <a:effectLst/>
+              <a:latin typeface="Arial" pitchFamily="34" charset="0"/>
+              <a:cs typeface="Arial" pitchFamily="34" charset="0"/>
+            </a:endParaRPr>
+          </a:p>
+        </p:txBody>
+      </p:sp>
+      <p:sp>
+        <p:nvSpPr>
+          <p:cNvPr id="32769" name="Rectangle 1"/>
+          <p:cNvSpPr>
+            <a:spLocks noChangeArrowheads="1"/>
+          </p:cNvSpPr>
+          <p:nvPr/>
+        </p:nvSpPr>
+        <p:spPr bwMode="auto">
+          <a:xfrm>
+            <a:off x="0" y="43934"/>
+            <a:ext cx="184731" cy="369332"/>
+          </a:xfrm>
+          <a:prstGeom prst="rect">
+            <a:avLst/>
+          </a:prstGeom>
+          <a:solidFill>
+            <a:srgbClr val="FFFFFF"/>
+          </a:solidFill>
+          <a:ln w="9525">
+            <a:noFill/>
+            <a:miter lim="800000"/>
+            <a:headEnd/>
+            <a:tailEnd/>
+          </a:ln>
+          <a:effectLst/>
+        </p:spPr>
+        <p:txBody>
+          <a:bodyPr vert="horz" wrap="none" lIns="91440" tIns="45720" rIns="91440" bIns="45720" numCol="1" anchor="ctr" anchorCtr="0" compatLnSpc="1">
+            <a:prstTxWarp prst="textNoShape">
+              <a:avLst/>
+            </a:prstTxWarp>
+            <a:spAutoFit/>
+          </a:bodyPr>
+          <a:lstStyle/>
+          <a:p>
+            <a:pPr marL="0" marR="0" lvl="0" indent="0" algn="l" defTabSz="914400" rtl="0" eaLnBrk="1" fontAlgn="base" latinLnBrk="0" hangingPunct="1">
+              <a:lnSpc>
+                <a:spcPct val="100000"/>
+              </a:lnSpc>
+              <a:spcBef>
+                <a:spcPct val="0"/>
+              </a:spcBef>
+              <a:spcAft>
+                <a:spcPct val="0"/>
+              </a:spcAft>
+              <a:buClrTx/>
+              <a:buSzTx/>
+              <a:buFontTx/>
+              <a:buNone/>
+              <a:tabLst/>
+            </a:pPr>
+            <a:endParaRPr kumimoji="0" lang="en-US" sz="1800" b="0" i="0" u="none" strike="noStrike" cap="none" normalizeH="0" baseline="0" dirty="0" smtClean="0">
+              <a:ln>
+                <a:noFill/>
+              </a:ln>
+              <a:solidFill>
+                <a:schemeClr val="tx1"/>
+              </a:solidFill>
+              <a:effectLst/>
+              <a:latin typeface="Arial" pitchFamily="34" charset="0"/>
+              <a:cs typeface="Arial" pitchFamily="34" charset="0"/>
+            </a:endParaRPr>
+          </a:p>
+        </p:txBody>
+      </p:sp>
+      <p:sp>
+        <p:nvSpPr>
+          <p:cNvPr id="7" name="Rectangle 1"/>
+          <p:cNvSpPr>
+            <a:spLocks noChangeArrowheads="1"/>
+          </p:cNvSpPr>
+          <p:nvPr/>
+        </p:nvSpPr>
+        <p:spPr bwMode="auto">
+          <a:xfrm>
+            <a:off x="499873" y="3322749"/>
+            <a:ext cx="8231434" cy="1938992"/>
+          </a:xfrm>
+          <a:prstGeom prst="rect">
+            <a:avLst/>
+          </a:prstGeom>
+          <a:solidFill>
+            <a:srgbClr val="FFFFFF"/>
+          </a:solidFill>
+          <a:ln w="9525">
+            <a:solidFill>
+              <a:schemeClr val="accent1"/>
+            </a:solidFill>
+            <a:miter lim="800000"/>
+            <a:headEnd/>
+            <a:tailEnd/>
+          </a:ln>
+          <a:effectLst/>
+        </p:spPr>
+        <p:txBody>
+          <a:bodyPr vert="horz" wrap="square" lIns="91440" tIns="45720" rIns="91440" bIns="45720" numCol="1" anchor="ctr" anchorCtr="0" compatLnSpc="1">
+            <a:prstTxWarp prst="textNoShape">
+              <a:avLst/>
+            </a:prstTxWarp>
+            <a:spAutoFit/>
+          </a:bodyPr>
+          <a:lstStyle/>
+          <a:p>
+            <a:pPr marL="0" marR="0" lvl="0" indent="0" algn="l" defTabSz="914400" rtl="0" eaLnBrk="1" fontAlgn="base" latinLnBrk="0" hangingPunct="1">
+              <a:lnSpc>
+                <a:spcPct val="100000"/>
+              </a:lnSpc>
+              <a:spcBef>
+                <a:spcPct val="0"/>
+              </a:spcBef>
+              <a:spcAft>
+                <a:spcPct val="0"/>
+              </a:spcAft>
+              <a:buClrTx/>
+              <a:buSzTx/>
+              <a:buFontTx/>
+              <a:buNone/>
+              <a:tabLst/>
+            </a:pPr>
+            <a:r>
+              <a:rPr kumimoji="0" lang="en-US" sz="1200" b="0" i="0" u="none" strike="noStrike" cap="none" normalizeH="0" baseline="0" dirty="0" smtClean="0">
+                <a:ln>
+                  <a:noFill/>
+                </a:ln>
+                <a:solidFill>
+                  <a:srgbClr val="0000FF"/>
+                </a:solidFill>
+                <a:effectLst/>
+                <a:latin typeface="Consolas" pitchFamily="49" charset="0"/>
+                <a:cs typeface="Consolas" pitchFamily="49" charset="0"/>
+              </a:rPr>
+              <a:t>public</a:t>
+            </a:r>
+            <a:r>
+              <a:rPr kumimoji="0" lang="en-US" sz="1200" b="0" i="0" u="none" strike="noStrike" cap="none" normalizeH="0" baseline="0" dirty="0" smtClean="0">
+                <a:ln>
+                  <a:noFill/>
+                </a:ln>
+                <a:solidFill>
+                  <a:srgbClr val="000000"/>
+                </a:solidFill>
+                <a:effectLst/>
+                <a:latin typeface="Consolas" pitchFamily="49" charset="0"/>
+                <a:cs typeface="Consolas" pitchFamily="49" charset="0"/>
+              </a:rPr>
+              <a:t> </a:t>
+            </a:r>
+            <a:r>
+              <a:rPr kumimoji="0" lang="en-US" sz="1200" b="0" i="0" u="none" strike="noStrike" cap="none" normalizeH="0" baseline="0" dirty="0" smtClean="0">
+                <a:ln>
+                  <a:noFill/>
+                </a:ln>
+                <a:solidFill>
+                  <a:srgbClr val="0000FF"/>
+                </a:solidFill>
+                <a:effectLst/>
+                <a:latin typeface="Consolas" pitchFamily="49" charset="0"/>
+                <a:cs typeface="Consolas" pitchFamily="49" charset="0"/>
+              </a:rPr>
+              <a:t>class</a:t>
+            </a:r>
+            <a:r>
+              <a:rPr kumimoji="0" lang="en-US" sz="1200" b="0" i="0" u="none" strike="noStrike" cap="none" normalizeH="0" baseline="0" dirty="0" smtClean="0">
+                <a:ln>
+                  <a:noFill/>
+                </a:ln>
+                <a:solidFill>
+                  <a:srgbClr val="000000"/>
+                </a:solidFill>
+                <a:effectLst/>
+                <a:latin typeface="Consolas" pitchFamily="49" charset="0"/>
+                <a:cs typeface="Consolas" pitchFamily="49" charset="0"/>
+              </a:rPr>
+              <a:t> </a:t>
+            </a:r>
+            <a:r>
+              <a:rPr kumimoji="0" lang="en-US" sz="1200" b="0" i="0" u="none" strike="noStrike" cap="none" normalizeH="0" baseline="0" dirty="0" err="1" smtClean="0">
+                <a:ln>
+                  <a:noFill/>
+                </a:ln>
+                <a:solidFill>
+                  <a:srgbClr val="2B91AF"/>
+                </a:solidFill>
+                <a:effectLst/>
+                <a:latin typeface="Consolas" pitchFamily="49" charset="0"/>
+                <a:cs typeface="Consolas" pitchFamily="49" charset="0"/>
+              </a:rPr>
+              <a:t>PersonController</a:t>
+            </a:r>
+            <a:r>
+              <a:rPr kumimoji="0" lang="en-US" sz="1200" b="0" i="0" u="none" strike="noStrike" cap="none" normalizeH="0" baseline="0" dirty="0" smtClean="0">
+                <a:ln>
+                  <a:noFill/>
+                </a:ln>
+                <a:solidFill>
+                  <a:srgbClr val="000000"/>
+                </a:solidFill>
+                <a:effectLst/>
+                <a:latin typeface="Consolas" pitchFamily="49" charset="0"/>
+                <a:cs typeface="Consolas" pitchFamily="49" charset="0"/>
+              </a:rPr>
+              <a:t> : </a:t>
+            </a:r>
+            <a:r>
+              <a:rPr kumimoji="0" lang="en-US" sz="1200" b="0" i="0" u="none" strike="noStrike" cap="none" normalizeH="0" baseline="0" dirty="0" smtClean="0">
+                <a:ln>
+                  <a:noFill/>
+                </a:ln>
+                <a:solidFill>
+                  <a:srgbClr val="2B91AF"/>
+                </a:solidFill>
+                <a:effectLst/>
+                <a:latin typeface="Consolas" pitchFamily="49" charset="0"/>
+                <a:cs typeface="Consolas" pitchFamily="49" charset="0"/>
+              </a:rPr>
+              <a:t>ApiController</a:t>
+            </a:r>
+            <a:r>
+              <a:rPr kumimoji="0" lang="en-US" sz="1200" b="0" i="0" u="none" strike="noStrike" cap="none" normalizeH="0" baseline="0" dirty="0" smtClean="0">
+                <a:ln>
+                  <a:noFill/>
+                </a:ln>
+                <a:solidFill>
+                  <a:srgbClr val="000000"/>
+                </a:solidFill>
+                <a:effectLst/>
+                <a:latin typeface="Consolas" pitchFamily="49" charset="0"/>
+                <a:cs typeface="Consolas" pitchFamily="49" charset="0"/>
+              </a:rPr>
+              <a:t>     </a:t>
+            </a:r>
+          </a:p>
+          <a:p>
+            <a:pPr marL="0" marR="0" lvl="0" indent="0" algn="l" defTabSz="914400" rtl="0" eaLnBrk="1" fontAlgn="base" latinLnBrk="0" hangingPunct="1">
+              <a:lnSpc>
+                <a:spcPct val="100000"/>
+              </a:lnSpc>
+              <a:spcBef>
+                <a:spcPct val="0"/>
+              </a:spcBef>
+              <a:spcAft>
+                <a:spcPct val="0"/>
+              </a:spcAft>
+              <a:buClrTx/>
+              <a:buSzTx/>
+              <a:buFontTx/>
+              <a:buNone/>
+              <a:tabLst/>
+            </a:pPr>
+            <a:r>
+              <a:rPr kumimoji="0" lang="en-US" sz="1200" b="0" i="0" u="none" strike="noStrike" cap="none" normalizeH="0" baseline="0" dirty="0" smtClean="0">
+                <a:ln>
+                  <a:noFill/>
+                </a:ln>
+                <a:solidFill>
+                  <a:srgbClr val="000000"/>
+                </a:solidFill>
+                <a:effectLst/>
+                <a:latin typeface="Consolas" pitchFamily="49" charset="0"/>
+                <a:cs typeface="Consolas" pitchFamily="49" charset="0"/>
+              </a:rPr>
+              <a:t>{         </a:t>
+            </a:r>
+          </a:p>
+          <a:p>
+            <a:pPr marL="0" marR="0" lvl="0" indent="0" algn="l" defTabSz="914400" rtl="0" eaLnBrk="1" fontAlgn="base" latinLnBrk="0" hangingPunct="1">
+              <a:lnSpc>
+                <a:spcPct val="100000"/>
+              </a:lnSpc>
+              <a:spcBef>
+                <a:spcPct val="0"/>
+              </a:spcBef>
+              <a:spcAft>
+                <a:spcPct val="0"/>
+              </a:spcAft>
+              <a:buClrTx/>
+              <a:buSzTx/>
+              <a:buFontTx/>
+              <a:buNone/>
+              <a:tabLst/>
+            </a:pPr>
+            <a:r>
+              <a:rPr lang="en-US" sz="1200" dirty="0" smtClean="0">
+                <a:solidFill>
+                  <a:srgbClr val="000000"/>
+                </a:solidFill>
+                <a:latin typeface="Consolas" pitchFamily="49" charset="0"/>
+                <a:cs typeface="Consolas" pitchFamily="49" charset="0"/>
+              </a:rPr>
+              <a:t>	</a:t>
+            </a:r>
+            <a:r>
+              <a:rPr kumimoji="0" lang="en-US" sz="1200" b="0" i="0" u="none" strike="noStrike" cap="none" normalizeH="0" baseline="0" dirty="0" smtClean="0">
+                <a:ln>
+                  <a:noFill/>
+                </a:ln>
+                <a:solidFill>
+                  <a:srgbClr val="0000FF"/>
+                </a:solidFill>
+                <a:effectLst/>
+                <a:latin typeface="Consolas" pitchFamily="49" charset="0"/>
+                <a:cs typeface="Consolas" pitchFamily="49" charset="0"/>
+              </a:rPr>
+              <a:t>private</a:t>
+            </a:r>
+            <a:r>
+              <a:rPr kumimoji="0" lang="en-US" sz="1200" b="0" i="0" u="none" strike="noStrike" cap="none" normalizeH="0" baseline="0" dirty="0" smtClean="0">
+                <a:ln>
+                  <a:noFill/>
+                </a:ln>
+                <a:solidFill>
+                  <a:srgbClr val="000000"/>
+                </a:solidFill>
+                <a:effectLst/>
+                <a:latin typeface="Consolas" pitchFamily="49" charset="0"/>
+                <a:cs typeface="Consolas" pitchFamily="49" charset="0"/>
+              </a:rPr>
+              <a:t> </a:t>
+            </a:r>
+            <a:r>
+              <a:rPr kumimoji="0" lang="en-US" sz="1200" b="0" i="0" u="none" strike="noStrike" cap="none" normalizeH="0" baseline="0" dirty="0" err="1" smtClean="0">
+                <a:ln>
+                  <a:noFill/>
+                </a:ln>
+                <a:solidFill>
+                  <a:srgbClr val="2B91AF"/>
+                </a:solidFill>
+                <a:effectLst/>
+                <a:latin typeface="Consolas" pitchFamily="49" charset="0"/>
+                <a:cs typeface="Consolas" pitchFamily="49" charset="0"/>
+              </a:rPr>
+              <a:t>IEnumerable</a:t>
+            </a:r>
+            <a:r>
+              <a:rPr kumimoji="0" lang="en-US" sz="1200" b="0" i="0" u="none" strike="noStrike" cap="none" normalizeH="0" baseline="0" dirty="0" smtClean="0">
+                <a:ln>
+                  <a:noFill/>
+                </a:ln>
+                <a:solidFill>
+                  <a:srgbClr val="000000"/>
+                </a:solidFill>
+                <a:effectLst/>
+                <a:latin typeface="Consolas" pitchFamily="49" charset="0"/>
+                <a:cs typeface="Consolas" pitchFamily="49" charset="0"/>
+              </a:rPr>
+              <a:t>&lt;</a:t>
+            </a:r>
+            <a:r>
+              <a:rPr kumimoji="0" lang="en-US" sz="1200" b="0" i="0" u="none" strike="noStrike" cap="none" normalizeH="0" baseline="0" dirty="0" smtClean="0">
+                <a:ln>
+                  <a:noFill/>
+                </a:ln>
+                <a:solidFill>
+                  <a:srgbClr val="2B91AF"/>
+                </a:solidFill>
+                <a:effectLst/>
+                <a:latin typeface="Consolas" pitchFamily="49" charset="0"/>
+                <a:cs typeface="Consolas" pitchFamily="49" charset="0"/>
+              </a:rPr>
+              <a:t>Person</a:t>
+            </a:r>
+            <a:r>
+              <a:rPr kumimoji="0" lang="en-US" sz="1200" b="0" i="0" u="none" strike="noStrike" cap="none" normalizeH="0" baseline="0" dirty="0" smtClean="0">
+                <a:ln>
+                  <a:noFill/>
+                </a:ln>
+                <a:solidFill>
+                  <a:srgbClr val="000000"/>
+                </a:solidFill>
+                <a:effectLst/>
+                <a:latin typeface="Consolas" pitchFamily="49" charset="0"/>
+                <a:cs typeface="Consolas" pitchFamily="49" charset="0"/>
+              </a:rPr>
+              <a:t>&gt; _persons = </a:t>
+            </a:r>
+            <a:r>
+              <a:rPr kumimoji="0" lang="en-US" sz="1200" b="0" i="0" u="none" strike="noStrike" cap="none" normalizeH="0" baseline="0" dirty="0" smtClean="0">
+                <a:ln>
+                  <a:noFill/>
+                </a:ln>
+                <a:solidFill>
+                  <a:srgbClr val="0000FF"/>
+                </a:solidFill>
+                <a:effectLst/>
+                <a:latin typeface="Consolas" pitchFamily="49" charset="0"/>
+                <a:cs typeface="Consolas" pitchFamily="49" charset="0"/>
+              </a:rPr>
+              <a:t>new</a:t>
+            </a:r>
+            <a:r>
+              <a:rPr kumimoji="0" lang="en-US" sz="1200" b="0" i="0" u="none" strike="noStrike" cap="none" normalizeH="0" baseline="0" dirty="0" smtClean="0">
+                <a:ln>
+                  <a:noFill/>
+                </a:ln>
+                <a:solidFill>
+                  <a:srgbClr val="000000"/>
+                </a:solidFill>
+                <a:effectLst/>
+                <a:latin typeface="Consolas" pitchFamily="49" charset="0"/>
+                <a:cs typeface="Consolas" pitchFamily="49" charset="0"/>
+              </a:rPr>
+              <a:t> </a:t>
+            </a:r>
+            <a:r>
+              <a:rPr kumimoji="0" lang="en-US" sz="1200" b="0" i="0" u="none" strike="noStrike" cap="none" normalizeH="0" baseline="0" dirty="0" smtClean="0">
+                <a:ln>
+                  <a:noFill/>
+                </a:ln>
+                <a:solidFill>
+                  <a:srgbClr val="2B91AF"/>
+                </a:solidFill>
+                <a:effectLst/>
+                <a:latin typeface="Consolas" pitchFamily="49" charset="0"/>
+                <a:cs typeface="Consolas" pitchFamily="49" charset="0"/>
+              </a:rPr>
+              <a:t>List</a:t>
+            </a:r>
+            <a:r>
+              <a:rPr kumimoji="0" lang="en-US" sz="1200" b="0" i="0" u="none" strike="noStrike" cap="none" normalizeH="0" baseline="0" dirty="0" smtClean="0">
+                <a:ln>
+                  <a:noFill/>
+                </a:ln>
+                <a:solidFill>
+                  <a:srgbClr val="000000"/>
+                </a:solidFill>
+                <a:effectLst/>
+                <a:latin typeface="Consolas" pitchFamily="49" charset="0"/>
+                <a:cs typeface="Consolas" pitchFamily="49" charset="0"/>
+              </a:rPr>
+              <a:t>&lt;</a:t>
+            </a:r>
+            <a:r>
+              <a:rPr kumimoji="0" lang="en-US" sz="1200" b="0" i="0" u="none" strike="noStrike" cap="none" normalizeH="0" baseline="0" dirty="0" smtClean="0">
+                <a:ln>
+                  <a:noFill/>
+                </a:ln>
+                <a:solidFill>
+                  <a:srgbClr val="2B91AF"/>
+                </a:solidFill>
+                <a:effectLst/>
+                <a:latin typeface="Consolas" pitchFamily="49" charset="0"/>
+                <a:cs typeface="Consolas" pitchFamily="49" charset="0"/>
+              </a:rPr>
+              <a:t>Person</a:t>
+            </a:r>
+            <a:r>
+              <a:rPr kumimoji="0" lang="en-US" sz="1200" b="0" i="0" u="none" strike="noStrike" cap="none" normalizeH="0" baseline="0" dirty="0" smtClean="0">
+                <a:ln>
+                  <a:noFill/>
+                </a:ln>
+                <a:solidFill>
+                  <a:srgbClr val="000000"/>
+                </a:solidFill>
+                <a:effectLst/>
+                <a:latin typeface="Consolas" pitchFamily="49" charset="0"/>
+                <a:cs typeface="Consolas" pitchFamily="49" charset="0"/>
+              </a:rPr>
+              <a:t>&gt;();         </a:t>
+            </a:r>
+          </a:p>
+          <a:p>
+            <a:pPr marL="0" marR="0" lvl="0" indent="0" algn="l" defTabSz="914400" rtl="0" eaLnBrk="1" fontAlgn="base" latinLnBrk="0" hangingPunct="1">
+              <a:lnSpc>
+                <a:spcPct val="100000"/>
+              </a:lnSpc>
+              <a:spcBef>
+                <a:spcPct val="0"/>
+              </a:spcBef>
+              <a:spcAft>
+                <a:spcPct val="0"/>
+              </a:spcAft>
+              <a:buClrTx/>
+              <a:buSzTx/>
+              <a:buFontTx/>
+              <a:buNone/>
+              <a:tabLst/>
+            </a:pPr>
+            <a:r>
+              <a:rPr kumimoji="0" lang="en-US" sz="1200" b="0" i="0" u="none" strike="noStrike" cap="none" normalizeH="0" baseline="0" dirty="0" smtClean="0">
+                <a:ln>
+                  <a:noFill/>
+                </a:ln>
+                <a:solidFill>
+                  <a:srgbClr val="0000FF"/>
+                </a:solidFill>
+                <a:effectLst/>
+                <a:latin typeface="Consolas" pitchFamily="49" charset="0"/>
+                <a:cs typeface="Consolas" pitchFamily="49" charset="0"/>
+              </a:rPr>
+              <a:t>	</a:t>
+            </a:r>
+          </a:p>
+          <a:p>
+            <a:pPr defTabSz="914400" fontAlgn="base">
+              <a:spcBef>
+                <a:spcPct val="0"/>
+              </a:spcBef>
+              <a:spcAft>
+                <a:spcPct val="0"/>
+              </a:spcAft>
+            </a:pPr>
+            <a:r>
+              <a:rPr lang="en-US" sz="1200" dirty="0" smtClean="0">
+                <a:solidFill>
+                  <a:srgbClr val="000000"/>
+                </a:solidFill>
+                <a:latin typeface="Consolas" pitchFamily="49" charset="0"/>
+                <a:cs typeface="Consolas" pitchFamily="49" charset="0"/>
+              </a:rPr>
+              <a:t> 	[</a:t>
+            </a:r>
+            <a:r>
+              <a:rPr lang="en-US" sz="1200" dirty="0" err="1" smtClean="0">
+                <a:solidFill>
+                  <a:srgbClr val="2B91AF"/>
+                </a:solidFill>
+                <a:latin typeface="Consolas" pitchFamily="49" charset="0"/>
+                <a:cs typeface="Consolas" pitchFamily="49" charset="0"/>
+              </a:rPr>
+              <a:t>HttpGet</a:t>
+            </a:r>
+            <a:r>
+              <a:rPr lang="en-US" sz="1200" dirty="0" smtClean="0">
+                <a:solidFill>
+                  <a:srgbClr val="000000"/>
+                </a:solidFill>
+                <a:latin typeface="Consolas" pitchFamily="49" charset="0"/>
+                <a:cs typeface="Consolas" pitchFamily="49" charset="0"/>
+              </a:rPr>
+              <a:t>] </a:t>
+            </a:r>
+            <a:endParaRPr kumimoji="0" lang="en-US" sz="1200" b="0" i="0" u="none" strike="noStrike" cap="none" normalizeH="0" baseline="0" dirty="0" smtClean="0">
+              <a:ln>
+                <a:noFill/>
+              </a:ln>
+              <a:solidFill>
+                <a:srgbClr val="0000FF"/>
+              </a:solidFill>
+              <a:effectLst/>
+              <a:latin typeface="Consolas" pitchFamily="49" charset="0"/>
+              <a:cs typeface="Consolas" pitchFamily="49" charset="0"/>
+            </a:endParaRPr>
+          </a:p>
+          <a:p>
+            <a:pPr marL="0" marR="0" lvl="0" indent="0" algn="l" defTabSz="914400" rtl="0" eaLnBrk="1" fontAlgn="base" latinLnBrk="0" hangingPunct="1">
+              <a:lnSpc>
+                <a:spcPct val="100000"/>
+              </a:lnSpc>
+              <a:spcBef>
+                <a:spcPct val="0"/>
+              </a:spcBef>
+              <a:spcAft>
+                <a:spcPct val="0"/>
+              </a:spcAft>
+              <a:buClrTx/>
+              <a:buSzTx/>
+              <a:buFontTx/>
+              <a:buNone/>
+              <a:tabLst/>
+            </a:pPr>
+            <a:r>
+              <a:rPr lang="en-US" sz="1200" dirty="0" smtClean="0">
+                <a:solidFill>
+                  <a:srgbClr val="0000FF"/>
+                </a:solidFill>
+                <a:latin typeface="Consolas" pitchFamily="49" charset="0"/>
+                <a:cs typeface="Consolas" pitchFamily="49" charset="0"/>
+              </a:rPr>
+              <a:t>	</a:t>
+            </a:r>
+            <a:r>
+              <a:rPr kumimoji="0" lang="en-US" sz="1200" b="0" i="0" u="none" strike="noStrike" cap="none" normalizeH="0" baseline="0" dirty="0" smtClean="0">
+                <a:ln>
+                  <a:noFill/>
+                </a:ln>
+                <a:solidFill>
+                  <a:srgbClr val="0000FF"/>
+                </a:solidFill>
+                <a:effectLst/>
+                <a:latin typeface="Consolas" pitchFamily="49" charset="0"/>
+                <a:cs typeface="Consolas" pitchFamily="49" charset="0"/>
+              </a:rPr>
+              <a:t>public</a:t>
+            </a:r>
+            <a:r>
+              <a:rPr kumimoji="0" lang="en-US" sz="1200" b="0" i="0" u="none" strike="noStrike" cap="none" normalizeH="0" baseline="0" dirty="0" smtClean="0">
+                <a:ln>
+                  <a:noFill/>
+                </a:ln>
+                <a:solidFill>
+                  <a:srgbClr val="000000"/>
+                </a:solidFill>
+                <a:effectLst/>
+                <a:latin typeface="Consolas" pitchFamily="49" charset="0"/>
+                <a:cs typeface="Consolas" pitchFamily="49" charset="0"/>
+              </a:rPr>
+              <a:t> </a:t>
+            </a:r>
+            <a:r>
+              <a:rPr kumimoji="0" lang="en-US" sz="1200" b="0" i="0" u="none" strike="noStrike" cap="none" normalizeH="0" baseline="0" dirty="0" err="1" smtClean="0">
+                <a:ln>
+                  <a:noFill/>
+                </a:ln>
+                <a:solidFill>
+                  <a:srgbClr val="2B91AF"/>
+                </a:solidFill>
+                <a:effectLst/>
+                <a:latin typeface="Consolas" pitchFamily="49" charset="0"/>
+                <a:cs typeface="Consolas" pitchFamily="49" charset="0"/>
+              </a:rPr>
+              <a:t>IEnumerable</a:t>
+            </a:r>
+            <a:r>
+              <a:rPr kumimoji="0" lang="en-US" sz="1200" b="0" i="0" u="none" strike="noStrike" cap="none" normalizeH="0" baseline="0" dirty="0" smtClean="0">
+                <a:ln>
+                  <a:noFill/>
+                </a:ln>
+                <a:solidFill>
+                  <a:srgbClr val="000000"/>
+                </a:solidFill>
+                <a:effectLst/>
+                <a:latin typeface="Consolas" pitchFamily="49" charset="0"/>
+                <a:cs typeface="Consolas" pitchFamily="49" charset="0"/>
+              </a:rPr>
+              <a:t>&lt;</a:t>
+            </a:r>
+            <a:r>
+              <a:rPr kumimoji="0" lang="en-US" sz="1200" b="0" i="0" u="none" strike="noStrike" cap="none" normalizeH="0" baseline="0" dirty="0" smtClean="0">
+                <a:ln>
+                  <a:noFill/>
+                </a:ln>
+                <a:solidFill>
+                  <a:srgbClr val="2B91AF"/>
+                </a:solidFill>
+                <a:effectLst/>
+                <a:latin typeface="Consolas" pitchFamily="49" charset="0"/>
+                <a:cs typeface="Consolas" pitchFamily="49" charset="0"/>
+              </a:rPr>
+              <a:t>Person</a:t>
+            </a:r>
+            <a:r>
+              <a:rPr kumimoji="0" lang="en-US" sz="1200" b="0" i="0" u="none" strike="noStrike" cap="none" normalizeH="0" baseline="0" dirty="0" smtClean="0">
+                <a:ln>
+                  <a:noFill/>
+                </a:ln>
+                <a:solidFill>
+                  <a:srgbClr val="000000"/>
+                </a:solidFill>
+                <a:effectLst/>
+                <a:latin typeface="Consolas" pitchFamily="49" charset="0"/>
+                <a:cs typeface="Consolas" pitchFamily="49" charset="0"/>
+              </a:rPr>
+              <a:t>&gt; </a:t>
+            </a:r>
+            <a:r>
+              <a:rPr kumimoji="0" lang="en-US" sz="1200" b="0" i="0" u="none" strike="noStrike" cap="none" normalizeH="0" baseline="0" dirty="0" err="1" smtClean="0">
+                <a:ln>
+                  <a:noFill/>
+                </a:ln>
+                <a:solidFill>
+                  <a:srgbClr val="000000"/>
+                </a:solidFill>
+                <a:effectLst/>
+                <a:latin typeface="Consolas" pitchFamily="49" charset="0"/>
+                <a:cs typeface="Consolas" pitchFamily="49" charset="0"/>
+              </a:rPr>
+              <a:t>FindAll</a:t>
+            </a:r>
+            <a:r>
+              <a:rPr kumimoji="0" lang="en-US" sz="1200" b="0" i="0" u="none" strike="noStrike" cap="none" normalizeH="0" baseline="0" dirty="0" smtClean="0">
+                <a:ln>
+                  <a:noFill/>
+                </a:ln>
+                <a:solidFill>
+                  <a:srgbClr val="000000"/>
+                </a:solidFill>
+                <a:effectLst/>
+                <a:latin typeface="Consolas" pitchFamily="49" charset="0"/>
+                <a:cs typeface="Consolas" pitchFamily="49" charset="0"/>
+              </a:rPr>
+              <a:t>()         </a:t>
+            </a:r>
+          </a:p>
+          <a:p>
+            <a:pPr marL="0" marR="0" lvl="0" indent="0" algn="l" defTabSz="914400" rtl="0" eaLnBrk="1" fontAlgn="base" latinLnBrk="0" hangingPunct="1">
+              <a:lnSpc>
+                <a:spcPct val="100000"/>
+              </a:lnSpc>
+              <a:spcBef>
+                <a:spcPct val="0"/>
+              </a:spcBef>
+              <a:spcAft>
+                <a:spcPct val="0"/>
+              </a:spcAft>
+              <a:buClrTx/>
+              <a:buSzTx/>
+              <a:buFontTx/>
+              <a:buNone/>
+              <a:tabLst/>
+            </a:pPr>
+            <a:r>
+              <a:rPr lang="en-US" sz="1200" dirty="0" smtClean="0">
+                <a:solidFill>
+                  <a:srgbClr val="000000"/>
+                </a:solidFill>
+                <a:latin typeface="Consolas" pitchFamily="49" charset="0"/>
+                <a:cs typeface="Consolas" pitchFamily="49" charset="0"/>
+              </a:rPr>
+              <a:t>	</a:t>
+            </a:r>
+            <a:r>
+              <a:rPr kumimoji="0" lang="en-US" sz="1200" b="0" i="0" u="none" strike="noStrike" cap="none" normalizeH="0" baseline="0" dirty="0" smtClean="0">
+                <a:ln>
+                  <a:noFill/>
+                </a:ln>
+                <a:solidFill>
+                  <a:srgbClr val="000000"/>
+                </a:solidFill>
+                <a:effectLst/>
+                <a:latin typeface="Consolas" pitchFamily="49" charset="0"/>
+                <a:cs typeface="Consolas" pitchFamily="49" charset="0"/>
+              </a:rPr>
+              <a:t>{             </a:t>
+            </a:r>
+          </a:p>
+          <a:p>
+            <a:pPr marL="0" marR="0" lvl="0" indent="0" algn="l" defTabSz="914400" rtl="0" eaLnBrk="1" fontAlgn="base" latinLnBrk="0" hangingPunct="1">
+              <a:lnSpc>
+                <a:spcPct val="100000"/>
+              </a:lnSpc>
+              <a:spcBef>
+                <a:spcPct val="0"/>
+              </a:spcBef>
+              <a:spcAft>
+                <a:spcPct val="0"/>
+              </a:spcAft>
+              <a:buClrTx/>
+              <a:buSzTx/>
+              <a:buFontTx/>
+              <a:buNone/>
+              <a:tabLst/>
+            </a:pPr>
+            <a:r>
+              <a:rPr lang="en-US" sz="1200" dirty="0" smtClean="0">
+                <a:solidFill>
+                  <a:srgbClr val="000000"/>
+                </a:solidFill>
+                <a:latin typeface="Consolas" pitchFamily="49" charset="0"/>
+                <a:cs typeface="Consolas" pitchFamily="49" charset="0"/>
+              </a:rPr>
+              <a:t>		</a:t>
+            </a:r>
+            <a:r>
+              <a:rPr kumimoji="0" lang="en-US" sz="1200" b="0" i="0" u="none" strike="noStrike" cap="none" normalizeH="0" baseline="0" dirty="0" smtClean="0">
+                <a:ln>
+                  <a:noFill/>
+                </a:ln>
+                <a:solidFill>
+                  <a:srgbClr val="0000FF"/>
+                </a:solidFill>
+                <a:effectLst/>
+                <a:latin typeface="Consolas" pitchFamily="49" charset="0"/>
+                <a:cs typeface="Consolas" pitchFamily="49" charset="0"/>
+              </a:rPr>
+              <a:t>return</a:t>
+            </a:r>
+            <a:r>
+              <a:rPr kumimoji="0" lang="en-US" sz="1200" b="0" i="0" u="none" strike="noStrike" cap="none" normalizeH="0" baseline="0" dirty="0" smtClean="0">
+                <a:ln>
+                  <a:noFill/>
+                </a:ln>
+                <a:solidFill>
+                  <a:srgbClr val="000000"/>
+                </a:solidFill>
+                <a:effectLst/>
+                <a:latin typeface="Consolas" pitchFamily="49" charset="0"/>
+                <a:cs typeface="Consolas" pitchFamily="49" charset="0"/>
+              </a:rPr>
+              <a:t> _persons;         </a:t>
+            </a:r>
+          </a:p>
+          <a:p>
+            <a:pPr marL="0" marR="0" lvl="0" indent="0" algn="l" defTabSz="914400" rtl="0" eaLnBrk="1" fontAlgn="base" latinLnBrk="0" hangingPunct="1">
+              <a:lnSpc>
+                <a:spcPct val="100000"/>
+              </a:lnSpc>
+              <a:spcBef>
+                <a:spcPct val="0"/>
+              </a:spcBef>
+              <a:spcAft>
+                <a:spcPct val="0"/>
+              </a:spcAft>
+              <a:buClrTx/>
+              <a:buSzTx/>
+              <a:buFontTx/>
+              <a:buNone/>
+              <a:tabLst/>
+            </a:pPr>
+            <a:r>
+              <a:rPr lang="en-US" sz="1200" dirty="0" smtClean="0">
+                <a:solidFill>
+                  <a:srgbClr val="000000"/>
+                </a:solidFill>
+                <a:latin typeface="Consolas" pitchFamily="49" charset="0"/>
+                <a:cs typeface="Consolas" pitchFamily="49" charset="0"/>
+              </a:rPr>
+              <a:t>	</a:t>
+            </a:r>
+            <a:r>
+              <a:rPr kumimoji="0" lang="en-US" sz="1200" b="0" i="0" u="none" strike="noStrike" cap="none" normalizeH="0" baseline="0" dirty="0" smtClean="0">
+                <a:ln>
+                  <a:noFill/>
+                </a:ln>
+                <a:solidFill>
+                  <a:srgbClr val="000000"/>
+                </a:solidFill>
+                <a:effectLst/>
+                <a:latin typeface="Consolas" pitchFamily="49" charset="0"/>
+                <a:cs typeface="Consolas" pitchFamily="49" charset="0"/>
+              </a:rPr>
+              <a:t>}     </a:t>
+            </a:r>
+          </a:p>
+          <a:p>
+            <a:pPr marL="0" marR="0" lvl="0" indent="0" algn="l" defTabSz="914400" rtl="0" eaLnBrk="1" fontAlgn="base" latinLnBrk="0" hangingPunct="1">
+              <a:lnSpc>
+                <a:spcPct val="100000"/>
+              </a:lnSpc>
+              <a:spcBef>
+                <a:spcPct val="0"/>
+              </a:spcBef>
+              <a:spcAft>
+                <a:spcPct val="0"/>
+              </a:spcAft>
+              <a:buClrTx/>
+              <a:buSzTx/>
+              <a:buFontTx/>
+              <a:buNone/>
+              <a:tabLst/>
+            </a:pPr>
+            <a:r>
+              <a:rPr kumimoji="0" lang="en-US" sz="1200" b="0" i="0" u="none" strike="noStrike" cap="none" normalizeH="0" baseline="0" dirty="0" smtClean="0">
+                <a:ln>
+                  <a:noFill/>
+                </a:ln>
+                <a:solidFill>
+                  <a:srgbClr val="000000"/>
+                </a:solidFill>
+                <a:effectLst/>
+                <a:latin typeface="Consolas" pitchFamily="49" charset="0"/>
+                <a:cs typeface="Consolas" pitchFamily="49" charset="0"/>
+              </a:rPr>
+              <a:t>}</a:t>
+            </a:r>
+            <a:endParaRPr kumimoji="0" lang="en-US" sz="1200" b="0" i="0" u="none" strike="noStrike" cap="none" normalizeH="0" baseline="0" dirty="0" smtClean="0">
+              <a:ln>
+                <a:noFill/>
+              </a:ln>
+              <a:solidFill>
+                <a:schemeClr val="tx1"/>
+              </a:solidFill>
+              <a:effectLst/>
+              <a:latin typeface="Arial" pitchFamily="34" charset="0"/>
+              <a:cs typeface="Arial" pitchFamily="34" charset="0"/>
+            </a:endParaRPr>
+          </a:p>
+        </p:txBody>
+      </p:sp>
+    </p:spTree>
+  </p:cSld>
+  <p:clrMapOvr>
+    <a:masterClrMapping/>
+  </p:clrMapOvr>
+  <p:transition>
+    <p:fade thruBlk="1"/>
+  </p:transition>
+  <p:timing>
+    <p:tnLst>
+      <p:par>
+        <p:cTn id="1" dur="indefinite" restart="never" nodeType="tmRoot"/>
+      </p:par>
+    </p:tnLst>
+  </p:timing>
+</p:sld>
+</file>
+
+<file path=ppt/slides/slide11.xml><?xml version="1.0" encoding="utf-8"?>
 <p:sld xmlns:a="http://schemas.openxmlformats.org/drawingml/2006/main" xmlns:r="http://schemas.openxmlformats.org/officeDocument/2006/relationships" xmlns:p="http://schemas.openxmlformats.org/presentationml/2006/main">
   <p:cSld>
     <p:spTree>
@@ -10941,7 +12852,7 @@
             <a:fld id="{FF67BF5B-7344-D747-A0C2-CBD7B2ACBC85}" type="slidenum">
               <a:rPr lang="en-US" smtClean="0"/>
               <a:pPr/>
-              <a:t>10</a:t>
+              <a:t>11</a:t>
             </a:fld>
             <a:endParaRPr lang="en-US" dirty="0"/>
           </a:p>
@@ -11941,1686 +13852,6 @@
 </p:sld>
 </file>
 
-<file path=ppt/slides/slide11.xml><?xml version="1.0" encoding="utf-8"?>
-<p:sld xmlns:a="http://schemas.openxmlformats.org/drawingml/2006/main" xmlns:r="http://schemas.openxmlformats.org/officeDocument/2006/relationships" xmlns:p="http://schemas.openxmlformats.org/presentationml/2006/main">
-  <p:cSld>
-    <p:spTree>
-      <p:nvGrpSpPr>
-        <p:cNvPr id="1" name=""/>
-        <p:cNvGrpSpPr/>
-        <p:nvPr/>
-      </p:nvGrpSpPr>
-      <p:grpSpPr>
-        <a:xfrm>
-          <a:off x="0" y="0"/>
-          <a:ext cx="0" cy="0"/>
-          <a:chOff x="0" y="0"/>
-          <a:chExt cx="0" cy="0"/>
-        </a:xfrm>
-      </p:grpSpPr>
-      <p:sp>
-        <p:nvSpPr>
-          <p:cNvPr id="2" name="Title 1"/>
-          <p:cNvSpPr>
-            <a:spLocks noGrp="1"/>
-          </p:cNvSpPr>
-          <p:nvPr>
-            <p:ph type="title"/>
-          </p:nvPr>
-        </p:nvSpPr>
-        <p:spPr>
-          <a:xfrm>
-            <a:off x="321623" y="418905"/>
-            <a:ext cx="2306722" cy="307777"/>
-          </a:xfrm>
-        </p:spPr>
-        <p:txBody>
-          <a:bodyPr/>
-          <a:lstStyle/>
-          <a:p>
-            <a:r>
-              <a:rPr lang="nb-NO" dirty="0" smtClean="0"/>
-              <a:t>Routing forts</a:t>
-            </a:r>
-            <a:endParaRPr lang="en-US" dirty="0"/>
-          </a:p>
-        </p:txBody>
-      </p:sp>
-      <p:sp>
-        <p:nvSpPr>
-          <p:cNvPr id="3" name="Slide Number Placeholder 2"/>
-          <p:cNvSpPr>
-            <a:spLocks noGrp="1"/>
-          </p:cNvSpPr>
-          <p:nvPr>
-            <p:ph type="sldNum" sz="quarter" idx="10"/>
-          </p:nvPr>
-        </p:nvSpPr>
-        <p:spPr/>
-        <p:txBody>
-          <a:bodyPr/>
-          <a:lstStyle/>
-          <a:p>
-            <a:fld id="{FF67BF5B-7344-D747-A0C2-CBD7B2ACBC85}" type="slidenum">
-              <a:rPr lang="en-US" smtClean="0"/>
-              <a:pPr/>
-              <a:t>11</a:t>
-            </a:fld>
-            <a:endParaRPr lang="en-US" dirty="0"/>
-          </a:p>
-        </p:txBody>
-      </p:sp>
-      <p:sp>
-        <p:nvSpPr>
-          <p:cNvPr id="5" name="Rectangle 1"/>
-          <p:cNvSpPr>
-            <a:spLocks noChangeArrowheads="1"/>
-          </p:cNvSpPr>
-          <p:nvPr/>
-        </p:nvSpPr>
-        <p:spPr bwMode="auto">
-          <a:xfrm>
-            <a:off x="499873" y="1152109"/>
-            <a:ext cx="8231434" cy="1754326"/>
-          </a:xfrm>
-          <a:prstGeom prst="rect">
-            <a:avLst/>
-          </a:prstGeom>
-          <a:solidFill>
-            <a:srgbClr val="FFFFFF"/>
-          </a:solidFill>
-          <a:ln w="9525">
-            <a:solidFill>
-              <a:schemeClr val="accent1"/>
-            </a:solidFill>
-            <a:miter lim="800000"/>
-            <a:headEnd/>
-            <a:tailEnd/>
-          </a:ln>
-          <a:effectLst/>
-        </p:spPr>
-        <p:txBody>
-          <a:bodyPr vert="horz" wrap="square" lIns="91440" tIns="45720" rIns="91440" bIns="45720" numCol="1" anchor="ctr" anchorCtr="0" compatLnSpc="1">
-            <a:prstTxWarp prst="textNoShape">
-              <a:avLst/>
-            </a:prstTxWarp>
-            <a:spAutoFit/>
-          </a:bodyPr>
-          <a:lstStyle/>
-          <a:p>
-            <a:pPr marL="0" marR="0" lvl="0" indent="0" algn="l" defTabSz="914400" rtl="0" eaLnBrk="1" fontAlgn="base" latinLnBrk="0" hangingPunct="1">
-              <a:lnSpc>
-                <a:spcPct val="100000"/>
-              </a:lnSpc>
-              <a:spcBef>
-                <a:spcPct val="0"/>
-              </a:spcBef>
-              <a:spcAft>
-                <a:spcPct val="0"/>
-              </a:spcAft>
-              <a:buClrTx/>
-              <a:buSzTx/>
-              <a:buFontTx/>
-              <a:buNone/>
-              <a:tabLst/>
-            </a:pPr>
-            <a:r>
-              <a:rPr kumimoji="0" lang="en-US" sz="1200" b="0" i="0" u="none" strike="noStrike" cap="none" normalizeH="0" baseline="0" dirty="0" smtClean="0">
-                <a:ln>
-                  <a:noFill/>
-                </a:ln>
-                <a:solidFill>
-                  <a:srgbClr val="0000FF"/>
-                </a:solidFill>
-                <a:effectLst/>
-                <a:latin typeface="Consolas" pitchFamily="49" charset="0"/>
-                <a:cs typeface="Consolas" pitchFamily="49" charset="0"/>
-              </a:rPr>
-              <a:t>public</a:t>
-            </a:r>
-            <a:r>
-              <a:rPr kumimoji="0" lang="en-US" sz="1200" b="0" i="0" u="none" strike="noStrike" cap="none" normalizeH="0" baseline="0" dirty="0" smtClean="0">
-                <a:ln>
-                  <a:noFill/>
-                </a:ln>
-                <a:solidFill>
-                  <a:srgbClr val="000000"/>
-                </a:solidFill>
-                <a:effectLst/>
-                <a:latin typeface="Consolas" pitchFamily="49" charset="0"/>
-                <a:cs typeface="Consolas" pitchFamily="49" charset="0"/>
-              </a:rPr>
-              <a:t> </a:t>
-            </a:r>
-            <a:r>
-              <a:rPr kumimoji="0" lang="en-US" sz="1200" b="0" i="0" u="none" strike="noStrike" cap="none" normalizeH="0" baseline="0" dirty="0" smtClean="0">
-                <a:ln>
-                  <a:noFill/>
-                </a:ln>
-                <a:solidFill>
-                  <a:srgbClr val="0000FF"/>
-                </a:solidFill>
-                <a:effectLst/>
-                <a:latin typeface="Consolas" pitchFamily="49" charset="0"/>
-                <a:cs typeface="Consolas" pitchFamily="49" charset="0"/>
-              </a:rPr>
-              <a:t>class</a:t>
-            </a:r>
-            <a:r>
-              <a:rPr kumimoji="0" lang="en-US" sz="1200" b="0" i="0" u="none" strike="noStrike" cap="none" normalizeH="0" baseline="0" dirty="0" smtClean="0">
-                <a:ln>
-                  <a:noFill/>
-                </a:ln>
-                <a:solidFill>
-                  <a:srgbClr val="000000"/>
-                </a:solidFill>
-                <a:effectLst/>
-                <a:latin typeface="Consolas" pitchFamily="49" charset="0"/>
-                <a:cs typeface="Consolas" pitchFamily="49" charset="0"/>
-              </a:rPr>
-              <a:t> </a:t>
-            </a:r>
-            <a:r>
-              <a:rPr kumimoji="0" lang="en-US" sz="1200" b="0" i="0" u="none" strike="noStrike" cap="none" normalizeH="0" baseline="0" dirty="0" err="1" smtClean="0">
-                <a:ln>
-                  <a:noFill/>
-                </a:ln>
-                <a:solidFill>
-                  <a:srgbClr val="2B91AF"/>
-                </a:solidFill>
-                <a:effectLst/>
-                <a:latin typeface="Consolas" pitchFamily="49" charset="0"/>
-                <a:cs typeface="Consolas" pitchFamily="49" charset="0"/>
-              </a:rPr>
-              <a:t>PersonController</a:t>
-            </a:r>
-            <a:r>
-              <a:rPr kumimoji="0" lang="en-US" sz="1200" b="0" i="0" u="none" strike="noStrike" cap="none" normalizeH="0" baseline="0" dirty="0" smtClean="0">
-                <a:ln>
-                  <a:noFill/>
-                </a:ln>
-                <a:solidFill>
-                  <a:srgbClr val="000000"/>
-                </a:solidFill>
-                <a:effectLst/>
-                <a:latin typeface="Consolas" pitchFamily="49" charset="0"/>
-                <a:cs typeface="Consolas" pitchFamily="49" charset="0"/>
-              </a:rPr>
-              <a:t> : </a:t>
-            </a:r>
-            <a:r>
-              <a:rPr kumimoji="0" lang="en-US" sz="1200" b="0" i="0" u="none" strike="noStrike" cap="none" normalizeH="0" baseline="0" dirty="0" smtClean="0">
-                <a:ln>
-                  <a:noFill/>
-                </a:ln>
-                <a:solidFill>
-                  <a:srgbClr val="2B91AF"/>
-                </a:solidFill>
-                <a:effectLst/>
-                <a:latin typeface="Consolas" pitchFamily="49" charset="0"/>
-                <a:cs typeface="Consolas" pitchFamily="49" charset="0"/>
-              </a:rPr>
-              <a:t>ApiController</a:t>
-            </a:r>
-            <a:r>
-              <a:rPr kumimoji="0" lang="en-US" sz="1200" b="0" i="0" u="none" strike="noStrike" cap="none" normalizeH="0" baseline="0" dirty="0" smtClean="0">
-                <a:ln>
-                  <a:noFill/>
-                </a:ln>
-                <a:solidFill>
-                  <a:srgbClr val="000000"/>
-                </a:solidFill>
-                <a:effectLst/>
-                <a:latin typeface="Consolas" pitchFamily="49" charset="0"/>
-                <a:cs typeface="Consolas" pitchFamily="49" charset="0"/>
-              </a:rPr>
-              <a:t>     </a:t>
-            </a:r>
-          </a:p>
-          <a:p>
-            <a:pPr marL="0" marR="0" lvl="0" indent="0" algn="l" defTabSz="914400" rtl="0" eaLnBrk="1" fontAlgn="base" latinLnBrk="0" hangingPunct="1">
-              <a:lnSpc>
-                <a:spcPct val="100000"/>
-              </a:lnSpc>
-              <a:spcBef>
-                <a:spcPct val="0"/>
-              </a:spcBef>
-              <a:spcAft>
-                <a:spcPct val="0"/>
-              </a:spcAft>
-              <a:buClrTx/>
-              <a:buSzTx/>
-              <a:buFontTx/>
-              <a:buNone/>
-              <a:tabLst/>
-            </a:pPr>
-            <a:r>
-              <a:rPr kumimoji="0" lang="en-US" sz="1200" b="0" i="0" u="none" strike="noStrike" cap="none" normalizeH="0" baseline="0" dirty="0" smtClean="0">
-                <a:ln>
-                  <a:noFill/>
-                </a:ln>
-                <a:solidFill>
-                  <a:srgbClr val="000000"/>
-                </a:solidFill>
-                <a:effectLst/>
-                <a:latin typeface="Consolas" pitchFamily="49" charset="0"/>
-                <a:cs typeface="Consolas" pitchFamily="49" charset="0"/>
-              </a:rPr>
-              <a:t>{         </a:t>
-            </a:r>
-          </a:p>
-          <a:p>
-            <a:pPr marL="0" marR="0" lvl="0" indent="0" algn="l" defTabSz="914400" rtl="0" eaLnBrk="1" fontAlgn="base" latinLnBrk="0" hangingPunct="1">
-              <a:lnSpc>
-                <a:spcPct val="100000"/>
-              </a:lnSpc>
-              <a:spcBef>
-                <a:spcPct val="0"/>
-              </a:spcBef>
-              <a:spcAft>
-                <a:spcPct val="0"/>
-              </a:spcAft>
-              <a:buClrTx/>
-              <a:buSzTx/>
-              <a:buFontTx/>
-              <a:buNone/>
-              <a:tabLst/>
-            </a:pPr>
-            <a:r>
-              <a:rPr lang="en-US" sz="1200" dirty="0" smtClean="0">
-                <a:solidFill>
-                  <a:srgbClr val="000000"/>
-                </a:solidFill>
-                <a:latin typeface="Consolas" pitchFamily="49" charset="0"/>
-                <a:cs typeface="Consolas" pitchFamily="49" charset="0"/>
-              </a:rPr>
-              <a:t>	</a:t>
-            </a:r>
-            <a:r>
-              <a:rPr kumimoji="0" lang="en-US" sz="1200" b="0" i="0" u="none" strike="noStrike" cap="none" normalizeH="0" baseline="0" dirty="0" smtClean="0">
-                <a:ln>
-                  <a:noFill/>
-                </a:ln>
-                <a:solidFill>
-                  <a:srgbClr val="0000FF"/>
-                </a:solidFill>
-                <a:effectLst/>
-                <a:latin typeface="Consolas" pitchFamily="49" charset="0"/>
-                <a:cs typeface="Consolas" pitchFamily="49" charset="0"/>
-              </a:rPr>
-              <a:t>private</a:t>
-            </a:r>
-            <a:r>
-              <a:rPr kumimoji="0" lang="en-US" sz="1200" b="0" i="0" u="none" strike="noStrike" cap="none" normalizeH="0" baseline="0" dirty="0" smtClean="0">
-                <a:ln>
-                  <a:noFill/>
-                </a:ln>
-                <a:solidFill>
-                  <a:srgbClr val="000000"/>
-                </a:solidFill>
-                <a:effectLst/>
-                <a:latin typeface="Consolas" pitchFamily="49" charset="0"/>
-                <a:cs typeface="Consolas" pitchFamily="49" charset="0"/>
-              </a:rPr>
-              <a:t> </a:t>
-            </a:r>
-            <a:r>
-              <a:rPr kumimoji="0" lang="en-US" sz="1200" b="0" i="0" u="none" strike="noStrike" cap="none" normalizeH="0" baseline="0" dirty="0" err="1" smtClean="0">
-                <a:ln>
-                  <a:noFill/>
-                </a:ln>
-                <a:solidFill>
-                  <a:srgbClr val="2B91AF"/>
-                </a:solidFill>
-                <a:effectLst/>
-                <a:latin typeface="Consolas" pitchFamily="49" charset="0"/>
-                <a:cs typeface="Consolas" pitchFamily="49" charset="0"/>
-              </a:rPr>
-              <a:t>IEnumerable</a:t>
-            </a:r>
-            <a:r>
-              <a:rPr kumimoji="0" lang="en-US" sz="1200" b="0" i="0" u="none" strike="noStrike" cap="none" normalizeH="0" baseline="0" dirty="0" smtClean="0">
-                <a:ln>
-                  <a:noFill/>
-                </a:ln>
-                <a:solidFill>
-                  <a:srgbClr val="000000"/>
-                </a:solidFill>
-                <a:effectLst/>
-                <a:latin typeface="Consolas" pitchFamily="49" charset="0"/>
-                <a:cs typeface="Consolas" pitchFamily="49" charset="0"/>
-              </a:rPr>
-              <a:t>&lt;</a:t>
-            </a:r>
-            <a:r>
-              <a:rPr kumimoji="0" lang="en-US" sz="1200" b="0" i="0" u="none" strike="noStrike" cap="none" normalizeH="0" baseline="0" dirty="0" smtClean="0">
-                <a:ln>
-                  <a:noFill/>
-                </a:ln>
-                <a:solidFill>
-                  <a:srgbClr val="2B91AF"/>
-                </a:solidFill>
-                <a:effectLst/>
-                <a:latin typeface="Consolas" pitchFamily="49" charset="0"/>
-                <a:cs typeface="Consolas" pitchFamily="49" charset="0"/>
-              </a:rPr>
-              <a:t>Person</a:t>
-            </a:r>
-            <a:r>
-              <a:rPr kumimoji="0" lang="en-US" sz="1200" b="0" i="0" u="none" strike="noStrike" cap="none" normalizeH="0" baseline="0" dirty="0" smtClean="0">
-                <a:ln>
-                  <a:noFill/>
-                </a:ln>
-                <a:solidFill>
-                  <a:srgbClr val="000000"/>
-                </a:solidFill>
-                <a:effectLst/>
-                <a:latin typeface="Consolas" pitchFamily="49" charset="0"/>
-                <a:cs typeface="Consolas" pitchFamily="49" charset="0"/>
-              </a:rPr>
-              <a:t>&gt; _persons = </a:t>
-            </a:r>
-            <a:r>
-              <a:rPr kumimoji="0" lang="en-US" sz="1200" b="0" i="0" u="none" strike="noStrike" cap="none" normalizeH="0" baseline="0" dirty="0" smtClean="0">
-                <a:ln>
-                  <a:noFill/>
-                </a:ln>
-                <a:solidFill>
-                  <a:srgbClr val="0000FF"/>
-                </a:solidFill>
-                <a:effectLst/>
-                <a:latin typeface="Consolas" pitchFamily="49" charset="0"/>
-                <a:cs typeface="Consolas" pitchFamily="49" charset="0"/>
-              </a:rPr>
-              <a:t>new</a:t>
-            </a:r>
-            <a:r>
-              <a:rPr kumimoji="0" lang="en-US" sz="1200" b="0" i="0" u="none" strike="noStrike" cap="none" normalizeH="0" baseline="0" dirty="0" smtClean="0">
-                <a:ln>
-                  <a:noFill/>
-                </a:ln>
-                <a:solidFill>
-                  <a:srgbClr val="000000"/>
-                </a:solidFill>
-                <a:effectLst/>
-                <a:latin typeface="Consolas" pitchFamily="49" charset="0"/>
-                <a:cs typeface="Consolas" pitchFamily="49" charset="0"/>
-              </a:rPr>
-              <a:t> </a:t>
-            </a:r>
-            <a:r>
-              <a:rPr kumimoji="0" lang="en-US" sz="1200" b="0" i="0" u="none" strike="noStrike" cap="none" normalizeH="0" baseline="0" dirty="0" smtClean="0">
-                <a:ln>
-                  <a:noFill/>
-                </a:ln>
-                <a:solidFill>
-                  <a:srgbClr val="2B91AF"/>
-                </a:solidFill>
-                <a:effectLst/>
-                <a:latin typeface="Consolas" pitchFamily="49" charset="0"/>
-                <a:cs typeface="Consolas" pitchFamily="49" charset="0"/>
-              </a:rPr>
-              <a:t>List</a:t>
-            </a:r>
-            <a:r>
-              <a:rPr kumimoji="0" lang="en-US" sz="1200" b="0" i="0" u="none" strike="noStrike" cap="none" normalizeH="0" baseline="0" dirty="0" smtClean="0">
-                <a:ln>
-                  <a:noFill/>
-                </a:ln>
-                <a:solidFill>
-                  <a:srgbClr val="000000"/>
-                </a:solidFill>
-                <a:effectLst/>
-                <a:latin typeface="Consolas" pitchFamily="49" charset="0"/>
-                <a:cs typeface="Consolas" pitchFamily="49" charset="0"/>
-              </a:rPr>
-              <a:t>&lt;</a:t>
-            </a:r>
-            <a:r>
-              <a:rPr kumimoji="0" lang="en-US" sz="1200" b="0" i="0" u="none" strike="noStrike" cap="none" normalizeH="0" baseline="0" dirty="0" smtClean="0">
-                <a:ln>
-                  <a:noFill/>
-                </a:ln>
-                <a:solidFill>
-                  <a:srgbClr val="2B91AF"/>
-                </a:solidFill>
-                <a:effectLst/>
-                <a:latin typeface="Consolas" pitchFamily="49" charset="0"/>
-                <a:cs typeface="Consolas" pitchFamily="49" charset="0"/>
-              </a:rPr>
-              <a:t>Person</a:t>
-            </a:r>
-            <a:r>
-              <a:rPr kumimoji="0" lang="en-US" sz="1200" b="0" i="0" u="none" strike="noStrike" cap="none" normalizeH="0" baseline="0" dirty="0" smtClean="0">
-                <a:ln>
-                  <a:noFill/>
-                </a:ln>
-                <a:solidFill>
-                  <a:srgbClr val="000000"/>
-                </a:solidFill>
-                <a:effectLst/>
-                <a:latin typeface="Consolas" pitchFamily="49" charset="0"/>
-                <a:cs typeface="Consolas" pitchFamily="49" charset="0"/>
-              </a:rPr>
-              <a:t>&gt;();         </a:t>
-            </a:r>
-          </a:p>
-          <a:p>
-            <a:pPr marL="0" marR="0" lvl="0" indent="0" algn="l" defTabSz="914400" rtl="0" eaLnBrk="1" fontAlgn="base" latinLnBrk="0" hangingPunct="1">
-              <a:lnSpc>
-                <a:spcPct val="100000"/>
-              </a:lnSpc>
-              <a:spcBef>
-                <a:spcPct val="0"/>
-              </a:spcBef>
-              <a:spcAft>
-                <a:spcPct val="0"/>
-              </a:spcAft>
-              <a:buClrTx/>
-              <a:buSzTx/>
-              <a:buFontTx/>
-              <a:buNone/>
-              <a:tabLst/>
-            </a:pPr>
-            <a:r>
-              <a:rPr kumimoji="0" lang="en-US" sz="1200" b="0" i="0" u="none" strike="noStrike" cap="none" normalizeH="0" baseline="0" dirty="0" smtClean="0">
-                <a:ln>
-                  <a:noFill/>
-                </a:ln>
-                <a:solidFill>
-                  <a:srgbClr val="0000FF"/>
-                </a:solidFill>
-                <a:effectLst/>
-                <a:latin typeface="Consolas" pitchFamily="49" charset="0"/>
-                <a:cs typeface="Consolas" pitchFamily="49" charset="0"/>
-              </a:rPr>
-              <a:t>	</a:t>
-            </a:r>
-          </a:p>
-          <a:p>
-            <a:pPr marL="0" marR="0" lvl="0" indent="0" algn="l" defTabSz="914400" rtl="0" eaLnBrk="1" fontAlgn="base" latinLnBrk="0" hangingPunct="1">
-              <a:lnSpc>
-                <a:spcPct val="100000"/>
-              </a:lnSpc>
-              <a:spcBef>
-                <a:spcPct val="0"/>
-              </a:spcBef>
-              <a:spcAft>
-                <a:spcPct val="0"/>
-              </a:spcAft>
-              <a:buClrTx/>
-              <a:buSzTx/>
-              <a:buFontTx/>
-              <a:buNone/>
-              <a:tabLst/>
-            </a:pPr>
-            <a:r>
-              <a:rPr lang="en-US" sz="1200" dirty="0" smtClean="0">
-                <a:solidFill>
-                  <a:srgbClr val="0000FF"/>
-                </a:solidFill>
-                <a:latin typeface="Consolas" pitchFamily="49" charset="0"/>
-                <a:cs typeface="Consolas" pitchFamily="49" charset="0"/>
-              </a:rPr>
-              <a:t>	</a:t>
-            </a:r>
-            <a:r>
-              <a:rPr kumimoji="0" lang="en-US" sz="1200" b="0" i="0" u="none" strike="noStrike" cap="none" normalizeH="0" baseline="0" dirty="0" smtClean="0">
-                <a:ln>
-                  <a:noFill/>
-                </a:ln>
-                <a:solidFill>
-                  <a:srgbClr val="0000FF"/>
-                </a:solidFill>
-                <a:effectLst/>
-                <a:latin typeface="Consolas" pitchFamily="49" charset="0"/>
-                <a:cs typeface="Consolas" pitchFamily="49" charset="0"/>
-              </a:rPr>
-              <a:t>public</a:t>
-            </a:r>
-            <a:r>
-              <a:rPr kumimoji="0" lang="en-US" sz="1200" b="0" i="0" u="none" strike="noStrike" cap="none" normalizeH="0" baseline="0" dirty="0" smtClean="0">
-                <a:ln>
-                  <a:noFill/>
-                </a:ln>
-                <a:solidFill>
-                  <a:srgbClr val="000000"/>
-                </a:solidFill>
-                <a:effectLst/>
-                <a:latin typeface="Consolas" pitchFamily="49" charset="0"/>
-                <a:cs typeface="Consolas" pitchFamily="49" charset="0"/>
-              </a:rPr>
-              <a:t> </a:t>
-            </a:r>
-            <a:r>
-              <a:rPr kumimoji="0" lang="en-US" sz="1200" b="0" i="0" u="none" strike="noStrike" cap="none" normalizeH="0" baseline="0" dirty="0" err="1" smtClean="0">
-                <a:ln>
-                  <a:noFill/>
-                </a:ln>
-                <a:solidFill>
-                  <a:srgbClr val="2B91AF"/>
-                </a:solidFill>
-                <a:effectLst/>
-                <a:latin typeface="Consolas" pitchFamily="49" charset="0"/>
-                <a:cs typeface="Consolas" pitchFamily="49" charset="0"/>
-              </a:rPr>
-              <a:t>IEnumerable</a:t>
-            </a:r>
-            <a:r>
-              <a:rPr kumimoji="0" lang="en-US" sz="1200" b="0" i="0" u="none" strike="noStrike" cap="none" normalizeH="0" baseline="0" dirty="0" smtClean="0">
-                <a:ln>
-                  <a:noFill/>
-                </a:ln>
-                <a:solidFill>
-                  <a:srgbClr val="000000"/>
-                </a:solidFill>
-                <a:effectLst/>
-                <a:latin typeface="Consolas" pitchFamily="49" charset="0"/>
-                <a:cs typeface="Consolas" pitchFamily="49" charset="0"/>
-              </a:rPr>
-              <a:t>&lt;</a:t>
-            </a:r>
-            <a:r>
-              <a:rPr kumimoji="0" lang="en-US" sz="1200" b="0" i="0" u="none" strike="noStrike" cap="none" normalizeH="0" baseline="0" dirty="0" smtClean="0">
-                <a:ln>
-                  <a:noFill/>
-                </a:ln>
-                <a:solidFill>
-                  <a:srgbClr val="2B91AF"/>
-                </a:solidFill>
-                <a:effectLst/>
-                <a:latin typeface="Consolas" pitchFamily="49" charset="0"/>
-                <a:cs typeface="Consolas" pitchFamily="49" charset="0"/>
-              </a:rPr>
-              <a:t>Person</a:t>
-            </a:r>
-            <a:r>
-              <a:rPr kumimoji="0" lang="en-US" sz="1200" b="0" i="0" u="none" strike="noStrike" cap="none" normalizeH="0" baseline="0" dirty="0" smtClean="0">
-                <a:ln>
-                  <a:noFill/>
-                </a:ln>
-                <a:solidFill>
-                  <a:srgbClr val="000000"/>
-                </a:solidFill>
-                <a:effectLst/>
-                <a:latin typeface="Consolas" pitchFamily="49" charset="0"/>
-                <a:cs typeface="Consolas" pitchFamily="49" charset="0"/>
-              </a:rPr>
-              <a:t>&gt; Get()         </a:t>
-            </a:r>
-          </a:p>
-          <a:p>
-            <a:pPr marL="0" marR="0" lvl="0" indent="0" algn="l" defTabSz="914400" rtl="0" eaLnBrk="1" fontAlgn="base" latinLnBrk="0" hangingPunct="1">
-              <a:lnSpc>
-                <a:spcPct val="100000"/>
-              </a:lnSpc>
-              <a:spcBef>
-                <a:spcPct val="0"/>
-              </a:spcBef>
-              <a:spcAft>
-                <a:spcPct val="0"/>
-              </a:spcAft>
-              <a:buClrTx/>
-              <a:buSzTx/>
-              <a:buFontTx/>
-              <a:buNone/>
-              <a:tabLst/>
-            </a:pPr>
-            <a:r>
-              <a:rPr lang="en-US" sz="1200" dirty="0" smtClean="0">
-                <a:solidFill>
-                  <a:srgbClr val="000000"/>
-                </a:solidFill>
-                <a:latin typeface="Consolas" pitchFamily="49" charset="0"/>
-                <a:cs typeface="Consolas" pitchFamily="49" charset="0"/>
-              </a:rPr>
-              <a:t>	</a:t>
-            </a:r>
-            <a:r>
-              <a:rPr kumimoji="0" lang="en-US" sz="1200" b="0" i="0" u="none" strike="noStrike" cap="none" normalizeH="0" baseline="0" dirty="0" smtClean="0">
-                <a:ln>
-                  <a:noFill/>
-                </a:ln>
-                <a:solidFill>
-                  <a:srgbClr val="000000"/>
-                </a:solidFill>
-                <a:effectLst/>
-                <a:latin typeface="Consolas" pitchFamily="49" charset="0"/>
-                <a:cs typeface="Consolas" pitchFamily="49" charset="0"/>
-              </a:rPr>
-              <a:t>{             </a:t>
-            </a:r>
-          </a:p>
-          <a:p>
-            <a:pPr marL="0" marR="0" lvl="0" indent="0" algn="l" defTabSz="914400" rtl="0" eaLnBrk="1" fontAlgn="base" latinLnBrk="0" hangingPunct="1">
-              <a:lnSpc>
-                <a:spcPct val="100000"/>
-              </a:lnSpc>
-              <a:spcBef>
-                <a:spcPct val="0"/>
-              </a:spcBef>
-              <a:spcAft>
-                <a:spcPct val="0"/>
-              </a:spcAft>
-              <a:buClrTx/>
-              <a:buSzTx/>
-              <a:buFontTx/>
-              <a:buNone/>
-              <a:tabLst/>
-            </a:pPr>
-            <a:r>
-              <a:rPr lang="en-US" sz="1200" dirty="0" smtClean="0">
-                <a:solidFill>
-                  <a:srgbClr val="000000"/>
-                </a:solidFill>
-                <a:latin typeface="Consolas" pitchFamily="49" charset="0"/>
-                <a:cs typeface="Consolas" pitchFamily="49" charset="0"/>
-              </a:rPr>
-              <a:t>		</a:t>
-            </a:r>
-            <a:r>
-              <a:rPr kumimoji="0" lang="en-US" sz="1200" b="0" i="0" u="none" strike="noStrike" cap="none" normalizeH="0" baseline="0" dirty="0" smtClean="0">
-                <a:ln>
-                  <a:noFill/>
-                </a:ln>
-                <a:solidFill>
-                  <a:srgbClr val="0000FF"/>
-                </a:solidFill>
-                <a:effectLst/>
-                <a:latin typeface="Consolas" pitchFamily="49" charset="0"/>
-                <a:cs typeface="Consolas" pitchFamily="49" charset="0"/>
-              </a:rPr>
-              <a:t>return</a:t>
-            </a:r>
-            <a:r>
-              <a:rPr kumimoji="0" lang="en-US" sz="1200" b="0" i="0" u="none" strike="noStrike" cap="none" normalizeH="0" baseline="0" dirty="0" smtClean="0">
-                <a:ln>
-                  <a:noFill/>
-                </a:ln>
-                <a:solidFill>
-                  <a:srgbClr val="000000"/>
-                </a:solidFill>
-                <a:effectLst/>
-                <a:latin typeface="Consolas" pitchFamily="49" charset="0"/>
-                <a:cs typeface="Consolas" pitchFamily="49" charset="0"/>
-              </a:rPr>
-              <a:t> _persons;         </a:t>
-            </a:r>
-          </a:p>
-          <a:p>
-            <a:pPr marL="0" marR="0" lvl="0" indent="0" algn="l" defTabSz="914400" rtl="0" eaLnBrk="1" fontAlgn="base" latinLnBrk="0" hangingPunct="1">
-              <a:lnSpc>
-                <a:spcPct val="100000"/>
-              </a:lnSpc>
-              <a:spcBef>
-                <a:spcPct val="0"/>
-              </a:spcBef>
-              <a:spcAft>
-                <a:spcPct val="0"/>
-              </a:spcAft>
-              <a:buClrTx/>
-              <a:buSzTx/>
-              <a:buFontTx/>
-              <a:buNone/>
-              <a:tabLst/>
-            </a:pPr>
-            <a:r>
-              <a:rPr lang="en-US" sz="1200" dirty="0" smtClean="0">
-                <a:solidFill>
-                  <a:srgbClr val="000000"/>
-                </a:solidFill>
-                <a:latin typeface="Consolas" pitchFamily="49" charset="0"/>
-                <a:cs typeface="Consolas" pitchFamily="49" charset="0"/>
-              </a:rPr>
-              <a:t>	</a:t>
-            </a:r>
-            <a:r>
-              <a:rPr kumimoji="0" lang="en-US" sz="1200" b="0" i="0" u="none" strike="noStrike" cap="none" normalizeH="0" baseline="0" dirty="0" smtClean="0">
-                <a:ln>
-                  <a:noFill/>
-                </a:ln>
-                <a:solidFill>
-                  <a:srgbClr val="000000"/>
-                </a:solidFill>
-                <a:effectLst/>
-                <a:latin typeface="Consolas" pitchFamily="49" charset="0"/>
-                <a:cs typeface="Consolas" pitchFamily="49" charset="0"/>
-              </a:rPr>
-              <a:t>}     </a:t>
-            </a:r>
-          </a:p>
-          <a:p>
-            <a:pPr marL="0" marR="0" lvl="0" indent="0" algn="l" defTabSz="914400" rtl="0" eaLnBrk="1" fontAlgn="base" latinLnBrk="0" hangingPunct="1">
-              <a:lnSpc>
-                <a:spcPct val="100000"/>
-              </a:lnSpc>
-              <a:spcBef>
-                <a:spcPct val="0"/>
-              </a:spcBef>
-              <a:spcAft>
-                <a:spcPct val="0"/>
-              </a:spcAft>
-              <a:buClrTx/>
-              <a:buSzTx/>
-              <a:buFontTx/>
-              <a:buNone/>
-              <a:tabLst/>
-            </a:pPr>
-            <a:r>
-              <a:rPr kumimoji="0" lang="en-US" sz="1200" b="0" i="0" u="none" strike="noStrike" cap="none" normalizeH="0" baseline="0" dirty="0" smtClean="0">
-                <a:ln>
-                  <a:noFill/>
-                </a:ln>
-                <a:solidFill>
-                  <a:srgbClr val="000000"/>
-                </a:solidFill>
-                <a:effectLst/>
-                <a:latin typeface="Consolas" pitchFamily="49" charset="0"/>
-                <a:cs typeface="Consolas" pitchFamily="49" charset="0"/>
-              </a:rPr>
-              <a:t>}</a:t>
-            </a:r>
-            <a:endParaRPr kumimoji="0" lang="en-US" sz="1200" b="0" i="0" u="none" strike="noStrike" cap="none" normalizeH="0" baseline="0" dirty="0" smtClean="0">
-              <a:ln>
-                <a:noFill/>
-              </a:ln>
-              <a:solidFill>
-                <a:schemeClr val="tx1"/>
-              </a:solidFill>
-              <a:effectLst/>
-              <a:latin typeface="Arial" pitchFamily="34" charset="0"/>
-              <a:cs typeface="Arial" pitchFamily="34" charset="0"/>
-            </a:endParaRPr>
-          </a:p>
-        </p:txBody>
-      </p:sp>
-      <p:sp>
-        <p:nvSpPr>
-          <p:cNvPr id="32769" name="Rectangle 1"/>
-          <p:cNvSpPr>
-            <a:spLocks noChangeArrowheads="1"/>
-          </p:cNvSpPr>
-          <p:nvPr/>
-        </p:nvSpPr>
-        <p:spPr bwMode="auto">
-          <a:xfrm>
-            <a:off x="0" y="43934"/>
-            <a:ext cx="184731" cy="369332"/>
-          </a:xfrm>
-          <a:prstGeom prst="rect">
-            <a:avLst/>
-          </a:prstGeom>
-          <a:solidFill>
-            <a:srgbClr val="FFFFFF"/>
-          </a:solidFill>
-          <a:ln w="9525">
-            <a:noFill/>
-            <a:miter lim="800000"/>
-            <a:headEnd/>
-            <a:tailEnd/>
-          </a:ln>
-          <a:effectLst/>
-        </p:spPr>
-        <p:txBody>
-          <a:bodyPr vert="horz" wrap="none" lIns="91440" tIns="45720" rIns="91440" bIns="45720" numCol="1" anchor="ctr" anchorCtr="0" compatLnSpc="1">
-            <a:prstTxWarp prst="textNoShape">
-              <a:avLst/>
-            </a:prstTxWarp>
-            <a:spAutoFit/>
-          </a:bodyPr>
-          <a:lstStyle/>
-          <a:p>
-            <a:pPr marL="0" marR="0" lvl="0" indent="0" algn="l" defTabSz="914400" rtl="0" eaLnBrk="1" fontAlgn="base" latinLnBrk="0" hangingPunct="1">
-              <a:lnSpc>
-                <a:spcPct val="100000"/>
-              </a:lnSpc>
-              <a:spcBef>
-                <a:spcPct val="0"/>
-              </a:spcBef>
-              <a:spcAft>
-                <a:spcPct val="0"/>
-              </a:spcAft>
-              <a:buClrTx/>
-              <a:buSzTx/>
-              <a:buFontTx/>
-              <a:buNone/>
-              <a:tabLst/>
-            </a:pPr>
-            <a:endParaRPr kumimoji="0" lang="en-US" sz="1800" b="0" i="0" u="none" strike="noStrike" cap="none" normalizeH="0" baseline="0" dirty="0" smtClean="0">
-              <a:ln>
-                <a:noFill/>
-              </a:ln>
-              <a:solidFill>
-                <a:schemeClr val="tx1"/>
-              </a:solidFill>
-              <a:effectLst/>
-              <a:latin typeface="Arial" pitchFamily="34" charset="0"/>
-              <a:cs typeface="Arial" pitchFamily="34" charset="0"/>
-            </a:endParaRPr>
-          </a:p>
-        </p:txBody>
-      </p:sp>
-      <p:sp>
-        <p:nvSpPr>
-          <p:cNvPr id="7" name="Rectangle 1"/>
-          <p:cNvSpPr>
-            <a:spLocks noChangeArrowheads="1"/>
-          </p:cNvSpPr>
-          <p:nvPr/>
-        </p:nvSpPr>
-        <p:spPr bwMode="auto">
-          <a:xfrm>
-            <a:off x="499873" y="3322749"/>
-            <a:ext cx="8231434" cy="1938992"/>
-          </a:xfrm>
-          <a:prstGeom prst="rect">
-            <a:avLst/>
-          </a:prstGeom>
-          <a:solidFill>
-            <a:srgbClr val="FFFFFF"/>
-          </a:solidFill>
-          <a:ln w="9525">
-            <a:solidFill>
-              <a:schemeClr val="accent1"/>
-            </a:solidFill>
-            <a:miter lim="800000"/>
-            <a:headEnd/>
-            <a:tailEnd/>
-          </a:ln>
-          <a:effectLst/>
-        </p:spPr>
-        <p:txBody>
-          <a:bodyPr vert="horz" wrap="square" lIns="91440" tIns="45720" rIns="91440" bIns="45720" numCol="1" anchor="ctr" anchorCtr="0" compatLnSpc="1">
-            <a:prstTxWarp prst="textNoShape">
-              <a:avLst/>
-            </a:prstTxWarp>
-            <a:spAutoFit/>
-          </a:bodyPr>
-          <a:lstStyle/>
-          <a:p>
-            <a:pPr marL="0" marR="0" lvl="0" indent="0" algn="l" defTabSz="914400" rtl="0" eaLnBrk="1" fontAlgn="base" latinLnBrk="0" hangingPunct="1">
-              <a:lnSpc>
-                <a:spcPct val="100000"/>
-              </a:lnSpc>
-              <a:spcBef>
-                <a:spcPct val="0"/>
-              </a:spcBef>
-              <a:spcAft>
-                <a:spcPct val="0"/>
-              </a:spcAft>
-              <a:buClrTx/>
-              <a:buSzTx/>
-              <a:buFontTx/>
-              <a:buNone/>
-              <a:tabLst/>
-            </a:pPr>
-            <a:r>
-              <a:rPr kumimoji="0" lang="en-US" sz="1200" b="0" i="0" u="none" strike="noStrike" cap="none" normalizeH="0" baseline="0" dirty="0" smtClean="0">
-                <a:ln>
-                  <a:noFill/>
-                </a:ln>
-                <a:solidFill>
-                  <a:srgbClr val="0000FF"/>
-                </a:solidFill>
-                <a:effectLst/>
-                <a:latin typeface="Consolas" pitchFamily="49" charset="0"/>
-                <a:cs typeface="Consolas" pitchFamily="49" charset="0"/>
-              </a:rPr>
-              <a:t>public</a:t>
-            </a:r>
-            <a:r>
-              <a:rPr kumimoji="0" lang="en-US" sz="1200" b="0" i="0" u="none" strike="noStrike" cap="none" normalizeH="0" baseline="0" dirty="0" smtClean="0">
-                <a:ln>
-                  <a:noFill/>
-                </a:ln>
-                <a:solidFill>
-                  <a:srgbClr val="000000"/>
-                </a:solidFill>
-                <a:effectLst/>
-                <a:latin typeface="Consolas" pitchFamily="49" charset="0"/>
-                <a:cs typeface="Consolas" pitchFamily="49" charset="0"/>
-              </a:rPr>
-              <a:t> </a:t>
-            </a:r>
-            <a:r>
-              <a:rPr kumimoji="0" lang="en-US" sz="1200" b="0" i="0" u="none" strike="noStrike" cap="none" normalizeH="0" baseline="0" dirty="0" smtClean="0">
-                <a:ln>
-                  <a:noFill/>
-                </a:ln>
-                <a:solidFill>
-                  <a:srgbClr val="0000FF"/>
-                </a:solidFill>
-                <a:effectLst/>
-                <a:latin typeface="Consolas" pitchFamily="49" charset="0"/>
-                <a:cs typeface="Consolas" pitchFamily="49" charset="0"/>
-              </a:rPr>
-              <a:t>class</a:t>
-            </a:r>
-            <a:r>
-              <a:rPr kumimoji="0" lang="en-US" sz="1200" b="0" i="0" u="none" strike="noStrike" cap="none" normalizeH="0" baseline="0" dirty="0" smtClean="0">
-                <a:ln>
-                  <a:noFill/>
-                </a:ln>
-                <a:solidFill>
-                  <a:srgbClr val="000000"/>
-                </a:solidFill>
-                <a:effectLst/>
-                <a:latin typeface="Consolas" pitchFamily="49" charset="0"/>
-                <a:cs typeface="Consolas" pitchFamily="49" charset="0"/>
-              </a:rPr>
-              <a:t> </a:t>
-            </a:r>
-            <a:r>
-              <a:rPr kumimoji="0" lang="en-US" sz="1200" b="0" i="0" u="none" strike="noStrike" cap="none" normalizeH="0" baseline="0" dirty="0" err="1" smtClean="0">
-                <a:ln>
-                  <a:noFill/>
-                </a:ln>
-                <a:solidFill>
-                  <a:srgbClr val="2B91AF"/>
-                </a:solidFill>
-                <a:effectLst/>
-                <a:latin typeface="Consolas" pitchFamily="49" charset="0"/>
-                <a:cs typeface="Consolas" pitchFamily="49" charset="0"/>
-              </a:rPr>
-              <a:t>PersonController</a:t>
-            </a:r>
-            <a:r>
-              <a:rPr kumimoji="0" lang="en-US" sz="1200" b="0" i="0" u="none" strike="noStrike" cap="none" normalizeH="0" baseline="0" dirty="0" smtClean="0">
-                <a:ln>
-                  <a:noFill/>
-                </a:ln>
-                <a:solidFill>
-                  <a:srgbClr val="000000"/>
-                </a:solidFill>
-                <a:effectLst/>
-                <a:latin typeface="Consolas" pitchFamily="49" charset="0"/>
-                <a:cs typeface="Consolas" pitchFamily="49" charset="0"/>
-              </a:rPr>
-              <a:t> : </a:t>
-            </a:r>
-            <a:r>
-              <a:rPr kumimoji="0" lang="en-US" sz="1200" b="0" i="0" u="none" strike="noStrike" cap="none" normalizeH="0" baseline="0" dirty="0" smtClean="0">
-                <a:ln>
-                  <a:noFill/>
-                </a:ln>
-                <a:solidFill>
-                  <a:srgbClr val="2B91AF"/>
-                </a:solidFill>
-                <a:effectLst/>
-                <a:latin typeface="Consolas" pitchFamily="49" charset="0"/>
-                <a:cs typeface="Consolas" pitchFamily="49" charset="0"/>
-              </a:rPr>
-              <a:t>ApiController</a:t>
-            </a:r>
-            <a:r>
-              <a:rPr kumimoji="0" lang="en-US" sz="1200" b="0" i="0" u="none" strike="noStrike" cap="none" normalizeH="0" baseline="0" dirty="0" smtClean="0">
-                <a:ln>
-                  <a:noFill/>
-                </a:ln>
-                <a:solidFill>
-                  <a:srgbClr val="000000"/>
-                </a:solidFill>
-                <a:effectLst/>
-                <a:latin typeface="Consolas" pitchFamily="49" charset="0"/>
-                <a:cs typeface="Consolas" pitchFamily="49" charset="0"/>
-              </a:rPr>
-              <a:t>     </a:t>
-            </a:r>
-          </a:p>
-          <a:p>
-            <a:pPr marL="0" marR="0" lvl="0" indent="0" algn="l" defTabSz="914400" rtl="0" eaLnBrk="1" fontAlgn="base" latinLnBrk="0" hangingPunct="1">
-              <a:lnSpc>
-                <a:spcPct val="100000"/>
-              </a:lnSpc>
-              <a:spcBef>
-                <a:spcPct val="0"/>
-              </a:spcBef>
-              <a:spcAft>
-                <a:spcPct val="0"/>
-              </a:spcAft>
-              <a:buClrTx/>
-              <a:buSzTx/>
-              <a:buFontTx/>
-              <a:buNone/>
-              <a:tabLst/>
-            </a:pPr>
-            <a:r>
-              <a:rPr kumimoji="0" lang="en-US" sz="1200" b="0" i="0" u="none" strike="noStrike" cap="none" normalizeH="0" baseline="0" dirty="0" smtClean="0">
-                <a:ln>
-                  <a:noFill/>
-                </a:ln>
-                <a:solidFill>
-                  <a:srgbClr val="000000"/>
-                </a:solidFill>
-                <a:effectLst/>
-                <a:latin typeface="Consolas" pitchFamily="49" charset="0"/>
-                <a:cs typeface="Consolas" pitchFamily="49" charset="0"/>
-              </a:rPr>
-              <a:t>{         </a:t>
-            </a:r>
-          </a:p>
-          <a:p>
-            <a:pPr marL="0" marR="0" lvl="0" indent="0" algn="l" defTabSz="914400" rtl="0" eaLnBrk="1" fontAlgn="base" latinLnBrk="0" hangingPunct="1">
-              <a:lnSpc>
-                <a:spcPct val="100000"/>
-              </a:lnSpc>
-              <a:spcBef>
-                <a:spcPct val="0"/>
-              </a:spcBef>
-              <a:spcAft>
-                <a:spcPct val="0"/>
-              </a:spcAft>
-              <a:buClrTx/>
-              <a:buSzTx/>
-              <a:buFontTx/>
-              <a:buNone/>
-              <a:tabLst/>
-            </a:pPr>
-            <a:r>
-              <a:rPr lang="en-US" sz="1200" dirty="0" smtClean="0">
-                <a:solidFill>
-                  <a:srgbClr val="000000"/>
-                </a:solidFill>
-                <a:latin typeface="Consolas" pitchFamily="49" charset="0"/>
-                <a:cs typeface="Consolas" pitchFamily="49" charset="0"/>
-              </a:rPr>
-              <a:t>	</a:t>
-            </a:r>
-            <a:r>
-              <a:rPr kumimoji="0" lang="en-US" sz="1200" b="0" i="0" u="none" strike="noStrike" cap="none" normalizeH="0" baseline="0" dirty="0" smtClean="0">
-                <a:ln>
-                  <a:noFill/>
-                </a:ln>
-                <a:solidFill>
-                  <a:srgbClr val="0000FF"/>
-                </a:solidFill>
-                <a:effectLst/>
-                <a:latin typeface="Consolas" pitchFamily="49" charset="0"/>
-                <a:cs typeface="Consolas" pitchFamily="49" charset="0"/>
-              </a:rPr>
-              <a:t>private</a:t>
-            </a:r>
-            <a:r>
-              <a:rPr kumimoji="0" lang="en-US" sz="1200" b="0" i="0" u="none" strike="noStrike" cap="none" normalizeH="0" baseline="0" dirty="0" smtClean="0">
-                <a:ln>
-                  <a:noFill/>
-                </a:ln>
-                <a:solidFill>
-                  <a:srgbClr val="000000"/>
-                </a:solidFill>
-                <a:effectLst/>
-                <a:latin typeface="Consolas" pitchFamily="49" charset="0"/>
-                <a:cs typeface="Consolas" pitchFamily="49" charset="0"/>
-              </a:rPr>
-              <a:t> </a:t>
-            </a:r>
-            <a:r>
-              <a:rPr kumimoji="0" lang="en-US" sz="1200" b="0" i="0" u="none" strike="noStrike" cap="none" normalizeH="0" baseline="0" dirty="0" err="1" smtClean="0">
-                <a:ln>
-                  <a:noFill/>
-                </a:ln>
-                <a:solidFill>
-                  <a:srgbClr val="2B91AF"/>
-                </a:solidFill>
-                <a:effectLst/>
-                <a:latin typeface="Consolas" pitchFamily="49" charset="0"/>
-                <a:cs typeface="Consolas" pitchFamily="49" charset="0"/>
-              </a:rPr>
-              <a:t>IEnumerable</a:t>
-            </a:r>
-            <a:r>
-              <a:rPr kumimoji="0" lang="en-US" sz="1200" b="0" i="0" u="none" strike="noStrike" cap="none" normalizeH="0" baseline="0" dirty="0" smtClean="0">
-                <a:ln>
-                  <a:noFill/>
-                </a:ln>
-                <a:solidFill>
-                  <a:srgbClr val="000000"/>
-                </a:solidFill>
-                <a:effectLst/>
-                <a:latin typeface="Consolas" pitchFamily="49" charset="0"/>
-                <a:cs typeface="Consolas" pitchFamily="49" charset="0"/>
-              </a:rPr>
-              <a:t>&lt;</a:t>
-            </a:r>
-            <a:r>
-              <a:rPr kumimoji="0" lang="en-US" sz="1200" b="0" i="0" u="none" strike="noStrike" cap="none" normalizeH="0" baseline="0" dirty="0" smtClean="0">
-                <a:ln>
-                  <a:noFill/>
-                </a:ln>
-                <a:solidFill>
-                  <a:srgbClr val="2B91AF"/>
-                </a:solidFill>
-                <a:effectLst/>
-                <a:latin typeface="Consolas" pitchFamily="49" charset="0"/>
-                <a:cs typeface="Consolas" pitchFamily="49" charset="0"/>
-              </a:rPr>
-              <a:t>Person</a:t>
-            </a:r>
-            <a:r>
-              <a:rPr kumimoji="0" lang="en-US" sz="1200" b="0" i="0" u="none" strike="noStrike" cap="none" normalizeH="0" baseline="0" dirty="0" smtClean="0">
-                <a:ln>
-                  <a:noFill/>
-                </a:ln>
-                <a:solidFill>
-                  <a:srgbClr val="000000"/>
-                </a:solidFill>
-                <a:effectLst/>
-                <a:latin typeface="Consolas" pitchFamily="49" charset="0"/>
-                <a:cs typeface="Consolas" pitchFamily="49" charset="0"/>
-              </a:rPr>
-              <a:t>&gt; _persons = </a:t>
-            </a:r>
-            <a:r>
-              <a:rPr kumimoji="0" lang="en-US" sz="1200" b="0" i="0" u="none" strike="noStrike" cap="none" normalizeH="0" baseline="0" dirty="0" smtClean="0">
-                <a:ln>
-                  <a:noFill/>
-                </a:ln>
-                <a:solidFill>
-                  <a:srgbClr val="0000FF"/>
-                </a:solidFill>
-                <a:effectLst/>
-                <a:latin typeface="Consolas" pitchFamily="49" charset="0"/>
-                <a:cs typeface="Consolas" pitchFamily="49" charset="0"/>
-              </a:rPr>
-              <a:t>new</a:t>
-            </a:r>
-            <a:r>
-              <a:rPr kumimoji="0" lang="en-US" sz="1200" b="0" i="0" u="none" strike="noStrike" cap="none" normalizeH="0" baseline="0" dirty="0" smtClean="0">
-                <a:ln>
-                  <a:noFill/>
-                </a:ln>
-                <a:solidFill>
-                  <a:srgbClr val="000000"/>
-                </a:solidFill>
-                <a:effectLst/>
-                <a:latin typeface="Consolas" pitchFamily="49" charset="0"/>
-                <a:cs typeface="Consolas" pitchFamily="49" charset="0"/>
-              </a:rPr>
-              <a:t> </a:t>
-            </a:r>
-            <a:r>
-              <a:rPr kumimoji="0" lang="en-US" sz="1200" b="0" i="0" u="none" strike="noStrike" cap="none" normalizeH="0" baseline="0" dirty="0" smtClean="0">
-                <a:ln>
-                  <a:noFill/>
-                </a:ln>
-                <a:solidFill>
-                  <a:srgbClr val="2B91AF"/>
-                </a:solidFill>
-                <a:effectLst/>
-                <a:latin typeface="Consolas" pitchFamily="49" charset="0"/>
-                <a:cs typeface="Consolas" pitchFamily="49" charset="0"/>
-              </a:rPr>
-              <a:t>List</a:t>
-            </a:r>
-            <a:r>
-              <a:rPr kumimoji="0" lang="en-US" sz="1200" b="0" i="0" u="none" strike="noStrike" cap="none" normalizeH="0" baseline="0" dirty="0" smtClean="0">
-                <a:ln>
-                  <a:noFill/>
-                </a:ln>
-                <a:solidFill>
-                  <a:srgbClr val="000000"/>
-                </a:solidFill>
-                <a:effectLst/>
-                <a:latin typeface="Consolas" pitchFamily="49" charset="0"/>
-                <a:cs typeface="Consolas" pitchFamily="49" charset="0"/>
-              </a:rPr>
-              <a:t>&lt;</a:t>
-            </a:r>
-            <a:r>
-              <a:rPr kumimoji="0" lang="en-US" sz="1200" b="0" i="0" u="none" strike="noStrike" cap="none" normalizeH="0" baseline="0" dirty="0" smtClean="0">
-                <a:ln>
-                  <a:noFill/>
-                </a:ln>
-                <a:solidFill>
-                  <a:srgbClr val="2B91AF"/>
-                </a:solidFill>
-                <a:effectLst/>
-                <a:latin typeface="Consolas" pitchFamily="49" charset="0"/>
-                <a:cs typeface="Consolas" pitchFamily="49" charset="0"/>
-              </a:rPr>
-              <a:t>Person</a:t>
-            </a:r>
-            <a:r>
-              <a:rPr kumimoji="0" lang="en-US" sz="1200" b="0" i="0" u="none" strike="noStrike" cap="none" normalizeH="0" baseline="0" dirty="0" smtClean="0">
-                <a:ln>
-                  <a:noFill/>
-                </a:ln>
-                <a:solidFill>
-                  <a:srgbClr val="000000"/>
-                </a:solidFill>
-                <a:effectLst/>
-                <a:latin typeface="Consolas" pitchFamily="49" charset="0"/>
-                <a:cs typeface="Consolas" pitchFamily="49" charset="0"/>
-              </a:rPr>
-              <a:t>&gt;();         </a:t>
-            </a:r>
-          </a:p>
-          <a:p>
-            <a:pPr marL="0" marR="0" lvl="0" indent="0" algn="l" defTabSz="914400" rtl="0" eaLnBrk="1" fontAlgn="base" latinLnBrk="0" hangingPunct="1">
-              <a:lnSpc>
-                <a:spcPct val="100000"/>
-              </a:lnSpc>
-              <a:spcBef>
-                <a:spcPct val="0"/>
-              </a:spcBef>
-              <a:spcAft>
-                <a:spcPct val="0"/>
-              </a:spcAft>
-              <a:buClrTx/>
-              <a:buSzTx/>
-              <a:buFontTx/>
-              <a:buNone/>
-              <a:tabLst/>
-            </a:pPr>
-            <a:r>
-              <a:rPr kumimoji="0" lang="en-US" sz="1200" b="0" i="0" u="none" strike="noStrike" cap="none" normalizeH="0" baseline="0" dirty="0" smtClean="0">
-                <a:ln>
-                  <a:noFill/>
-                </a:ln>
-                <a:solidFill>
-                  <a:srgbClr val="0000FF"/>
-                </a:solidFill>
-                <a:effectLst/>
-                <a:latin typeface="Consolas" pitchFamily="49" charset="0"/>
-                <a:cs typeface="Consolas" pitchFamily="49" charset="0"/>
-              </a:rPr>
-              <a:t>	</a:t>
-            </a:r>
-          </a:p>
-          <a:p>
-            <a:pPr defTabSz="914400" fontAlgn="base">
-              <a:spcBef>
-                <a:spcPct val="0"/>
-              </a:spcBef>
-              <a:spcAft>
-                <a:spcPct val="0"/>
-              </a:spcAft>
-            </a:pPr>
-            <a:r>
-              <a:rPr lang="en-US" sz="1200" dirty="0" smtClean="0">
-                <a:solidFill>
-                  <a:srgbClr val="000000"/>
-                </a:solidFill>
-                <a:latin typeface="Consolas" pitchFamily="49" charset="0"/>
-                <a:cs typeface="Consolas" pitchFamily="49" charset="0"/>
-              </a:rPr>
-              <a:t> 	[</a:t>
-            </a:r>
-            <a:r>
-              <a:rPr lang="en-US" sz="1200" dirty="0" err="1" smtClean="0">
-                <a:solidFill>
-                  <a:srgbClr val="2B91AF"/>
-                </a:solidFill>
-                <a:latin typeface="Consolas" pitchFamily="49" charset="0"/>
-                <a:cs typeface="Consolas" pitchFamily="49" charset="0"/>
-              </a:rPr>
-              <a:t>HttpGet</a:t>
-            </a:r>
-            <a:r>
-              <a:rPr lang="en-US" sz="1200" dirty="0" smtClean="0">
-                <a:solidFill>
-                  <a:srgbClr val="000000"/>
-                </a:solidFill>
-                <a:latin typeface="Consolas" pitchFamily="49" charset="0"/>
-                <a:cs typeface="Consolas" pitchFamily="49" charset="0"/>
-              </a:rPr>
-              <a:t>] </a:t>
-            </a:r>
-            <a:endParaRPr kumimoji="0" lang="en-US" sz="1200" b="0" i="0" u="none" strike="noStrike" cap="none" normalizeH="0" baseline="0" dirty="0" smtClean="0">
-              <a:ln>
-                <a:noFill/>
-              </a:ln>
-              <a:solidFill>
-                <a:srgbClr val="0000FF"/>
-              </a:solidFill>
-              <a:effectLst/>
-              <a:latin typeface="Consolas" pitchFamily="49" charset="0"/>
-              <a:cs typeface="Consolas" pitchFamily="49" charset="0"/>
-            </a:endParaRPr>
-          </a:p>
-          <a:p>
-            <a:pPr marL="0" marR="0" lvl="0" indent="0" algn="l" defTabSz="914400" rtl="0" eaLnBrk="1" fontAlgn="base" latinLnBrk="0" hangingPunct="1">
-              <a:lnSpc>
-                <a:spcPct val="100000"/>
-              </a:lnSpc>
-              <a:spcBef>
-                <a:spcPct val="0"/>
-              </a:spcBef>
-              <a:spcAft>
-                <a:spcPct val="0"/>
-              </a:spcAft>
-              <a:buClrTx/>
-              <a:buSzTx/>
-              <a:buFontTx/>
-              <a:buNone/>
-              <a:tabLst/>
-            </a:pPr>
-            <a:r>
-              <a:rPr lang="en-US" sz="1200" dirty="0" smtClean="0">
-                <a:solidFill>
-                  <a:srgbClr val="0000FF"/>
-                </a:solidFill>
-                <a:latin typeface="Consolas" pitchFamily="49" charset="0"/>
-                <a:cs typeface="Consolas" pitchFamily="49" charset="0"/>
-              </a:rPr>
-              <a:t>	</a:t>
-            </a:r>
-            <a:r>
-              <a:rPr kumimoji="0" lang="en-US" sz="1200" b="0" i="0" u="none" strike="noStrike" cap="none" normalizeH="0" baseline="0" dirty="0" smtClean="0">
-                <a:ln>
-                  <a:noFill/>
-                </a:ln>
-                <a:solidFill>
-                  <a:srgbClr val="0000FF"/>
-                </a:solidFill>
-                <a:effectLst/>
-                <a:latin typeface="Consolas" pitchFamily="49" charset="0"/>
-                <a:cs typeface="Consolas" pitchFamily="49" charset="0"/>
-              </a:rPr>
-              <a:t>public</a:t>
-            </a:r>
-            <a:r>
-              <a:rPr kumimoji="0" lang="en-US" sz="1200" b="0" i="0" u="none" strike="noStrike" cap="none" normalizeH="0" baseline="0" dirty="0" smtClean="0">
-                <a:ln>
-                  <a:noFill/>
-                </a:ln>
-                <a:solidFill>
-                  <a:srgbClr val="000000"/>
-                </a:solidFill>
-                <a:effectLst/>
-                <a:latin typeface="Consolas" pitchFamily="49" charset="0"/>
-                <a:cs typeface="Consolas" pitchFamily="49" charset="0"/>
-              </a:rPr>
-              <a:t> </a:t>
-            </a:r>
-            <a:r>
-              <a:rPr kumimoji="0" lang="en-US" sz="1200" b="0" i="0" u="none" strike="noStrike" cap="none" normalizeH="0" baseline="0" dirty="0" err="1" smtClean="0">
-                <a:ln>
-                  <a:noFill/>
-                </a:ln>
-                <a:solidFill>
-                  <a:srgbClr val="2B91AF"/>
-                </a:solidFill>
-                <a:effectLst/>
-                <a:latin typeface="Consolas" pitchFamily="49" charset="0"/>
-                <a:cs typeface="Consolas" pitchFamily="49" charset="0"/>
-              </a:rPr>
-              <a:t>IEnumerable</a:t>
-            </a:r>
-            <a:r>
-              <a:rPr kumimoji="0" lang="en-US" sz="1200" b="0" i="0" u="none" strike="noStrike" cap="none" normalizeH="0" baseline="0" dirty="0" smtClean="0">
-                <a:ln>
-                  <a:noFill/>
-                </a:ln>
-                <a:solidFill>
-                  <a:srgbClr val="000000"/>
-                </a:solidFill>
-                <a:effectLst/>
-                <a:latin typeface="Consolas" pitchFamily="49" charset="0"/>
-                <a:cs typeface="Consolas" pitchFamily="49" charset="0"/>
-              </a:rPr>
-              <a:t>&lt;</a:t>
-            </a:r>
-            <a:r>
-              <a:rPr kumimoji="0" lang="en-US" sz="1200" b="0" i="0" u="none" strike="noStrike" cap="none" normalizeH="0" baseline="0" dirty="0" smtClean="0">
-                <a:ln>
-                  <a:noFill/>
-                </a:ln>
-                <a:solidFill>
-                  <a:srgbClr val="2B91AF"/>
-                </a:solidFill>
-                <a:effectLst/>
-                <a:latin typeface="Consolas" pitchFamily="49" charset="0"/>
-                <a:cs typeface="Consolas" pitchFamily="49" charset="0"/>
-              </a:rPr>
-              <a:t>Person</a:t>
-            </a:r>
-            <a:r>
-              <a:rPr kumimoji="0" lang="en-US" sz="1200" b="0" i="0" u="none" strike="noStrike" cap="none" normalizeH="0" baseline="0" dirty="0" smtClean="0">
-                <a:ln>
-                  <a:noFill/>
-                </a:ln>
-                <a:solidFill>
-                  <a:srgbClr val="000000"/>
-                </a:solidFill>
-                <a:effectLst/>
-                <a:latin typeface="Consolas" pitchFamily="49" charset="0"/>
-                <a:cs typeface="Consolas" pitchFamily="49" charset="0"/>
-              </a:rPr>
-              <a:t>&gt; </a:t>
-            </a:r>
-            <a:r>
-              <a:rPr kumimoji="0" lang="en-US" sz="1200" b="0" i="0" u="none" strike="noStrike" cap="none" normalizeH="0" baseline="0" dirty="0" err="1" smtClean="0">
-                <a:ln>
-                  <a:noFill/>
-                </a:ln>
-                <a:solidFill>
-                  <a:srgbClr val="000000"/>
-                </a:solidFill>
-                <a:effectLst/>
-                <a:latin typeface="Consolas" pitchFamily="49" charset="0"/>
-                <a:cs typeface="Consolas" pitchFamily="49" charset="0"/>
-              </a:rPr>
-              <a:t>FindAll</a:t>
-            </a:r>
-            <a:r>
-              <a:rPr kumimoji="0" lang="en-US" sz="1200" b="0" i="0" u="none" strike="noStrike" cap="none" normalizeH="0" baseline="0" dirty="0" smtClean="0">
-                <a:ln>
-                  <a:noFill/>
-                </a:ln>
-                <a:solidFill>
-                  <a:srgbClr val="000000"/>
-                </a:solidFill>
-                <a:effectLst/>
-                <a:latin typeface="Consolas" pitchFamily="49" charset="0"/>
-                <a:cs typeface="Consolas" pitchFamily="49" charset="0"/>
-              </a:rPr>
-              <a:t>()         </a:t>
-            </a:r>
-          </a:p>
-          <a:p>
-            <a:pPr marL="0" marR="0" lvl="0" indent="0" algn="l" defTabSz="914400" rtl="0" eaLnBrk="1" fontAlgn="base" latinLnBrk="0" hangingPunct="1">
-              <a:lnSpc>
-                <a:spcPct val="100000"/>
-              </a:lnSpc>
-              <a:spcBef>
-                <a:spcPct val="0"/>
-              </a:spcBef>
-              <a:spcAft>
-                <a:spcPct val="0"/>
-              </a:spcAft>
-              <a:buClrTx/>
-              <a:buSzTx/>
-              <a:buFontTx/>
-              <a:buNone/>
-              <a:tabLst/>
-            </a:pPr>
-            <a:r>
-              <a:rPr lang="en-US" sz="1200" dirty="0" smtClean="0">
-                <a:solidFill>
-                  <a:srgbClr val="000000"/>
-                </a:solidFill>
-                <a:latin typeface="Consolas" pitchFamily="49" charset="0"/>
-                <a:cs typeface="Consolas" pitchFamily="49" charset="0"/>
-              </a:rPr>
-              <a:t>	</a:t>
-            </a:r>
-            <a:r>
-              <a:rPr kumimoji="0" lang="en-US" sz="1200" b="0" i="0" u="none" strike="noStrike" cap="none" normalizeH="0" baseline="0" dirty="0" smtClean="0">
-                <a:ln>
-                  <a:noFill/>
-                </a:ln>
-                <a:solidFill>
-                  <a:srgbClr val="000000"/>
-                </a:solidFill>
-                <a:effectLst/>
-                <a:latin typeface="Consolas" pitchFamily="49" charset="0"/>
-                <a:cs typeface="Consolas" pitchFamily="49" charset="0"/>
-              </a:rPr>
-              <a:t>{             </a:t>
-            </a:r>
-          </a:p>
-          <a:p>
-            <a:pPr marL="0" marR="0" lvl="0" indent="0" algn="l" defTabSz="914400" rtl="0" eaLnBrk="1" fontAlgn="base" latinLnBrk="0" hangingPunct="1">
-              <a:lnSpc>
-                <a:spcPct val="100000"/>
-              </a:lnSpc>
-              <a:spcBef>
-                <a:spcPct val="0"/>
-              </a:spcBef>
-              <a:spcAft>
-                <a:spcPct val="0"/>
-              </a:spcAft>
-              <a:buClrTx/>
-              <a:buSzTx/>
-              <a:buFontTx/>
-              <a:buNone/>
-              <a:tabLst/>
-            </a:pPr>
-            <a:r>
-              <a:rPr lang="en-US" sz="1200" dirty="0" smtClean="0">
-                <a:solidFill>
-                  <a:srgbClr val="000000"/>
-                </a:solidFill>
-                <a:latin typeface="Consolas" pitchFamily="49" charset="0"/>
-                <a:cs typeface="Consolas" pitchFamily="49" charset="0"/>
-              </a:rPr>
-              <a:t>		</a:t>
-            </a:r>
-            <a:r>
-              <a:rPr kumimoji="0" lang="en-US" sz="1200" b="0" i="0" u="none" strike="noStrike" cap="none" normalizeH="0" baseline="0" dirty="0" smtClean="0">
-                <a:ln>
-                  <a:noFill/>
-                </a:ln>
-                <a:solidFill>
-                  <a:srgbClr val="0000FF"/>
-                </a:solidFill>
-                <a:effectLst/>
-                <a:latin typeface="Consolas" pitchFamily="49" charset="0"/>
-                <a:cs typeface="Consolas" pitchFamily="49" charset="0"/>
-              </a:rPr>
-              <a:t>return</a:t>
-            </a:r>
-            <a:r>
-              <a:rPr kumimoji="0" lang="en-US" sz="1200" b="0" i="0" u="none" strike="noStrike" cap="none" normalizeH="0" baseline="0" dirty="0" smtClean="0">
-                <a:ln>
-                  <a:noFill/>
-                </a:ln>
-                <a:solidFill>
-                  <a:srgbClr val="000000"/>
-                </a:solidFill>
-                <a:effectLst/>
-                <a:latin typeface="Consolas" pitchFamily="49" charset="0"/>
-                <a:cs typeface="Consolas" pitchFamily="49" charset="0"/>
-              </a:rPr>
-              <a:t> _persons;         </a:t>
-            </a:r>
-          </a:p>
-          <a:p>
-            <a:pPr marL="0" marR="0" lvl="0" indent="0" algn="l" defTabSz="914400" rtl="0" eaLnBrk="1" fontAlgn="base" latinLnBrk="0" hangingPunct="1">
-              <a:lnSpc>
-                <a:spcPct val="100000"/>
-              </a:lnSpc>
-              <a:spcBef>
-                <a:spcPct val="0"/>
-              </a:spcBef>
-              <a:spcAft>
-                <a:spcPct val="0"/>
-              </a:spcAft>
-              <a:buClrTx/>
-              <a:buSzTx/>
-              <a:buFontTx/>
-              <a:buNone/>
-              <a:tabLst/>
-            </a:pPr>
-            <a:r>
-              <a:rPr lang="en-US" sz="1200" dirty="0" smtClean="0">
-                <a:solidFill>
-                  <a:srgbClr val="000000"/>
-                </a:solidFill>
-                <a:latin typeface="Consolas" pitchFamily="49" charset="0"/>
-                <a:cs typeface="Consolas" pitchFamily="49" charset="0"/>
-              </a:rPr>
-              <a:t>	</a:t>
-            </a:r>
-            <a:r>
-              <a:rPr kumimoji="0" lang="en-US" sz="1200" b="0" i="0" u="none" strike="noStrike" cap="none" normalizeH="0" baseline="0" dirty="0" smtClean="0">
-                <a:ln>
-                  <a:noFill/>
-                </a:ln>
-                <a:solidFill>
-                  <a:srgbClr val="000000"/>
-                </a:solidFill>
-                <a:effectLst/>
-                <a:latin typeface="Consolas" pitchFamily="49" charset="0"/>
-                <a:cs typeface="Consolas" pitchFamily="49" charset="0"/>
-              </a:rPr>
-              <a:t>}     </a:t>
-            </a:r>
-          </a:p>
-          <a:p>
-            <a:pPr marL="0" marR="0" lvl="0" indent="0" algn="l" defTabSz="914400" rtl="0" eaLnBrk="1" fontAlgn="base" latinLnBrk="0" hangingPunct="1">
-              <a:lnSpc>
-                <a:spcPct val="100000"/>
-              </a:lnSpc>
-              <a:spcBef>
-                <a:spcPct val="0"/>
-              </a:spcBef>
-              <a:spcAft>
-                <a:spcPct val="0"/>
-              </a:spcAft>
-              <a:buClrTx/>
-              <a:buSzTx/>
-              <a:buFontTx/>
-              <a:buNone/>
-              <a:tabLst/>
-            </a:pPr>
-            <a:r>
-              <a:rPr kumimoji="0" lang="en-US" sz="1200" b="0" i="0" u="none" strike="noStrike" cap="none" normalizeH="0" baseline="0" dirty="0" smtClean="0">
-                <a:ln>
-                  <a:noFill/>
-                </a:ln>
-                <a:solidFill>
-                  <a:srgbClr val="000000"/>
-                </a:solidFill>
-                <a:effectLst/>
-                <a:latin typeface="Consolas" pitchFamily="49" charset="0"/>
-                <a:cs typeface="Consolas" pitchFamily="49" charset="0"/>
-              </a:rPr>
-              <a:t>}</a:t>
-            </a:r>
-            <a:endParaRPr kumimoji="0" lang="en-US" sz="1200" b="0" i="0" u="none" strike="noStrike" cap="none" normalizeH="0" baseline="0" dirty="0" smtClean="0">
-              <a:ln>
-                <a:noFill/>
-              </a:ln>
-              <a:solidFill>
-                <a:schemeClr val="tx1"/>
-              </a:solidFill>
-              <a:effectLst/>
-              <a:latin typeface="Arial" pitchFamily="34" charset="0"/>
-              <a:cs typeface="Arial" pitchFamily="34" charset="0"/>
-            </a:endParaRPr>
-          </a:p>
-        </p:txBody>
-      </p:sp>
-    </p:spTree>
-  </p:cSld>
-  <p:clrMapOvr>
-    <a:masterClrMapping/>
-  </p:clrMapOvr>
-  <p:transition>
-    <p:fade thruBlk="1"/>
-  </p:transition>
-  <p:timing>
-    <p:tnLst>
-      <p:par>
-        <p:cTn id="1" dur="indefinite" restart="never" nodeType="tmRoot"/>
-      </p:par>
-    </p:tnLst>
-  </p:timing>
-</p:sld>
-</file>
-
 <file path=ppt/slides/slide12.xml><?xml version="1.0" encoding="utf-8"?>
 <p:sld xmlns:a="http://schemas.openxmlformats.org/drawingml/2006/main" xmlns:r="http://schemas.openxmlformats.org/officeDocument/2006/relationships" xmlns:p="http://schemas.openxmlformats.org/presentationml/2006/main">
   <p:cSld>
@@ -16577,11 +16808,7 @@
             </a:r>
             <a:r>
               <a:rPr lang="en-US" dirty="0" smtClean="0"/>
-              <a:t> </a:t>
-            </a:r>
-            <a:r>
-              <a:rPr lang="en-US" dirty="0" smtClean="0"/>
-              <a:t>for OSS</a:t>
+              <a:t> for OSS</a:t>
             </a:r>
             <a:endParaRPr lang="en-US" dirty="0"/>
           </a:p>
@@ -18107,7 +18334,7 @@
         <p:spPr>
           <a:xfrm>
             <a:off x="321623" y="1397000"/>
-            <a:ext cx="8102827" cy="995144"/>
+            <a:ext cx="8102827" cy="1338828"/>
           </a:xfrm>
           <a:prstGeom prst="rect">
             <a:avLst/>
@@ -18148,13 +18375,38 @@
             </a:pPr>
             <a:r>
               <a:rPr lang="nb-NO" sz="1400" dirty="0" smtClean="0"/>
-              <a:t> Kan brukes direkte i et ASP .NET MVC 4 prosjekt, men kan også brukes uavhengig av MVC</a:t>
-            </a:r>
-            <a:endParaRPr lang="nb-NO" sz="1400" dirty="0" smtClean="0">
-              <a:solidFill>
-                <a:srgbClr val="FF0000"/>
-              </a:solidFill>
-            </a:endParaRPr>
+              <a:t> Kan brukes direkte i et ASP .NET MVC 4 </a:t>
+            </a:r>
+            <a:r>
+              <a:rPr lang="nb-NO" sz="1400" dirty="0" smtClean="0"/>
+              <a:t>prosjekt</a:t>
+            </a:r>
+            <a:endParaRPr lang="nb-NO" sz="1400" dirty="0"/>
+          </a:p>
+          <a:p>
+            <a:pPr>
+              <a:spcBef>
+                <a:spcPts val="600"/>
+              </a:spcBef>
+              <a:spcAft>
+                <a:spcPts val="400"/>
+              </a:spcAft>
+              <a:buFont typeface="Wingdings" pitchFamily="2" charset="2"/>
+              <a:buChar char="ü"/>
+            </a:pPr>
+            <a:r>
+              <a:rPr lang="nb-NO" sz="1400" dirty="0" smtClean="0"/>
+              <a:t> Eller </a:t>
+            </a:r>
+            <a:r>
+              <a:rPr lang="nb-NO" sz="1400" dirty="0" smtClean="0"/>
+              <a:t>installeres separat med nuget: Install-Package </a:t>
+            </a:r>
+            <a:r>
+              <a:rPr lang="nb-NO" sz="1400" dirty="0"/>
+              <a:t>Microsoft.AspNet.WebApi</a:t>
+            </a:r>
+            <a:endParaRPr lang="nb-NO" sz="1400" dirty="0" smtClean="0"/>
           </a:p>
           <a:p>
             <a:pPr>
@@ -18180,7 +18432,7 @@
           <p:nvPr/>
         </p:nvPicPr>
         <p:blipFill>
-          <a:blip r:embed="rId2"/>
+          <a:blip r:embed="rId3"/>
           <a:srcRect/>
           <a:stretch>
             <a:fillRect/>
@@ -18218,7 +18470,7 @@
           <p:nvPr/>
         </p:nvPicPr>
         <p:blipFill>
-          <a:blip r:embed="rId3"/>
+          <a:blip r:embed="rId4"/>
           <a:srcRect/>
           <a:stretch>
             <a:fillRect/>

</xml_diff>

<commit_message>
Added REST Maturity model to slides
</commit_message>
<xml_diff>
--- a/webapi/WebAPI.pptx
+++ b/webapi/WebAPI.pptx
@@ -5,10 +5,10 @@
     <p:sldMasterId id="2147483648" r:id="rId1"/>
   </p:sldMasterIdLst>
   <p:notesMasterIdLst>
-    <p:notesMasterId r:id="rId19"/>
+    <p:notesMasterId r:id="rId20"/>
   </p:notesMasterIdLst>
   <p:handoutMasterIdLst>
-    <p:handoutMasterId r:id="rId20"/>
+    <p:handoutMasterId r:id="rId21"/>
   </p:handoutMasterIdLst>
   <p:sldIdLst>
     <p:sldId id="256" r:id="rId2"/>
@@ -26,8 +26,9 @@
     <p:sldId id="290" r:id="rId14"/>
     <p:sldId id="269" r:id="rId15"/>
     <p:sldId id="279" r:id="rId16"/>
-    <p:sldId id="289" r:id="rId17"/>
-    <p:sldId id="296" r:id="rId18"/>
+    <p:sldId id="297" r:id="rId17"/>
+    <p:sldId id="289" r:id="rId18"/>
+    <p:sldId id="296" r:id="rId19"/>
   </p:sldIdLst>
   <p:sldSz cx="9144000" cy="6858000" type="screen4x3"/>
   <p:notesSz cx="6858000" cy="9144000"/>
@@ -16329,105 +16330,88 @@
                 <a:latin typeface="Consolas" pitchFamily="49" charset="0"/>
                 <a:cs typeface="Consolas" pitchFamily="49" charset="0"/>
               </a:rPr>
-              <a:t>Fork solution fra github: </a:t>
-            </a:r>
-            <a:r>
-              <a:rPr lang="nb-NO" sz="1400" i="1" dirty="0" smtClean="0">
+              <a:t>Fork solution fra github: github.com/bekk/</a:t>
+            </a:r>
+            <a:r>
+              <a:rPr lang="nb-NO" sz="1400" i="1" dirty="0" err="1" smtClean="0">
                 <a:solidFill>
                   <a:schemeClr val="bg1"/>
                 </a:solidFill>
                 <a:latin typeface="Consolas" pitchFamily="49" charset="0"/>
                 <a:cs typeface="Consolas" pitchFamily="49" charset="0"/>
               </a:rPr>
-              <a:t>github.com/bekk/</a:t>
-            </a:r>
-            <a:r>
-              <a:rPr lang="nb-NO" sz="1400" i="1" dirty="0" err="1" smtClean="0">
+              <a:t>dotnetkurs</a:t>
+            </a:r>
+            <a:r>
+              <a:rPr lang="nb-NO" sz="1400" i="1" dirty="0" smtClean="0">
                 <a:solidFill>
                   <a:schemeClr val="bg1"/>
                 </a:solidFill>
                 <a:latin typeface="Consolas" pitchFamily="49" charset="0"/>
                 <a:cs typeface="Consolas" pitchFamily="49" charset="0"/>
               </a:rPr>
-              <a:t>dotnetkurs</a:t>
-            </a:r>
-            <a:r>
-              <a:rPr lang="nb-NO" sz="1400" i="1" dirty="0" smtClean="0">
+              <a:t> se i mappen Oppgaver under </a:t>
+            </a:r>
+            <a:r>
+              <a:rPr lang="nb-NO" sz="1400" i="1" dirty="0" err="1" smtClean="0">
                 <a:solidFill>
                   <a:schemeClr val="bg1"/>
                 </a:solidFill>
                 <a:latin typeface="Consolas" pitchFamily="49" charset="0"/>
                 <a:cs typeface="Consolas" pitchFamily="49" charset="0"/>
               </a:rPr>
-              <a:t> se i mappen Oppgaver under </a:t>
-            </a:r>
-            <a:r>
-              <a:rPr lang="nb-NO" sz="1400" i="1" dirty="0" err="1" smtClean="0">
+              <a:t>webapi</a:t>
+            </a:r>
+            <a:r>
+              <a:rPr lang="nb-NO" sz="1400" i="1" dirty="0" smtClean="0">
                 <a:solidFill>
                   <a:schemeClr val="bg1"/>
                 </a:solidFill>
                 <a:latin typeface="Consolas" pitchFamily="49" charset="0"/>
                 <a:cs typeface="Consolas" pitchFamily="49" charset="0"/>
               </a:rPr>
-              <a:t>webapi</a:t>
-            </a:r>
-            <a:r>
-              <a:rPr lang="nb-NO" sz="1400" i="1" dirty="0" smtClean="0">
+              <a:t>. Her ligger en </a:t>
+            </a:r>
+            <a:r>
+              <a:rPr lang="nb-NO" sz="1400" i="1" dirty="0" err="1" smtClean="0">
                 <a:solidFill>
                   <a:schemeClr val="bg1"/>
                 </a:solidFill>
                 <a:latin typeface="Consolas" pitchFamily="49" charset="0"/>
                 <a:cs typeface="Consolas" pitchFamily="49" charset="0"/>
               </a:rPr>
-              <a:t>. Her ligger en </a:t>
-            </a:r>
-            <a:r>
-              <a:rPr lang="nb-NO" sz="1400" i="1" dirty="0" err="1" smtClean="0">
+              <a:t>solution</a:t>
+            </a:r>
+            <a:r>
+              <a:rPr lang="nb-NO" sz="1400" i="1" dirty="0" smtClean="0">
                 <a:solidFill>
                   <a:schemeClr val="bg1"/>
                 </a:solidFill>
                 <a:latin typeface="Consolas" pitchFamily="49" charset="0"/>
                 <a:cs typeface="Consolas" pitchFamily="49" charset="0"/>
               </a:rPr>
-              <a:t>solution</a:t>
-            </a:r>
-            <a:r>
-              <a:rPr lang="nb-NO" sz="1400" i="1" dirty="0" smtClean="0">
+              <a:t> </a:t>
+            </a:r>
+            <a:r>
+              <a:rPr lang="nb-NO" sz="1400" i="1" dirty="0" err="1" smtClean="0">
                 <a:solidFill>
                   <a:schemeClr val="bg1"/>
                 </a:solidFill>
                 <a:latin typeface="Consolas" pitchFamily="49" charset="0"/>
                 <a:cs typeface="Consolas" pitchFamily="49" charset="0"/>
               </a:rPr>
-              <a:t> </a:t>
-            </a:r>
-            <a:r>
-              <a:rPr lang="nb-NO" sz="1400" i="1" dirty="0" err="1" smtClean="0">
+              <a:t>MinBlogg</a:t>
+            </a:r>
+            <a:r>
+              <a:rPr lang="nb-NO" sz="1400" i="1" dirty="0" smtClean="0">
                 <a:solidFill>
                   <a:schemeClr val="bg1"/>
                 </a:solidFill>
                 <a:latin typeface="Consolas" pitchFamily="49" charset="0"/>
                 <a:cs typeface="Consolas" pitchFamily="49" charset="0"/>
               </a:rPr>
-              <a:t>MinBlogg</a:t>
-            </a:r>
-            <a:r>
-              <a:rPr lang="nb-NO" sz="1400" i="1" dirty="0" smtClean="0">
-                <a:solidFill>
-                  <a:schemeClr val="bg1"/>
-                </a:solidFill>
-                <a:latin typeface="Consolas" pitchFamily="49" charset="0"/>
-                <a:cs typeface="Consolas" pitchFamily="49" charset="0"/>
-              </a:rPr>
               <a:t> som dere kan ta utgangspunkt i.</a:t>
             </a:r>
-            <a:endParaRPr lang="nb-NO" sz="1400" i="1" dirty="0" smtClean="0">
-              <a:solidFill>
-                <a:schemeClr val="bg1"/>
-              </a:solidFill>
-              <a:latin typeface="Consolas" pitchFamily="49" charset="0"/>
-              <a:cs typeface="Consolas" pitchFamily="49" charset="0"/>
-            </a:endParaRPr>
           </a:p>
           <a:p>
             <a:pPr algn="just"/>
@@ -16675,6 +16659,755 @@
 <file path=ppt/slides/slide16.xml><?xml version="1.0" encoding="utf-8"?>
 <p:sld xmlns:a="http://schemas.openxmlformats.org/drawingml/2006/main" xmlns:r="http://schemas.openxmlformats.org/officeDocument/2006/relationships" xmlns:p="http://schemas.openxmlformats.org/presentationml/2006/main">
   <p:cSld>
+    <p:spTree>
+      <p:nvGrpSpPr>
+        <p:cNvPr id="1" name=""/>
+        <p:cNvGrpSpPr/>
+        <p:nvPr/>
+      </p:nvGrpSpPr>
+      <p:grpSpPr>
+        <a:xfrm>
+          <a:off x="0" y="0"/>
+          <a:ext cx="0" cy="0"/>
+          <a:chOff x="0" y="0"/>
+          <a:chExt cx="0" cy="0"/>
+        </a:xfrm>
+      </p:grpSpPr>
+      <p:sp>
+        <p:nvSpPr>
+          <p:cNvPr id="2" name="Title 1"/>
+          <p:cNvSpPr>
+            <a:spLocks noGrp="1"/>
+          </p:cNvSpPr>
+          <p:nvPr>
+            <p:ph type="title"/>
+          </p:nvPr>
+        </p:nvSpPr>
+        <p:spPr>
+          <a:xfrm>
+            <a:off x="321623" y="418905"/>
+            <a:ext cx="1412887" cy="307777"/>
+          </a:xfrm>
+        </p:spPr>
+        <p:txBody>
+          <a:bodyPr/>
+          <a:lstStyle/>
+          <a:p>
+            <a:r>
+              <a:rPr lang="nb-NO" dirty="0" smtClean="0"/>
+              <a:t>HATEOAS</a:t>
+            </a:r>
+            <a:endParaRPr lang="nb-NO" dirty="0"/>
+          </a:p>
+        </p:txBody>
+      </p:sp>
+      <p:sp>
+        <p:nvSpPr>
+          <p:cNvPr id="3" name="Slide Number Placeholder 2"/>
+          <p:cNvSpPr>
+            <a:spLocks noGrp="1"/>
+          </p:cNvSpPr>
+          <p:nvPr>
+            <p:ph type="sldNum" sz="quarter" idx="10"/>
+          </p:nvPr>
+        </p:nvSpPr>
+        <p:spPr/>
+        <p:txBody>
+          <a:bodyPr/>
+          <a:lstStyle/>
+          <a:p>
+            <a:fld id="{FF67BF5B-7344-D747-A0C2-CBD7B2ACBC85}" type="slidenum">
+              <a:rPr lang="en-US" smtClean="0"/>
+              <a:pPr/>
+              <a:t>16</a:t>
+            </a:fld>
+            <a:endParaRPr lang="en-US" dirty="0"/>
+          </a:p>
+        </p:txBody>
+      </p:sp>
+      <p:sp>
+        <p:nvSpPr>
+          <p:cNvPr id="5" name="TextBox 4"/>
+          <p:cNvSpPr txBox="1"/>
+          <p:nvPr/>
+        </p:nvSpPr>
+        <p:spPr>
+          <a:xfrm>
+            <a:off x="321623" y="1181100"/>
+            <a:ext cx="8517577" cy="836126"/>
+          </a:xfrm>
+          <a:prstGeom prst="rect">
+            <a:avLst/>
+          </a:prstGeom>
+          <a:noFill/>
+        </p:spPr>
+        <p:txBody>
+          <a:bodyPr wrap="square" rtlCol="0">
+            <a:spAutoFit/>
+          </a:bodyPr>
+          <a:lstStyle/>
+          <a:p>
+            <a:pPr>
+              <a:spcBef>
+                <a:spcPts val="600"/>
+              </a:spcBef>
+              <a:spcAft>
+                <a:spcPts val="400"/>
+              </a:spcAft>
+            </a:pPr>
+            <a:r>
+              <a:rPr lang="nb-NO" sz="2000" i="1" dirty="0" err="1" smtClean="0"/>
+              <a:t>Hypermedia</a:t>
+            </a:r>
+            <a:r>
+              <a:rPr lang="nb-NO" sz="2000" i="1" dirty="0" smtClean="0"/>
+              <a:t> as </a:t>
+            </a:r>
+            <a:r>
+              <a:rPr lang="nb-NO" sz="2000" i="1" dirty="0" err="1" smtClean="0"/>
+              <a:t>the</a:t>
+            </a:r>
+            <a:r>
+              <a:rPr lang="nb-NO" sz="2000" i="1" dirty="0" smtClean="0"/>
+              <a:t> Engine </a:t>
+            </a:r>
+            <a:r>
+              <a:rPr lang="nb-NO" sz="2000" i="1" dirty="0" err="1" smtClean="0"/>
+              <a:t>of</a:t>
+            </a:r>
+            <a:r>
+              <a:rPr lang="nb-NO" sz="2000" i="1" dirty="0" smtClean="0"/>
+              <a:t> Application State</a:t>
+            </a:r>
+          </a:p>
+          <a:p>
+            <a:pPr>
+              <a:spcBef>
+                <a:spcPts val="600"/>
+              </a:spcBef>
+              <a:spcAft>
+                <a:spcPts val="400"/>
+              </a:spcAft>
+            </a:pPr>
+            <a:endParaRPr lang="nb-NO" sz="2000" i="1" dirty="0"/>
+          </a:p>
+        </p:txBody>
+      </p:sp>
+      <p:sp>
+        <p:nvSpPr>
+          <p:cNvPr id="6" name="Rounded Rectangle 5"/>
+          <p:cNvSpPr/>
+          <p:nvPr/>
+        </p:nvSpPr>
+        <p:spPr>
+          <a:xfrm>
+            <a:off x="321623" y="5080000"/>
+            <a:ext cx="6853877" cy="571500"/>
+          </a:xfrm>
+          <a:prstGeom prst="roundRect">
+            <a:avLst/>
+          </a:prstGeom>
+          <a:solidFill>
+            <a:schemeClr val="accent1">
+              <a:lumMod val="50000"/>
+            </a:schemeClr>
+          </a:solidFill>
+          <a:ln>
+            <a:noFill/>
+          </a:ln>
+          <a:effectLst/>
+        </p:spPr>
+        <p:style>
+          <a:lnRef idx="1">
+            <a:schemeClr val="accent1"/>
+          </a:lnRef>
+          <a:fillRef idx="3">
+            <a:schemeClr val="accent1"/>
+          </a:fillRef>
+          <a:effectRef idx="2">
+            <a:schemeClr val="accent1"/>
+          </a:effectRef>
+          <a:fontRef idx="minor">
+            <a:schemeClr val="lt1"/>
+          </a:fontRef>
+        </p:style>
+        <p:txBody>
+          <a:bodyPr rot="0" spcFirstLastPara="0" vertOverflow="overflow" horzOverflow="overflow" vert="horz" wrap="square" lIns="91440" tIns="45720" rIns="91440" bIns="45720" numCol="1" spcCol="0" rtlCol="0" fromWordArt="0" anchor="ctr" anchorCtr="0" forceAA="0" compatLnSpc="1">
+            <a:prstTxWarp prst="textNoShape">
+              <a:avLst/>
+            </a:prstTxWarp>
+            <a:noAutofit/>
+          </a:bodyPr>
+          <a:lstStyle/>
+          <a:p>
+            <a:pPr>
+              <a:spcBef>
+                <a:spcPts val="600"/>
+              </a:spcBef>
+              <a:spcAft>
+                <a:spcPts val="400"/>
+              </a:spcAft>
+            </a:pPr>
+            <a:r>
+              <a:rPr lang="nb-NO" sz="1600" b="1" dirty="0" smtClean="0">
+                <a:solidFill>
+                  <a:schemeClr val="bg1"/>
+                </a:solidFill>
+              </a:rPr>
+              <a:t>Level 0 : The </a:t>
+            </a:r>
+            <a:r>
+              <a:rPr lang="nb-NO" sz="1600" b="1" dirty="0" err="1" smtClean="0">
+                <a:solidFill>
+                  <a:schemeClr val="bg1"/>
+                </a:solidFill>
+              </a:rPr>
+              <a:t>smap</a:t>
+            </a:r>
+            <a:r>
+              <a:rPr lang="nb-NO" sz="1600" b="1" dirty="0" smtClean="0">
+                <a:solidFill>
+                  <a:schemeClr val="bg1"/>
+                </a:solidFill>
+              </a:rPr>
+              <a:t> </a:t>
+            </a:r>
+            <a:r>
+              <a:rPr lang="nb-NO" sz="1600" b="1" dirty="0" err="1" smtClean="0">
+                <a:solidFill>
+                  <a:schemeClr val="bg1"/>
+                </a:solidFill>
+              </a:rPr>
+              <a:t>of</a:t>
+            </a:r>
+            <a:r>
+              <a:rPr lang="nb-NO" sz="1600" b="1" dirty="0" smtClean="0">
+                <a:solidFill>
+                  <a:schemeClr val="bg1"/>
+                </a:solidFill>
+              </a:rPr>
+              <a:t> POX</a:t>
+            </a:r>
+            <a:endParaRPr lang="nb-NO" sz="1600" b="1" dirty="0" smtClean="0">
+              <a:solidFill>
+                <a:schemeClr val="bg1"/>
+              </a:solidFill>
+            </a:endParaRPr>
+          </a:p>
+        </p:txBody>
+      </p:sp>
+      <p:sp>
+        <p:nvSpPr>
+          <p:cNvPr id="7" name="Rounded Rectangle 6"/>
+          <p:cNvSpPr/>
+          <p:nvPr/>
+        </p:nvSpPr>
+        <p:spPr>
+          <a:xfrm>
+            <a:off x="1244600" y="4356100"/>
+            <a:ext cx="5930900" cy="571500"/>
+          </a:xfrm>
+          <a:prstGeom prst="roundRect">
+            <a:avLst/>
+          </a:prstGeom>
+          <a:solidFill>
+            <a:schemeClr val="accent1">
+              <a:lumMod val="75000"/>
+            </a:schemeClr>
+          </a:solidFill>
+          <a:ln>
+            <a:noFill/>
+          </a:ln>
+          <a:effectLst/>
+        </p:spPr>
+        <p:style>
+          <a:lnRef idx="1">
+            <a:schemeClr val="accent1"/>
+          </a:lnRef>
+          <a:fillRef idx="3">
+            <a:schemeClr val="accent1"/>
+          </a:fillRef>
+          <a:effectRef idx="2">
+            <a:schemeClr val="accent1"/>
+          </a:effectRef>
+          <a:fontRef idx="minor">
+            <a:schemeClr val="lt1"/>
+          </a:fontRef>
+        </p:style>
+        <p:txBody>
+          <a:bodyPr rot="0" spcFirstLastPara="0" vertOverflow="overflow" horzOverflow="overflow" vert="horz" wrap="square" lIns="91440" tIns="45720" rIns="91440" bIns="45720" numCol="1" spcCol="0" rtlCol="0" fromWordArt="0" anchor="ctr" anchorCtr="0" forceAA="0" compatLnSpc="1">
+            <a:prstTxWarp prst="textNoShape">
+              <a:avLst/>
+            </a:prstTxWarp>
+            <a:noAutofit/>
+          </a:bodyPr>
+          <a:lstStyle/>
+          <a:p>
+            <a:pPr>
+              <a:spcBef>
+                <a:spcPts val="600"/>
+              </a:spcBef>
+              <a:spcAft>
+                <a:spcPts val="400"/>
+              </a:spcAft>
+            </a:pPr>
+            <a:r>
+              <a:rPr lang="nb-NO" sz="1600" b="1" dirty="0" smtClean="0">
+                <a:solidFill>
+                  <a:schemeClr val="bg1"/>
+                </a:solidFill>
+              </a:rPr>
+              <a:t>Level 1 : Resources</a:t>
+            </a:r>
+            <a:endParaRPr lang="nb-NO" sz="1600" b="1" dirty="0" smtClean="0">
+              <a:solidFill>
+                <a:schemeClr val="bg1"/>
+              </a:solidFill>
+            </a:endParaRPr>
+          </a:p>
+        </p:txBody>
+      </p:sp>
+      <p:sp>
+        <p:nvSpPr>
+          <p:cNvPr id="8" name="Rounded Rectangle 7"/>
+          <p:cNvSpPr/>
+          <p:nvPr/>
+        </p:nvSpPr>
+        <p:spPr>
+          <a:xfrm>
+            <a:off x="2159000" y="3632200"/>
+            <a:ext cx="5016499" cy="571500"/>
+          </a:xfrm>
+          <a:prstGeom prst="roundRect">
+            <a:avLst/>
+          </a:prstGeom>
+          <a:solidFill>
+            <a:schemeClr val="accent1">
+              <a:lumMod val="60000"/>
+              <a:lumOff val="40000"/>
+            </a:schemeClr>
+          </a:solidFill>
+          <a:ln>
+            <a:noFill/>
+          </a:ln>
+          <a:effectLst/>
+        </p:spPr>
+        <p:style>
+          <a:lnRef idx="1">
+            <a:schemeClr val="accent1"/>
+          </a:lnRef>
+          <a:fillRef idx="3">
+            <a:schemeClr val="accent1"/>
+          </a:fillRef>
+          <a:effectRef idx="2">
+            <a:schemeClr val="accent1"/>
+          </a:effectRef>
+          <a:fontRef idx="minor">
+            <a:schemeClr val="lt1"/>
+          </a:fontRef>
+        </p:style>
+        <p:txBody>
+          <a:bodyPr rot="0" spcFirstLastPara="0" vertOverflow="overflow" horzOverflow="overflow" vert="horz" wrap="square" lIns="91440" tIns="45720" rIns="91440" bIns="45720" numCol="1" spcCol="0" rtlCol="0" fromWordArt="0" anchor="ctr" anchorCtr="0" forceAA="0" compatLnSpc="1">
+            <a:prstTxWarp prst="textNoShape">
+              <a:avLst/>
+            </a:prstTxWarp>
+            <a:noAutofit/>
+          </a:bodyPr>
+          <a:lstStyle/>
+          <a:p>
+            <a:pPr>
+              <a:spcBef>
+                <a:spcPts val="600"/>
+              </a:spcBef>
+              <a:spcAft>
+                <a:spcPts val="400"/>
+              </a:spcAft>
+            </a:pPr>
+            <a:r>
+              <a:rPr lang="nb-NO" sz="1600" b="1" dirty="0" smtClean="0">
+                <a:solidFill>
+                  <a:schemeClr val="bg1"/>
+                </a:solidFill>
+              </a:rPr>
+              <a:t>Level 2 : HTTP Verbs</a:t>
+            </a:r>
+            <a:endParaRPr lang="nb-NO" sz="1600" b="1" dirty="0" smtClean="0">
+              <a:solidFill>
+                <a:schemeClr val="bg1"/>
+              </a:solidFill>
+            </a:endParaRPr>
+          </a:p>
+        </p:txBody>
+      </p:sp>
+      <p:sp>
+        <p:nvSpPr>
+          <p:cNvPr id="9" name="Rounded Rectangle 8"/>
+          <p:cNvSpPr/>
+          <p:nvPr/>
+        </p:nvSpPr>
+        <p:spPr>
+          <a:xfrm>
+            <a:off x="3086100" y="2908300"/>
+            <a:ext cx="4089400" cy="571500"/>
+          </a:xfrm>
+          <a:prstGeom prst="roundRect">
+            <a:avLst/>
+          </a:prstGeom>
+          <a:solidFill>
+            <a:schemeClr val="accent1">
+              <a:lumMod val="40000"/>
+              <a:lumOff val="60000"/>
+            </a:schemeClr>
+          </a:solidFill>
+          <a:ln>
+            <a:noFill/>
+          </a:ln>
+          <a:effectLst/>
+        </p:spPr>
+        <p:style>
+          <a:lnRef idx="1">
+            <a:schemeClr val="accent1"/>
+          </a:lnRef>
+          <a:fillRef idx="3">
+            <a:schemeClr val="accent1"/>
+          </a:fillRef>
+          <a:effectRef idx="2">
+            <a:schemeClr val="accent1"/>
+          </a:effectRef>
+          <a:fontRef idx="minor">
+            <a:schemeClr val="lt1"/>
+          </a:fontRef>
+        </p:style>
+        <p:txBody>
+          <a:bodyPr rot="0" spcFirstLastPara="0" vertOverflow="overflow" horzOverflow="overflow" vert="horz" wrap="square" lIns="91440" tIns="45720" rIns="91440" bIns="45720" numCol="1" spcCol="0" rtlCol="0" fromWordArt="0" anchor="ctr" anchorCtr="0" forceAA="0" compatLnSpc="1">
+            <a:prstTxWarp prst="textNoShape">
+              <a:avLst/>
+            </a:prstTxWarp>
+            <a:noAutofit/>
+          </a:bodyPr>
+          <a:lstStyle/>
+          <a:p>
+            <a:pPr>
+              <a:spcBef>
+                <a:spcPts val="600"/>
+              </a:spcBef>
+              <a:spcAft>
+                <a:spcPts val="400"/>
+              </a:spcAft>
+            </a:pPr>
+            <a:r>
+              <a:rPr lang="nb-NO" sz="1600" b="1" dirty="0" smtClean="0">
+                <a:solidFill>
+                  <a:schemeClr val="bg1"/>
+                </a:solidFill>
+              </a:rPr>
+              <a:t>Level 3 : </a:t>
+            </a:r>
+            <a:r>
+              <a:rPr lang="nb-NO" sz="1600" b="1" dirty="0" err="1" smtClean="0">
+                <a:solidFill>
+                  <a:schemeClr val="bg1"/>
+                </a:solidFill>
+              </a:rPr>
+              <a:t>Hypermedia</a:t>
+            </a:r>
+            <a:r>
+              <a:rPr lang="nb-NO" sz="1600" b="1" dirty="0" smtClean="0">
+                <a:solidFill>
+                  <a:schemeClr val="bg1"/>
+                </a:solidFill>
+              </a:rPr>
+              <a:t> </a:t>
+            </a:r>
+            <a:r>
+              <a:rPr lang="nb-NO" sz="1600" b="1" dirty="0" err="1" smtClean="0">
+                <a:solidFill>
+                  <a:schemeClr val="bg1"/>
+                </a:solidFill>
+              </a:rPr>
+              <a:t>controls</a:t>
+            </a:r>
+            <a:endParaRPr lang="nb-NO" sz="1600" b="1" dirty="0" smtClean="0">
+              <a:solidFill>
+                <a:schemeClr val="bg1"/>
+              </a:solidFill>
+            </a:endParaRPr>
+          </a:p>
+        </p:txBody>
+      </p:sp>
+      <p:sp>
+        <p:nvSpPr>
+          <p:cNvPr id="10" name="TextBox 9"/>
+          <p:cNvSpPr txBox="1"/>
+          <p:nvPr/>
+        </p:nvSpPr>
+        <p:spPr>
+          <a:xfrm>
+            <a:off x="3467099" y="2324100"/>
+            <a:ext cx="3708399" cy="461665"/>
+          </a:xfrm>
+          <a:prstGeom prst="rect">
+            <a:avLst/>
+          </a:prstGeom>
+          <a:noFill/>
+        </p:spPr>
+        <p:txBody>
+          <a:bodyPr wrap="square" rtlCol="0">
+            <a:spAutoFit/>
+          </a:bodyPr>
+          <a:lstStyle/>
+          <a:p>
+            <a:pPr algn="r">
+              <a:spcBef>
+                <a:spcPts val="600"/>
+              </a:spcBef>
+              <a:spcAft>
+                <a:spcPts val="400"/>
+              </a:spcAft>
+            </a:pPr>
+            <a:r>
+              <a:rPr lang="nb-NO" sz="2400" b="1" dirty="0" err="1" smtClean="0"/>
+              <a:t>Glory</a:t>
+            </a:r>
+            <a:r>
+              <a:rPr lang="nb-NO" sz="2400" b="1" dirty="0" smtClean="0"/>
+              <a:t> </a:t>
+            </a:r>
+            <a:r>
+              <a:rPr lang="nb-NO" sz="2400" b="1" dirty="0" err="1" smtClean="0"/>
+              <a:t>of</a:t>
+            </a:r>
+            <a:r>
+              <a:rPr lang="nb-NO" sz="2400" b="1" dirty="0" smtClean="0"/>
+              <a:t> REST</a:t>
+            </a:r>
+            <a:endParaRPr lang="nb-NO" sz="2400" b="1" dirty="0" smtClean="0"/>
+          </a:p>
+        </p:txBody>
+      </p:sp>
+      <p:sp>
+        <p:nvSpPr>
+          <p:cNvPr id="11" name="Right Arrow 10"/>
+          <p:cNvSpPr/>
+          <p:nvPr/>
+        </p:nvSpPr>
+        <p:spPr>
+          <a:xfrm rot="16200000">
+            <a:off x="6702333" y="3787868"/>
+            <a:ext cx="2743200" cy="984061"/>
+          </a:xfrm>
+          <a:prstGeom prst="rightArrow">
+            <a:avLst/>
+          </a:prstGeom>
+          <a:gradFill flip="none" rotWithShape="1">
+            <a:gsLst>
+              <a:gs pos="24000">
+                <a:schemeClr val="accent2">
+                  <a:lumMod val="75000"/>
+                </a:schemeClr>
+              </a:gs>
+              <a:gs pos="0">
+                <a:schemeClr val="accent1">
+                  <a:lumMod val="50000"/>
+                </a:schemeClr>
+              </a:gs>
+              <a:gs pos="53000">
+                <a:schemeClr val="accent2">
+                  <a:lumMod val="60000"/>
+                  <a:lumOff val="40000"/>
+                </a:schemeClr>
+              </a:gs>
+              <a:gs pos="78000">
+                <a:schemeClr val="accent1">
+                  <a:lumMod val="45000"/>
+                  <a:lumOff val="55000"/>
+                </a:schemeClr>
+              </a:gs>
+              <a:gs pos="100000">
+                <a:schemeClr val="accent1">
+                  <a:lumMod val="30000"/>
+                  <a:lumOff val="70000"/>
+                </a:schemeClr>
+              </a:gs>
+            </a:gsLst>
+            <a:lin ang="0" scaled="0"/>
+            <a:tileRect/>
+          </a:gradFill>
+          <a:ln>
+            <a:noFill/>
+          </a:ln>
+          <a:effectLst/>
+        </p:spPr>
+        <p:style>
+          <a:lnRef idx="1">
+            <a:schemeClr val="accent1"/>
+          </a:lnRef>
+          <a:fillRef idx="3">
+            <a:schemeClr val="accent1"/>
+          </a:fillRef>
+          <a:effectRef idx="2">
+            <a:schemeClr val="accent1"/>
+          </a:effectRef>
+          <a:fontRef idx="minor">
+            <a:schemeClr val="lt1"/>
+          </a:fontRef>
+        </p:style>
+        <p:txBody>
+          <a:bodyPr rot="0" spcFirstLastPara="0" vertOverflow="overflow" horzOverflow="overflow" vert="horz" wrap="square" lIns="91440" tIns="45720" rIns="91440" bIns="45720" numCol="1" spcCol="0" rtlCol="0" fromWordArt="0" anchor="ctr" anchorCtr="0" forceAA="0" compatLnSpc="1">
+            <a:prstTxWarp prst="textNoShape">
+              <a:avLst/>
+            </a:prstTxWarp>
+            <a:noAutofit/>
+          </a:bodyPr>
+          <a:lstStyle/>
+          <a:p>
+            <a:pPr algn="ctr">
+              <a:spcBef>
+                <a:spcPts val="600"/>
+              </a:spcBef>
+              <a:spcAft>
+                <a:spcPts val="400"/>
+              </a:spcAft>
+            </a:pPr>
+            <a:endParaRPr lang="nb-NO" sz="1400" dirty="0" err="1" smtClean="0">
+              <a:solidFill>
+                <a:schemeClr val="tx1"/>
+              </a:solidFill>
+            </a:endParaRPr>
+          </a:p>
+        </p:txBody>
+      </p:sp>
+      <p:sp>
+        <p:nvSpPr>
+          <p:cNvPr id="12" name="Donut 11"/>
+          <p:cNvSpPr/>
+          <p:nvPr/>
+        </p:nvSpPr>
+        <p:spPr>
+          <a:xfrm>
+            <a:off x="7581902" y="2362200"/>
+            <a:ext cx="927100" cy="304800"/>
+          </a:xfrm>
+          <a:prstGeom prst="donut">
+            <a:avLst/>
+          </a:prstGeom>
+          <a:ln/>
+        </p:spPr>
+        <p:style>
+          <a:lnRef idx="2">
+            <a:schemeClr val="accent3"/>
+          </a:lnRef>
+          <a:fillRef idx="1">
+            <a:schemeClr val="lt1"/>
+          </a:fillRef>
+          <a:effectRef idx="0">
+            <a:schemeClr val="accent3"/>
+          </a:effectRef>
+          <a:fontRef idx="minor">
+            <a:schemeClr val="dk1"/>
+          </a:fontRef>
+        </p:style>
+        <p:txBody>
+          <a:bodyPr rot="0" spcFirstLastPara="0" vertOverflow="overflow" horzOverflow="overflow" vert="horz" wrap="square" lIns="91440" tIns="45720" rIns="91440" bIns="45720" numCol="1" spcCol="0" rtlCol="0" fromWordArt="0" anchor="ctr" anchorCtr="0" forceAA="0" compatLnSpc="1">
+            <a:prstTxWarp prst="textNoShape">
+              <a:avLst/>
+            </a:prstTxWarp>
+            <a:noAutofit/>
+          </a:bodyPr>
+          <a:lstStyle/>
+          <a:p>
+            <a:pPr algn="ctr">
+              <a:spcBef>
+                <a:spcPts val="600"/>
+              </a:spcBef>
+              <a:spcAft>
+                <a:spcPts val="400"/>
+              </a:spcAft>
+            </a:pPr>
+            <a:endParaRPr lang="nb-NO" sz="1400" dirty="0" err="1" smtClean="0">
+              <a:solidFill>
+                <a:schemeClr val="tx1"/>
+              </a:solidFill>
+            </a:endParaRPr>
+          </a:p>
+        </p:txBody>
+      </p:sp>
+      <p:sp>
+        <p:nvSpPr>
+          <p:cNvPr id="13" name="TextBox 12"/>
+          <p:cNvSpPr txBox="1"/>
+          <p:nvPr/>
+        </p:nvSpPr>
+        <p:spPr>
+          <a:xfrm>
+            <a:off x="2780011" y="5880100"/>
+            <a:ext cx="2860078" cy="353943"/>
+          </a:xfrm>
+          <a:prstGeom prst="rect">
+            <a:avLst/>
+          </a:prstGeom>
+          <a:noFill/>
+        </p:spPr>
+        <p:txBody>
+          <a:bodyPr wrap="none" rtlCol="0">
+            <a:spAutoFit/>
+          </a:bodyPr>
+          <a:lstStyle/>
+          <a:p>
+            <a:pPr>
+              <a:spcBef>
+                <a:spcPts val="600"/>
+              </a:spcBef>
+              <a:spcAft>
+                <a:spcPts val="400"/>
+              </a:spcAft>
+            </a:pPr>
+            <a:r>
+              <a:rPr lang="nb-NO" sz="1700" dirty="0" err="1" smtClean="0"/>
+              <a:t>Richardson</a:t>
+            </a:r>
+            <a:r>
+              <a:rPr lang="nb-NO" sz="1700" dirty="0" smtClean="0"/>
+              <a:t> </a:t>
+            </a:r>
+            <a:r>
+              <a:rPr lang="nb-NO" sz="1700" dirty="0" err="1" smtClean="0"/>
+              <a:t>Maturity</a:t>
+            </a:r>
+            <a:r>
+              <a:rPr lang="nb-NO" sz="1700" dirty="0" smtClean="0"/>
+              <a:t> Model</a:t>
+            </a:r>
+            <a:endParaRPr lang="nb-NO" sz="1700" dirty="0" smtClean="0"/>
+          </a:p>
+        </p:txBody>
+      </p:sp>
+    </p:spTree>
+    <p:extLst>
+      <p:ext uri="{BB962C8B-B14F-4D97-AF65-F5344CB8AC3E}">
+        <p14:creationId xmlns:p14="http://schemas.microsoft.com/office/powerpoint/2010/main" val="1129048049"/>
+      </p:ext>
+    </p:extLst>
+  </p:cSld>
+  <p:clrMapOvr>
+    <a:masterClrMapping/>
+  </p:clrMapOvr>
+  <p:transition>
+    <p:fade thruBlk="1"/>
+  </p:transition>
+  <p:timing>
+    <p:tnLst>
+      <p:par>
+        <p:cTn id="1" dur="indefinite" restart="never" nodeType="tmRoot"/>
+      </p:par>
+    </p:tnLst>
+  </p:timing>
+</p:sld>
+</file>
+
+<file path=ppt/slides/slide17.xml><?xml version="1.0" encoding="utf-8"?>
+<p:sld xmlns:a="http://schemas.openxmlformats.org/drawingml/2006/main" xmlns:r="http://schemas.openxmlformats.org/officeDocument/2006/relationships" xmlns:p="http://schemas.openxmlformats.org/presentationml/2006/main">
+  <p:cSld>
     <p:bg>
       <p:bgPr>
         <a:solidFill>
@@ -16762,7 +17495,7 @@
                 </a:solidFill>
               </a:rPr>
               <a:pPr/>
-              <a:t>16</a:t>
+              <a:t>17</a:t>
             </a:fld>
             <a:endParaRPr lang="en-US" dirty="0">
               <a:solidFill>
@@ -16850,7 +17583,7 @@
 </p:sld>
 </file>
 
-<file path=ppt/slides/slide17.xml><?xml version="1.0" encoding="utf-8"?>
+<file path=ppt/slides/slide18.xml><?xml version="1.0" encoding="utf-8"?>
 <p:sld xmlns:a="http://schemas.openxmlformats.org/drawingml/2006/main" xmlns:r="http://schemas.openxmlformats.org/officeDocument/2006/relationships" xmlns:p="http://schemas.openxmlformats.org/presentationml/2006/main">
   <p:cSld>
     <p:spTree>
@@ -16996,7 +17729,7 @@
             <a:fld id="{FF67BF5B-7344-D747-A0C2-CBD7B2ACBC85}" type="slidenum">
               <a:rPr lang="en-US" smtClean="0"/>
               <a:pPr/>
-              <a:t>17</a:t>
+              <a:t>18</a:t>
             </a:fld>
             <a:endParaRPr lang="en-US" dirty="0"/>
           </a:p>
@@ -17208,11 +17941,7 @@
             </a:pPr>
             <a:r>
               <a:rPr lang="nb-NO" sz="2000" b="1" dirty="0" smtClean="0"/>
-              <a:t> </a:t>
-            </a:r>
-            <a:r>
-              <a:rPr lang="nb-NO" sz="2000" b="1" dirty="0" smtClean="0"/>
-              <a:t>Oppgave (</a:t>
+              <a:t> Oppgave (</a:t>
             </a:r>
             <a:r>
               <a:rPr lang="nb-NO" sz="2000" b="1" dirty="0" err="1" smtClean="0"/>
@@ -17222,7 +17951,6 @@
               <a:rPr lang="nb-NO" sz="2000" b="1" dirty="0" smtClean="0"/>
               <a:t>)</a:t>
             </a:r>
-            <a:endParaRPr lang="nb-NO" sz="2000" b="1" dirty="0" smtClean="0"/>
           </a:p>
           <a:p>
             <a:pPr>
@@ -17247,7 +17975,6 @@
               <a:rPr lang="nb-NO" sz="2000" b="1" dirty="0" smtClean="0"/>
               <a:t> konsument)</a:t>
             </a:r>
-            <a:endParaRPr lang="nb-NO" sz="2000" b="1" dirty="0" smtClean="0"/>
           </a:p>
           <a:p>
             <a:pPr>
@@ -17579,11 +18306,7 @@
             <a:pPr algn="ctr"/>
             <a:r>
               <a:rPr lang="nb-NO" sz="2800" dirty="0" smtClean="0"/>
-              <a:t>Ressurs</a:t>
-            </a:r>
-            <a:r>
-              <a:rPr lang="nb-NO" sz="2800" dirty="0" smtClean="0"/>
-              <a:t>:</a:t>
+              <a:t>Ressurs:</a:t>
             </a:r>
             <a:r>
               <a:rPr lang="nb-NO" sz="2800" dirty="0"/>
@@ -18064,11 +18787,7 @@
             </a:pPr>
             <a:r>
               <a:rPr lang="nb-NO" b="1" dirty="0" smtClean="0"/>
-              <a:t>Hent alle bloggposter på </a:t>
-            </a:r>
-            <a:r>
-              <a:rPr lang="nb-NO" b="1" dirty="0" smtClean="0"/>
-              <a:t>blogg</a:t>
+              <a:t>Hent alle bloggposter på blogg</a:t>
             </a:r>
             <a:r>
               <a:rPr lang="nb-NO" b="1" dirty="0"/>
@@ -18079,11 +18798,7 @@
             </a:br>
             <a:r>
               <a:rPr lang="nb-NO" dirty="0" smtClean="0"/>
-              <a:t>GET </a:t>
-            </a:r>
-            <a:r>
-              <a:rPr lang="nb-NO" dirty="0" smtClean="0"/>
-              <a:t>– minblogg.no/api/bloggposter</a:t>
+              <a:t>GET – minblogg.no/api/bloggposter</a:t>
             </a:r>
             <a:endParaRPr lang="nb-NO" dirty="0"/>
           </a:p>
@@ -18101,22 +18816,14 @@
             </a:pPr>
             <a:r>
               <a:rPr lang="nb-NO" b="1" dirty="0" smtClean="0"/>
-              <a:t>Lag ny </a:t>
-            </a:r>
-            <a:r>
-              <a:rPr lang="nb-NO" b="1" dirty="0" smtClean="0"/>
-              <a:t>bloggpost</a:t>
+              <a:t>Lag ny bloggpost</a:t>
             </a:r>
             <a:br>
               <a:rPr lang="nb-NO" b="1" dirty="0" smtClean="0"/>
             </a:br>
             <a:r>
               <a:rPr lang="nb-NO" dirty="0" smtClean="0"/>
-              <a:t>POST </a:t>
-            </a:r>
-            <a:r>
-              <a:rPr lang="nb-NO" dirty="0" smtClean="0"/>
-              <a:t>{Id: 1, Tittel: Lær deg WebApi} – minblogg.no/api/bloggposter</a:t>
+              <a:t>POST {Id: 1, Tittel: Lær deg WebApi} – minblogg.no/api/bloggposter</a:t>
             </a:r>
           </a:p>
           <a:p>
@@ -18133,22 +18840,14 @@
             </a:pPr>
             <a:r>
               <a:rPr lang="nb-NO" b="1" dirty="0" smtClean="0"/>
-              <a:t>Endre tittel på </a:t>
-            </a:r>
-            <a:r>
-              <a:rPr lang="nb-NO" b="1" dirty="0" smtClean="0"/>
-              <a:t>bloggpost</a:t>
+              <a:t>Endre tittel på bloggpost</a:t>
             </a:r>
             <a:br>
               <a:rPr lang="nb-NO" b="1" dirty="0" smtClean="0"/>
             </a:br>
             <a:r>
               <a:rPr lang="nb-NO" dirty="0" smtClean="0"/>
-              <a:t>PUT </a:t>
-            </a:r>
-            <a:r>
-              <a:rPr lang="nb-NO" dirty="0" smtClean="0"/>
-              <a:t>{Tittel: WebApi er gøy} – minblogg.no/api/bloggposter/1</a:t>
+              <a:t>PUT {Tittel: WebApi er gøy} – minblogg.no/api/bloggposter/1</a:t>
             </a:r>
           </a:p>
           <a:p>
@@ -18165,11 +18864,7 @@
             </a:pPr>
             <a:r>
               <a:rPr lang="nb-NO" b="1" dirty="0" smtClean="0"/>
-              <a:t>Slett </a:t>
-            </a:r>
-            <a:r>
-              <a:rPr lang="nb-NO" b="1" dirty="0" smtClean="0"/>
-              <a:t>bloggpost</a:t>
+              <a:t>Slett bloggpost</a:t>
             </a:r>
             <a:r>
               <a:rPr lang="nb-NO" b="1" dirty="0"/>
@@ -18180,11 +18875,7 @@
             </a:br>
             <a:r>
               <a:rPr lang="nb-NO" dirty="0" smtClean="0"/>
-              <a:t>DELETE </a:t>
-            </a:r>
-            <a:r>
-              <a:rPr lang="nb-NO" dirty="0" smtClean="0"/>
-              <a:t>– minblogg.no/api/bloggposter/1</a:t>
+              <a:t>DELETE – minblogg.no/api/bloggposter/1</a:t>
             </a:r>
           </a:p>
           <a:p>
@@ -18354,11 +19045,7 @@
             </a:pPr>
             <a:r>
               <a:rPr lang="nb-NO" b="1" dirty="0" smtClean="0"/>
-              <a:t> Rammeverk </a:t>
-            </a:r>
-            <a:r>
-              <a:rPr lang="nb-NO" b="1" dirty="0" smtClean="0"/>
-              <a:t>for å bygge HTTP-baserte tjenester på .NET </a:t>
+              <a:t> Rammeverk for å bygge HTTP-baserte tjenester på .NET </a:t>
             </a:r>
             <a:r>
               <a:rPr lang="nb-NO" b="1" dirty="0" err="1" smtClean="0"/>
@@ -18386,11 +19073,7 @@
             </a:pPr>
             <a:r>
               <a:rPr lang="nb-NO" b="1" dirty="0" smtClean="0"/>
-              <a:t> Gjør </a:t>
-            </a:r>
-            <a:r>
-              <a:rPr lang="nb-NO" b="1" dirty="0" smtClean="0"/>
-              <a:t>det enkelt å lage tjenester som følger REST-prinsippene </a:t>
+              <a:t> Gjør det enkelt å lage tjenester som følger REST-prinsippene </a:t>
             </a:r>
           </a:p>
           <a:p>
@@ -18417,11 +19100,7 @@
             </a:pPr>
             <a:r>
               <a:rPr lang="nb-NO" b="1" dirty="0" smtClean="0"/>
-              <a:t> Tilgjengeliggjøring </a:t>
-            </a:r>
-            <a:r>
-              <a:rPr lang="nb-NO" b="1" dirty="0" smtClean="0"/>
-              <a:t>for flere enheter og klientplatformer</a:t>
+              <a:t> Tilgjengeliggjøring for flere enheter og klientplatformer</a:t>
             </a:r>
           </a:p>
           <a:p>
@@ -18450,11 +19129,7 @@
             </a:pPr>
             <a:r>
               <a:rPr lang="nb-NO" b="1" dirty="0" smtClean="0"/>
-              <a:t> Levere </a:t>
-            </a:r>
-            <a:r>
-              <a:rPr lang="nb-NO" b="1" dirty="0" smtClean="0"/>
-              <a:t>data i flere formater (XML, JSON)</a:t>
+              <a:t> Levere data i flere formater (XML, JSON)</a:t>
             </a:r>
           </a:p>
           <a:p>
@@ -18483,11 +19158,7 @@
             </a:pPr>
             <a:r>
               <a:rPr lang="nb-NO" b="1" dirty="0" smtClean="0"/>
-              <a:t> </a:t>
-            </a:r>
-            <a:r>
-              <a:rPr lang="nb-NO" b="1" dirty="0" smtClean="0"/>
-              <a:t>Facebook, Twitter, LinkedIn +++ </a:t>
+              <a:t> Facebook, Twitter, LinkedIn +++ </a:t>
             </a:r>
           </a:p>
           <a:p>

</xml_diff>

<commit_message>
updated slides and added text to describe how to start web api project from scratch
</commit_message>
<xml_diff>
--- a/webapi/WebAPI.pptx
+++ b/webapi/WebAPI.pptx
@@ -129,7 +129,7 @@
   </p:defaultTextStyle>
   <p:extLst>
     <p:ext uri="{EFAFB233-063F-42B5-8137-9DF3F51BA10A}">
-      <p15:sldGuideLst xmlns:p15="http://schemas.microsoft.com/office/powerpoint/2012/main">
+      <p15:sldGuideLst xmlns:p15="http://schemas.microsoft.com/office/powerpoint/2012/main" xmlns="">
         <p15:guide id="1" orient="horz" pos="4196">
           <p15:clr>
             <a:srgbClr val="A4A3A4"/>
@@ -163,7 +163,7 @@
       </p15:sldGuideLst>
     </p:ext>
     <p:ext uri="{2D200454-40CA-4A62-9FC3-DE9A4176ACB9}">
-      <p15:notesGuideLst xmlns:p15="http://schemas.microsoft.com/office/powerpoint/2012/main">
+      <p15:notesGuideLst xmlns:p15="http://schemas.microsoft.com/office/powerpoint/2012/main" xmlns="">
         <p15:guide id="1" orient="horz" pos="2880">
           <p15:clr>
             <a:srgbClr val="A4A3A4"/>
@@ -849,6 +849,75 @@
             <p:ph type="sldImg"/>
           </p:nvPr>
         </p:nvSpPr>
+        <p:spPr/>
+      </p:sp>
+      <p:sp>
+        <p:nvSpPr>
+          <p:cNvPr id="3" name="Notes Placeholder 2"/>
+          <p:cNvSpPr>
+            <a:spLocks noGrp="1"/>
+          </p:cNvSpPr>
+          <p:nvPr>
+            <p:ph type="body" idx="1"/>
+          </p:nvPr>
+        </p:nvSpPr>
+        <p:spPr/>
+        <p:txBody>
+          <a:bodyPr/>
+          <a:lstStyle/>
+          <a:p>
+            <a:r>
+              <a:rPr lang="nb-NO" dirty="0" smtClean="0"/>
+              <a:t>For de som ønsker</a:t>
+            </a:r>
+            <a:r>
+              <a:rPr lang="nb-NO" baseline="0" dirty="0" smtClean="0"/>
+              <a:t> å starte helt fra scratch så kan dere lese tekstfilen «Start fra scratch» som ligger i MinBlogg katalogen.</a:t>
+            </a:r>
+            <a:endParaRPr lang="nb-NO" dirty="0"/>
+          </a:p>
+        </p:txBody>
+      </p:sp>
+    </p:spTree>
+    <p:extLst>
+      <p:ext uri="{BB962C8B-B14F-4D97-AF65-F5344CB8AC3E}">
+        <p14:creationId xmlns:p14="http://schemas.microsoft.com/office/powerpoint/2010/main" val="2134900006"/>
+      </p:ext>
+    </p:extLst>
+  </p:cSld>
+  <p:clrMapOvr>
+    <a:masterClrMapping/>
+  </p:clrMapOvr>
+</p:notes>
+</file>
+
+<file path=ppt/notesSlides/notesSlide14.xml><?xml version="1.0" encoding="utf-8"?>
+<p:notes xmlns:a="http://schemas.openxmlformats.org/drawingml/2006/main" xmlns:r="http://schemas.openxmlformats.org/officeDocument/2006/relationships" xmlns:p="http://schemas.openxmlformats.org/presentationml/2006/main">
+  <p:cSld>
+    <p:spTree>
+      <p:nvGrpSpPr>
+        <p:cNvPr id="1" name=""/>
+        <p:cNvGrpSpPr/>
+        <p:nvPr/>
+      </p:nvGrpSpPr>
+      <p:grpSpPr>
+        <a:xfrm>
+          <a:off x="0" y="0"/>
+          <a:ext cx="0" cy="0"/>
+          <a:chOff x="0" y="0"/>
+          <a:chExt cx="0" cy="0"/>
+        </a:xfrm>
+      </p:grpSpPr>
+      <p:sp>
+        <p:nvSpPr>
+          <p:cNvPr id="2" name="Slide Image Placeholder 1"/>
+          <p:cNvSpPr>
+            <a:spLocks noGrp="1" noRot="1" noChangeAspect="1"/>
+          </p:cNvSpPr>
+          <p:nvPr>
+            <p:ph type="sldImg"/>
+          </p:nvPr>
+        </p:nvSpPr>
         <p:spPr>
           <a:xfrm>
             <a:off x="827088" y="592138"/>
@@ -896,7 +965,74 @@
 </p:notes>
 </file>
 
-<file path=ppt/notesSlides/notesSlide14.xml><?xml version="1.0" encoding="utf-8"?>
+<file path=ppt/notesSlides/notesSlide15.xml><?xml version="1.0" encoding="utf-8"?>
+<p:notes xmlns:a="http://schemas.openxmlformats.org/drawingml/2006/main" xmlns:r="http://schemas.openxmlformats.org/officeDocument/2006/relationships" xmlns:p="http://schemas.openxmlformats.org/presentationml/2006/main">
+  <p:cSld>
+    <p:spTree>
+      <p:nvGrpSpPr>
+        <p:cNvPr id="1" name=""/>
+        <p:cNvGrpSpPr/>
+        <p:nvPr/>
+      </p:nvGrpSpPr>
+      <p:grpSpPr>
+        <a:xfrm>
+          <a:off x="0" y="0"/>
+          <a:ext cx="0" cy="0"/>
+          <a:chOff x="0" y="0"/>
+          <a:chExt cx="0" cy="0"/>
+        </a:xfrm>
+      </p:grpSpPr>
+      <p:sp>
+        <p:nvSpPr>
+          <p:cNvPr id="2" name="Slide Image Placeholder 1"/>
+          <p:cNvSpPr>
+            <a:spLocks noGrp="1" noRot="1" noChangeAspect="1"/>
+          </p:cNvSpPr>
+          <p:nvPr>
+            <p:ph type="sldImg"/>
+          </p:nvPr>
+        </p:nvSpPr>
+        <p:spPr/>
+      </p:sp>
+      <p:sp>
+        <p:nvSpPr>
+          <p:cNvPr id="3" name="Notes Placeholder 2"/>
+          <p:cNvSpPr>
+            <a:spLocks noGrp="1"/>
+          </p:cNvSpPr>
+          <p:nvPr>
+            <p:ph type="body" idx="1"/>
+          </p:nvPr>
+        </p:nvSpPr>
+        <p:spPr/>
+        <p:txBody>
+          <a:bodyPr/>
+          <a:lstStyle/>
+          <a:p>
+            <a:r>
+              <a:rPr lang="nb-NO" smtClean="0">
+                <a:hlinkClick r:id="rId3"/>
+              </a:rPr>
+              <a:t>http://martinfowler.com/articles/richardsonMaturityModel.html</a:t>
+            </a:r>
+            <a:endParaRPr lang="nb-NO"/>
+          </a:p>
+        </p:txBody>
+      </p:sp>
+    </p:spTree>
+    <p:extLst>
+      <p:ext uri="{BB962C8B-B14F-4D97-AF65-F5344CB8AC3E}">
+        <p14:creationId xmlns:p14="http://schemas.microsoft.com/office/powerpoint/2010/main" val="2578365851"/>
+      </p:ext>
+    </p:extLst>
+  </p:cSld>
+  <p:clrMapOvr>
+    <a:masterClrMapping/>
+  </p:clrMapOvr>
+</p:notes>
+</file>
+
+<file path=ppt/notesSlides/notesSlide16.xml><?xml version="1.0" encoding="utf-8"?>
 <p:notes xmlns:a="http://schemas.openxmlformats.org/drawingml/2006/main" xmlns:r="http://schemas.openxmlformats.org/officeDocument/2006/relationships" xmlns:p="http://schemas.openxmlformats.org/presentationml/2006/main">
   <p:cSld>
     <p:spTree>
@@ -1101,6 +1237,12 @@
               <a:rPr lang="nb-NO" baseline="0" dirty="0" smtClean="0"/>
               <a:t> tilfellet er ressursen en liste av bloggposter.</a:t>
             </a:r>
+          </a:p>
+          <a:p>
+            <a:r>
+              <a:rPr lang="nb-NO" baseline="0" dirty="0" smtClean="0"/>
+              <a:t>Url’en linker til ressursen</a:t>
+            </a:r>
             <a:endParaRPr lang="nb-NO" dirty="0"/>
           </a:p>
         </p:txBody>
@@ -1189,7 +1331,111 @@
                 <a:ea typeface="+mn-ea"/>
                 <a:cs typeface="Georgia"/>
               </a:rPr>
-              <a:t>I REST (og også Web APIet) så kan man bare endre eller utføre operasjonerpå en ressurs ved å bruke en av de fire HTTP-verbene. Altså GET, PUT, POST og DELETE. </a:t>
+              <a:t>En nettleser bruker GET-verbet</a:t>
+            </a:r>
+            <a:r>
+              <a:rPr lang="nb-NO" sz="1500" kern="1200" baseline="0" dirty="0" smtClean="0">
+                <a:solidFill>
+                  <a:schemeClr val="tx1"/>
+                </a:solidFill>
+                <a:effectLst/>
+                <a:latin typeface="Georgia"/>
+                <a:ea typeface="+mn-ea"/>
+                <a:cs typeface="Georgia"/>
+              </a:rPr>
+              <a:t> når man klikker seg rundt på nettet.</a:t>
+            </a:r>
+            <a:endParaRPr lang="nb-NO" sz="1500" kern="1200" dirty="0" smtClean="0">
+              <a:solidFill>
+                <a:schemeClr val="tx1"/>
+              </a:solidFill>
+              <a:effectLst/>
+              <a:latin typeface="Georgia"/>
+              <a:ea typeface="+mn-ea"/>
+              <a:cs typeface="Georgia"/>
+            </a:endParaRPr>
+          </a:p>
+          <a:p>
+            <a:pPr marL="0" marR="0" indent="0" algn="l" defTabSz="457200" rtl="0" eaLnBrk="1" fontAlgn="auto" latinLnBrk="0" hangingPunct="1">
+              <a:lnSpc>
+                <a:spcPct val="100000"/>
+              </a:lnSpc>
+              <a:spcBef>
+                <a:spcPts val="0"/>
+              </a:spcBef>
+              <a:spcAft>
+                <a:spcPts val="0"/>
+              </a:spcAft>
+              <a:buClrTx/>
+              <a:buSzTx/>
+              <a:buFontTx/>
+              <a:buNone/>
+              <a:tabLst/>
+              <a:defRPr/>
+            </a:pPr>
+            <a:r>
+              <a:rPr lang="nb-NO" sz="1500" kern="1200" dirty="0" smtClean="0">
+                <a:solidFill>
+                  <a:schemeClr val="tx1"/>
+                </a:solidFill>
+                <a:effectLst/>
+                <a:latin typeface="Georgia"/>
+                <a:ea typeface="+mn-ea"/>
+                <a:cs typeface="Georgia"/>
+              </a:rPr>
+              <a:t>En</a:t>
+            </a:r>
+            <a:r>
+              <a:rPr lang="nb-NO" sz="1500" kern="1200" baseline="0" dirty="0" smtClean="0">
+                <a:solidFill>
+                  <a:schemeClr val="tx1"/>
+                </a:solidFill>
+                <a:effectLst/>
+                <a:latin typeface="Georgia"/>
+                <a:ea typeface="+mn-ea"/>
+                <a:cs typeface="Georgia"/>
+              </a:rPr>
+              <a:t> ressurs kan støtte flere operasjoner enn GET</a:t>
+            </a:r>
+            <a:endParaRPr lang="nb-NO" sz="1500" kern="1200" dirty="0" smtClean="0">
+              <a:solidFill>
+                <a:schemeClr val="tx1"/>
+              </a:solidFill>
+              <a:effectLst/>
+              <a:latin typeface="Georgia"/>
+              <a:ea typeface="+mn-ea"/>
+              <a:cs typeface="Georgia"/>
+            </a:endParaRPr>
+          </a:p>
+          <a:p>
+            <a:pPr marL="0" marR="0" indent="0" algn="l" defTabSz="457200" rtl="0" eaLnBrk="1" fontAlgn="auto" latinLnBrk="0" hangingPunct="1">
+              <a:lnSpc>
+                <a:spcPct val="100000"/>
+              </a:lnSpc>
+              <a:spcBef>
+                <a:spcPts val="0"/>
+              </a:spcBef>
+              <a:spcAft>
+                <a:spcPts val="0"/>
+              </a:spcAft>
+              <a:buClrTx/>
+              <a:buSzTx/>
+              <a:buFontTx/>
+              <a:buNone/>
+              <a:tabLst/>
+              <a:defRPr/>
+            </a:pPr>
+            <a:r>
+              <a:rPr lang="nb-NO" sz="1500" kern="1200" dirty="0" smtClean="0">
+                <a:solidFill>
+                  <a:schemeClr val="tx1"/>
+                </a:solidFill>
+                <a:effectLst/>
+                <a:latin typeface="Georgia"/>
+                <a:ea typeface="+mn-ea"/>
+                <a:cs typeface="Georgia"/>
+              </a:rPr>
+              <a:t>I REST (og også Web APIet) kan operasjoner på en ressurs bare utføres ved å bruke en av de fire HTTP-verbene. Altså GET, PUT, POST og DELETE. </a:t>
             </a:r>
           </a:p>
           <a:p>
@@ -16888,11 +17134,6 @@
               </a:rPr>
               <a:t> POX</a:t>
             </a:r>
-            <a:endParaRPr lang="nb-NO" sz="1600" b="1" dirty="0" smtClean="0">
-              <a:solidFill>
-                <a:schemeClr val="bg1"/>
-              </a:solidFill>
-            </a:endParaRPr>
           </a:p>
         </p:txBody>
       </p:sp>
@@ -16959,11 +17200,6 @@
               </a:rPr>
               <a:t>Level 1 : Resources</a:t>
             </a:r>
-            <a:endParaRPr lang="nb-NO" sz="1600" b="1" dirty="0" smtClean="0">
-              <a:solidFill>
-                <a:schemeClr val="bg1"/>
-              </a:solidFill>
-            </a:endParaRPr>
           </a:p>
         </p:txBody>
       </p:sp>
@@ -17031,11 +17267,6 @@
               </a:rPr>
               <a:t>Level 2 : HTTP Verbs</a:t>
             </a:r>
-            <a:endParaRPr lang="nb-NO" sz="1600" b="1" dirty="0" smtClean="0">
-              <a:solidFill>
-                <a:schemeClr val="bg1"/>
-              </a:solidFill>
-            </a:endParaRPr>
           </a:p>
         </p:txBody>
       </p:sp>
@@ -17181,7 +17412,6 @@
               <a:rPr lang="nb-NO" sz="2400" b="1" dirty="0" smtClean="0"/>
               <a:t> REST</a:t>
             </a:r>
-            <a:endParaRPr lang="nb-NO" sz="2400" b="1" dirty="0" smtClean="0"/>
           </a:p>
         </p:txBody>
       </p:sp>
@@ -17378,7 +17608,6 @@
               <a:rPr lang="nb-NO" sz="1700" dirty="0" smtClean="0"/>
               <a:t> Model</a:t>
             </a:r>
-            <a:endParaRPr lang="nb-NO" sz="1700" dirty="0" smtClean="0"/>
           </a:p>
         </p:txBody>
       </p:sp>

</xml_diff>

<commit_message>
Small changes to webapi slides
</commit_message>
<xml_diff>
--- a/webapi/WebAPI.pptx
+++ b/webapi/WebAPI.pptx
@@ -719,11 +719,7 @@
             </a:r>
             <a:r>
               <a:rPr lang="nb-NO" baseline="0" dirty="0" smtClean="0"/>
-              <a:t> kjekt å bruke for å lage ruter for sub-ressurser som f.eks. Kommentarer i dette </a:t>
-            </a:r>
-            <a:r>
-              <a:rPr lang="nb-NO" baseline="0" dirty="0" smtClean="0"/>
-              <a:t>eksemplet</a:t>
+              <a:t> kjekt å bruke for å lage ruter for sub-ressurser som f.eks. Kommentarer i dette eksemplet</a:t>
             </a:r>
           </a:p>
           <a:p>
@@ -1603,11 +1599,7 @@
             </a:pPr>
             <a:r>
               <a:rPr lang="nb-NO" baseline="0" dirty="0" smtClean="0"/>
-              <a:t>Kan hente alle kommentarer som tilhører en bloggpost ved å gjøre en GET mot subressursen «kommentarer</a:t>
-            </a:r>
-            <a:r>
-              <a:rPr lang="nb-NO" baseline="0" dirty="0" smtClean="0"/>
-              <a:t>».</a:t>
+              <a:t>Kan hente alle kommentarer som tilhører en bloggpost ved å gjøre en GET mot subressursen «kommentarer».</a:t>
             </a:r>
           </a:p>
           <a:p>
@@ -1619,7 +1611,6 @@
               <a:rPr lang="nb-NO" baseline="0" dirty="0" smtClean="0"/>
               <a:t>Facebook, twitter, linkedin</a:t>
             </a:r>
-            <a:endParaRPr lang="nb-NO" baseline="0" dirty="0" smtClean="0"/>
           </a:p>
         </p:txBody>
       </p:sp>
@@ -16718,8 +16709,11 @@
                 <a:latin typeface="Consolas" pitchFamily="49" charset="0"/>
                 <a:cs typeface="Consolas" pitchFamily="49" charset="0"/>
               </a:rPr>
-              <a:t>IHttpActionResult Post(Bloggpost </a:t>
-            </a:r>
+              <a:t>IHttpActionResult Post(Bloggpost post)</a:t>
+            </a:r>
+          </a:p>
+          <a:p>
+            <a:pPr algn="just"/>
             <a:r>
               <a:rPr lang="nb-NO" dirty="0" smtClean="0">
                 <a:solidFill>
@@ -16728,11 +16722,16 @@
                 <a:latin typeface="Consolas" pitchFamily="49" charset="0"/>
                 <a:cs typeface="Consolas" pitchFamily="49" charset="0"/>
               </a:rPr>
-              <a:t>post)</a:t>
-            </a:r>
-          </a:p>
-          <a:p>
-            <a:pPr algn="just"/>
+              <a:t>	</a:t>
+            </a:r>
+            <a:r>
+              <a:rPr lang="nb-NO" dirty="0" smtClean="0">
+                <a:solidFill>
+                  <a:schemeClr val="bg1"/>
+                </a:solidFill>
+              </a:rPr>
+              <a:t>4. </a:t>
+            </a:r>
             <a:r>
               <a:rPr lang="nb-NO" dirty="0" smtClean="0">
                 <a:solidFill>
@@ -16741,16 +16740,11 @@
                 <a:latin typeface="Consolas" pitchFamily="49" charset="0"/>
                 <a:cs typeface="Consolas" pitchFamily="49" charset="0"/>
               </a:rPr>
-              <a:t>	</a:t>
-            </a:r>
-            <a:r>
-              <a:rPr lang="nb-NO" dirty="0" smtClean="0">
-                <a:solidFill>
-                  <a:schemeClr val="bg1"/>
-                </a:solidFill>
-              </a:rPr>
-              <a:t>4. </a:t>
-            </a:r>
+              <a:t>IHttpActionResult Put(int id, Bloggpost post)</a:t>
+            </a:r>
+          </a:p>
+          <a:p>
+            <a:pPr algn="just"/>
             <a:r>
               <a:rPr lang="nb-NO" dirty="0" smtClean="0">
                 <a:solidFill>
@@ -16759,7 +16753,15 @@
                 <a:latin typeface="Consolas" pitchFamily="49" charset="0"/>
                 <a:cs typeface="Consolas" pitchFamily="49" charset="0"/>
               </a:rPr>
-              <a:t>IHttpActionResult</a:t>
+              <a:t>	</a:t>
+            </a:r>
+            <a:r>
+              <a:rPr lang="nb-NO" dirty="0" smtClean="0">
+                <a:solidFill>
+                  <a:schemeClr val="bg1"/>
+                </a:solidFill>
+              </a:rPr>
+              <a:t>5. </a:t>
             </a:r>
             <a:r>
               <a:rPr lang="nb-NO" dirty="0" smtClean="0">
@@ -16769,68 +16771,7 @@
                 <a:latin typeface="Consolas" pitchFamily="49" charset="0"/>
                 <a:cs typeface="Consolas" pitchFamily="49" charset="0"/>
               </a:rPr>
-              <a:t> </a:t>
-            </a:r>
-            <a:r>
-              <a:rPr lang="nb-NO" dirty="0" smtClean="0">
-                <a:solidFill>
-                  <a:schemeClr val="bg1"/>
-                </a:solidFill>
-                <a:latin typeface="Consolas" pitchFamily="49" charset="0"/>
-                <a:cs typeface="Consolas" pitchFamily="49" charset="0"/>
-              </a:rPr>
-              <a:t>Put(int id, Bloggpost post)</a:t>
-            </a:r>
-          </a:p>
-          <a:p>
-            <a:pPr algn="just"/>
-            <a:r>
-              <a:rPr lang="nb-NO" dirty="0" smtClean="0">
-                <a:solidFill>
-                  <a:schemeClr val="bg1"/>
-                </a:solidFill>
-                <a:latin typeface="Consolas" pitchFamily="49" charset="0"/>
-                <a:cs typeface="Consolas" pitchFamily="49" charset="0"/>
-              </a:rPr>
-              <a:t>	</a:t>
-            </a:r>
-            <a:r>
-              <a:rPr lang="nb-NO" dirty="0" smtClean="0">
-                <a:solidFill>
-                  <a:schemeClr val="bg1"/>
-                </a:solidFill>
-              </a:rPr>
-              <a:t>5. </a:t>
-            </a:r>
-            <a:r>
-              <a:rPr lang="nb-NO" dirty="0" smtClean="0">
-                <a:solidFill>
-                  <a:schemeClr val="bg1"/>
-                </a:solidFill>
-                <a:latin typeface="Consolas" pitchFamily="49" charset="0"/>
-                <a:cs typeface="Consolas" pitchFamily="49" charset="0"/>
-              </a:rPr>
-              <a:t>IHttpActionResult</a:t>
-            </a:r>
-            <a:r>
-              <a:rPr lang="nb-NO" dirty="0" smtClean="0">
-                <a:solidFill>
-                  <a:schemeClr val="bg1"/>
-                </a:solidFill>
-                <a:latin typeface="Consolas" pitchFamily="49" charset="0"/>
-                <a:cs typeface="Consolas" pitchFamily="49" charset="0"/>
-              </a:rPr>
-              <a:t> </a:t>
-            </a:r>
-            <a:r>
-              <a:rPr lang="nb-NO" dirty="0" smtClean="0">
-                <a:solidFill>
-                  <a:schemeClr val="bg1"/>
-                </a:solidFill>
-                <a:latin typeface="Consolas" pitchFamily="49" charset="0"/>
-                <a:cs typeface="Consolas" pitchFamily="49" charset="0"/>
-              </a:rPr>
-              <a:t>Delete(int id)</a:t>
+              <a:t>IHttpActionResult Delete(int id)</a:t>
             </a:r>
           </a:p>
           <a:p>
@@ -17192,10 +17133,26 @@
                   <a:schemeClr val="bg1"/>
                 </a:solidFill>
               </a:rPr>
-              <a:t>Hint: System.Web.Http.HttpClient</a:t>
-            </a:r>
-            <a:r>
-              <a:rPr lang="nb-NO" dirty="0" smtClean="0">
+              <a:t>Hint</a:t>
+            </a:r>
+            <a:r>
+              <a:rPr lang="nb-NO" i="1" smtClean="0">
+                <a:solidFill>
+                  <a:schemeClr val="bg1"/>
+                </a:solidFill>
+              </a:rPr>
+              <a:t>: </a:t>
+            </a:r>
+            <a:r>
+              <a:rPr lang="nb-NO" i="1" smtClean="0">
+                <a:solidFill>
+                  <a:schemeClr val="bg1"/>
+                </a:solidFill>
+              </a:rPr>
+              <a:t>RestSharp</a:t>
+            </a:r>
+            <a:r>
+              <a:rPr lang="nb-NO" smtClean="0">
                 <a:solidFill>
                   <a:schemeClr val="bg1"/>
                 </a:solidFill>
@@ -18565,13 +18522,8 @@
             </a:pPr>
             <a:r>
               <a:rPr lang="nb-NO" sz="2000" b="1" dirty="0" smtClean="0"/>
-              <a:t> </a:t>
-            </a:r>
-            <a:r>
-              <a:rPr lang="nb-NO" sz="2000" b="1" dirty="0" smtClean="0"/>
-              <a:t>Oppgave (Hvis tid)</a:t>
-            </a:r>
-            <a:endParaRPr lang="nb-NO" sz="2000" b="1" dirty="0" smtClean="0"/>
+              <a:t> Oppgave (Hvis tid)</a:t>
+            </a:r>
           </a:p>
         </p:txBody>
       </p:sp>
@@ -19694,13 +19646,8 @@
             </a:pPr>
             <a:r>
               <a:rPr lang="nb-NO" b="1" dirty="0" smtClean="0"/>
-              <a:t> Levere data i flere formater (XML, JSON</a:t>
-            </a:r>
-            <a:r>
-              <a:rPr lang="nb-NO" b="1" dirty="0" smtClean="0"/>
-              <a:t>)</a:t>
-            </a:r>
-            <a:endParaRPr lang="nb-NO" b="1" dirty="0" smtClean="0"/>
+              <a:t> Levere data i flere formater (XML, JSON)</a:t>
+            </a:r>
           </a:p>
         </p:txBody>
       </p:sp>
@@ -19856,11 +19803,7 @@
             </a:pPr>
             <a:r>
               <a:rPr lang="nb-NO" dirty="0" smtClean="0"/>
-              <a:t> </a:t>
-            </a:r>
-            <a:r>
-              <a:rPr lang="nb-NO" dirty="0" smtClean="0"/>
-              <a:t>Kan brukes direkte i et ASP .NET MVC 4 prosjekt</a:t>
+              <a:t> Kan brukes direkte i et ASP .NET MVC 4 prosjekt</a:t>
             </a:r>
             <a:endParaRPr lang="nb-NO" dirty="0"/>
           </a:p>

</xml_diff>